<commit_message>
How to store binary data in XML
</commit_message>
<xml_diff>
--- a/Presentation/lesson-06-xml.pptx
+++ b/Presentation/lesson-06-xml.pptx
@@ -5,7 +5,7 @@
     <p:sldMasterId id="2147483648" r:id="rId1"/>
   </p:sldMasterIdLst>
   <p:notesMasterIdLst>
-    <p:notesMasterId r:id="rId28"/>
+    <p:notesMasterId r:id="rId29"/>
   </p:notesMasterIdLst>
   <p:sldIdLst>
     <p:sldId id="257" r:id="rId2"/>
@@ -22,18 +22,19 @@
     <p:sldId id="268" r:id="rId13"/>
     <p:sldId id="269" r:id="rId14"/>
     <p:sldId id="270" r:id="rId15"/>
-    <p:sldId id="260" r:id="rId16"/>
-    <p:sldId id="271" r:id="rId17"/>
-    <p:sldId id="273" r:id="rId18"/>
-    <p:sldId id="274" r:id="rId19"/>
-    <p:sldId id="283" r:id="rId20"/>
-    <p:sldId id="276" r:id="rId21"/>
-    <p:sldId id="278" r:id="rId22"/>
-    <p:sldId id="284" r:id="rId23"/>
-    <p:sldId id="277" r:id="rId24"/>
-    <p:sldId id="280" r:id="rId25"/>
-    <p:sldId id="282" r:id="rId26"/>
-    <p:sldId id="285" r:id="rId27"/>
+    <p:sldId id="286" r:id="rId16"/>
+    <p:sldId id="260" r:id="rId17"/>
+    <p:sldId id="271" r:id="rId18"/>
+    <p:sldId id="273" r:id="rId19"/>
+    <p:sldId id="274" r:id="rId20"/>
+    <p:sldId id="283" r:id="rId21"/>
+    <p:sldId id="276" r:id="rId22"/>
+    <p:sldId id="278" r:id="rId23"/>
+    <p:sldId id="284" r:id="rId24"/>
+    <p:sldId id="277" r:id="rId25"/>
+    <p:sldId id="280" r:id="rId26"/>
+    <p:sldId id="282" r:id="rId27"/>
+    <p:sldId id="285" r:id="rId28"/>
   </p:sldIdLst>
   <p:sldSz cx="9144000" cy="6858000" type="screen4x3"/>
   <p:notesSz cx="6858000" cy="9144000"/>
@@ -217,7 +218,7 @@
           <a:p>
             <a:fld id="{B24A7054-7FFB-49F4-A126-5DF6E687FF53}" type="datetimeFigureOut">
               <a:rPr lang="ru-RU" smtClean="0"/>
-              <a:t>16.10.2013</a:t>
+              <a:t>21.10.2013</a:t>
             </a:fld>
             <a:endParaRPr lang="ru-RU"/>
           </a:p>
@@ -1280,7 +1281,7 @@
           <a:p>
             <a:fld id="{8E6E6A2A-E9D3-4A0D-B04A-ABDD367A1E08}" type="datetimeFigureOut">
               <a:rPr lang="ru-RU" smtClean="0"/>
-              <a:t>16.10.2013</a:t>
+              <a:t>21.10.2013</a:t>
             </a:fld>
             <a:endParaRPr lang="ru-RU"/>
           </a:p>
@@ -2728,7 +2729,7 @@
           <a:p>
             <a:fld id="{AC3D3127-B7C4-45E3-9797-C527EC9FDD78}" type="datetimeFigureOut">
               <a:rPr lang="ru-RU" smtClean="0"/>
-              <a:t>16.10.2013</a:t>
+              <a:t>21.10.2013</a:t>
             </a:fld>
             <a:endParaRPr lang="ru-RU"/>
           </a:p>
@@ -5132,8 +5133,8 @@
           <a:lstStyle/>
           <a:p>
             <a:r>
-              <a:rPr lang="ru-RU" dirty="0"/>
-              <a:t>Правила разметки</a:t>
+              <a:rPr lang="ru-RU" dirty="0" smtClean="0"/>
+              <a:t>Хранение бинарных данных</a:t>
             </a:r>
             <a:endParaRPr lang="en-US" dirty="0"/>
           </a:p>
@@ -5149,153 +5150,434 @@
             <p:ph idx="1"/>
           </p:nvPr>
         </p:nvSpPr>
-        <p:spPr/>
+        <p:spPr>
+          <a:xfrm>
+            <a:off x="446856" y="1600201"/>
+            <a:ext cx="8229600" cy="4133056"/>
+          </a:xfrm>
+        </p:spPr>
         <p:txBody>
           <a:bodyPr>
-            <a:normAutofit/>
+            <a:normAutofit lnSpcReduction="10000"/>
           </a:bodyPr>
           <a:lstStyle/>
-          <a:p>
-            <a:pPr lvl="0"/>
-            <a:r>
-              <a:rPr lang="ru-RU" sz="1800" dirty="0"/>
-              <a:t>Все элементы должны быть закрыты</a:t>
-            </a:r>
-            <a:endParaRPr lang="en-US" sz="1800" dirty="0"/>
-          </a:p>
-          <a:p>
-            <a:pPr lvl="0"/>
-            <a:r>
-              <a:rPr lang="ru-RU" sz="1800" dirty="0"/>
-              <a:t>Корневой элемент может быть только один</a:t>
-            </a:r>
-            <a:endParaRPr lang="en-US" sz="1800" dirty="0"/>
-          </a:p>
-          <a:p>
-            <a:pPr lvl="0"/>
-            <a:r>
-              <a:rPr lang="ru-RU" sz="1800" dirty="0"/>
-              <a:t>Регистр имеет значение (&lt;</a:t>
-            </a:r>
-            <a:r>
-              <a:rPr lang="en-US" sz="1800" dirty="0"/>
-              <a:t>book</a:t>
-            </a:r>
-            <a:r>
-              <a:rPr lang="ru-RU" sz="1800" dirty="0"/>
-              <a:t>&gt; != &lt;</a:t>
-            </a:r>
-            <a:r>
-              <a:rPr lang="en-US" sz="1800" dirty="0"/>
-              <a:t>Book</a:t>
-            </a:r>
-            <a:r>
-              <a:rPr lang="ru-RU" sz="1800" dirty="0"/>
-              <a:t>&gt;)</a:t>
-            </a:r>
-            <a:endParaRPr lang="en-US" sz="1800" dirty="0"/>
-          </a:p>
-          <a:p>
-            <a:pPr lvl="0"/>
-            <a:r>
-              <a:rPr lang="ru-RU" sz="1800" dirty="0"/>
-              <a:t>Закрывать нужно в порядке обратном порядку открытия</a:t>
-            </a:r>
-            <a:endParaRPr lang="en-US" sz="1800" dirty="0"/>
-          </a:p>
-          <a:p>
-            <a:pPr lvl="0"/>
-            <a:r>
-              <a:rPr lang="ru-RU" sz="1800" dirty="0"/>
-              <a:t>Значения атрибутов должны быть заключены </a:t>
-            </a:r>
-            <a:r>
-              <a:rPr lang="ru-RU" sz="1800" dirty="0" smtClean="0"/>
-              <a:t>в </a:t>
-            </a:r>
-            <a:r>
-              <a:rPr lang="ru-RU" sz="1800" dirty="0"/>
-              <a:t>кавычки</a:t>
-            </a:r>
-            <a:endParaRPr lang="en-US" sz="1800" dirty="0"/>
-          </a:p>
-          <a:p>
-            <a:r>
-              <a:rPr lang="ru-RU" sz="1800" dirty="0"/>
-              <a:t>При необходимости должна быть указана </a:t>
-            </a:r>
-            <a:r>
-              <a:rPr lang="ru-RU" sz="1800" dirty="0" smtClean="0"/>
-              <a:t>кодировка</a:t>
-            </a:r>
-          </a:p>
-          <a:p>
-            <a:endParaRPr lang="ru-RU" sz="1800" dirty="0"/>
-          </a:p>
           <a:p>
             <a:pPr marL="0" indent="0">
               <a:buNone/>
             </a:pPr>
             <a:r>
-              <a:rPr lang="ru-RU" sz="1800" dirty="0"/>
-              <a:t>Документ выполнящий все эти правила называется синтаксически </a:t>
-            </a:r>
-            <a:r>
-              <a:rPr lang="ru-RU" sz="1800" i="1" dirty="0"/>
-              <a:t>верным</a:t>
-            </a:r>
-            <a:r>
-              <a:rPr lang="ru-RU" sz="1800" dirty="0"/>
-              <a:t> (</a:t>
-            </a:r>
-            <a:r>
-              <a:rPr lang="ru-RU" sz="1800" i="1" dirty="0"/>
-              <a:t>well-formed</a:t>
-            </a:r>
-            <a:r>
-              <a:rPr lang="ru-RU" sz="1800" dirty="0"/>
-              <a:t>). Если документ дополнительно соответствует </a:t>
-            </a:r>
-            <a:r>
-              <a:rPr lang="en-US" sz="1800" dirty="0"/>
-              <a:t>DTD </a:t>
-            </a:r>
-            <a:r>
-              <a:rPr lang="ru-RU" sz="1800" dirty="0"/>
-              <a:t>или </a:t>
-            </a:r>
-            <a:r>
-              <a:rPr lang="en-US" sz="1800" dirty="0"/>
-              <a:t>XML Schema</a:t>
-            </a:r>
-            <a:r>
-              <a:rPr lang="ru-RU" sz="1800" dirty="0"/>
-              <a:t>, то он называется </a:t>
-            </a:r>
-            <a:r>
-              <a:rPr lang="ru-RU" sz="1800" i="1" dirty="0"/>
-              <a:t>правильным</a:t>
-            </a:r>
-            <a:r>
-              <a:rPr lang="ru-RU" sz="1800" dirty="0"/>
-              <a:t> (</a:t>
-            </a:r>
-            <a:r>
-              <a:rPr lang="ru-RU" sz="1800" i="1" dirty="0"/>
-              <a:t>valid</a:t>
-            </a:r>
-            <a:r>
-              <a:rPr lang="ru-RU" sz="1800" dirty="0"/>
-              <a:t>).</a:t>
-            </a:r>
-            <a:endParaRPr lang="en-US" sz="1800" dirty="0"/>
+              <a:rPr lang="en-US" sz="2400" dirty="0" smtClean="0"/>
+              <a:t>XML </a:t>
+            </a:r>
+            <a:r>
+              <a:rPr lang="ru-RU" sz="2400" dirty="0" smtClean="0"/>
+              <a:t>является тектовым форматом, поэтому прямое хранение бинарных данных невозможно. Поэтому, по возможности, </a:t>
+            </a:r>
+            <a:r>
+              <a:rPr lang="ru-RU" sz="2400" dirty="0"/>
+              <a:t>избегайте хранить бинарные данные в </a:t>
+            </a:r>
+            <a:r>
+              <a:rPr lang="en-US" sz="2400" dirty="0"/>
+              <a:t>XML. </a:t>
+            </a:r>
+            <a:r>
+              <a:rPr lang="ru-RU" sz="2400" dirty="0" smtClean="0"/>
+              <a:t>Однако можно преобразовать последовательность байтов в текстовое представление и уже его сохранять в </a:t>
+            </a:r>
+            <a:r>
+              <a:rPr lang="en-US" sz="2400" dirty="0" smtClean="0"/>
+              <a:t>XML.</a:t>
+            </a:r>
+            <a:r>
+              <a:rPr lang="ru-RU" sz="2400" dirty="0" smtClean="0"/>
+              <a:t> Хорошим решением будет использование кодировки </a:t>
+            </a:r>
+            <a:r>
+              <a:rPr lang="en-US" sz="2400" dirty="0" smtClean="0"/>
+              <a:t>Base64. </a:t>
+            </a:r>
+            <a:r>
+              <a:rPr lang="ru-RU" sz="2400" dirty="0" smtClean="0"/>
+              <a:t>Накладные расходы при этом составят примерно 37% от объема бинарных данных. Смотрите методы класса </a:t>
+            </a:r>
+            <a:r>
+              <a:rPr lang="en-US" sz="2400" dirty="0" err="1" smtClean="0"/>
+              <a:t>System.Convert</a:t>
+            </a:r>
+            <a:r>
+              <a:rPr lang="en-US" sz="2400" dirty="0" smtClean="0"/>
+              <a:t>:</a:t>
+            </a:r>
+          </a:p>
+          <a:p>
+            <a:r>
+              <a:rPr lang="en-US" sz="2400" dirty="0" smtClean="0"/>
+              <a:t>string ToBase64String(byte[])</a:t>
+            </a:r>
+          </a:p>
+          <a:p>
+            <a:r>
+              <a:rPr lang="en-US" sz="2400" dirty="0" smtClean="0"/>
+              <a:t>byte[] FromBase64String(string)</a:t>
+            </a:r>
+          </a:p>
+          <a:p>
+            <a:pPr marL="0" indent="0">
+              <a:buNone/>
+            </a:pPr>
+            <a:endParaRPr lang="en-US" sz="2400" dirty="0"/>
+          </a:p>
+        </p:txBody>
+      </p:sp>
+      <p:sp>
+        <p:nvSpPr>
+          <p:cNvPr id="6" name="Content Placeholder 2"/>
+          <p:cNvSpPr txBox="1">
+            <a:spLocks/>
+          </p:cNvSpPr>
+          <p:nvPr/>
+        </p:nvSpPr>
+        <p:spPr>
+          <a:xfrm>
+            <a:off x="446856" y="5733256"/>
+            <a:ext cx="8229600" cy="864096"/>
+          </a:xfrm>
+          <a:prstGeom prst="rect">
+            <a:avLst/>
+          </a:prstGeom>
+          <a:solidFill>
+            <a:schemeClr val="bg1"/>
+          </a:solidFill>
+        </p:spPr>
+        <p:txBody>
+          <a:bodyPr vert="horz" lIns="91440" tIns="45720" rIns="91440" bIns="45720" rtlCol="0">
+            <a:normAutofit fontScale="62500" lnSpcReduction="20000"/>
+          </a:bodyPr>
+          <a:lstStyle>
+            <a:lvl1pPr marL="342900" indent="-342900" algn="l" defTabSz="914400" rtl="0" eaLnBrk="1" latinLnBrk="0" hangingPunct="1">
+              <a:spcBef>
+                <a:spcPct val="20000"/>
+              </a:spcBef>
+              <a:buFont typeface="Arial" pitchFamily="34" charset="0"/>
+              <a:buChar char="•"/>
+              <a:defRPr sz="3200" kern="1200">
+                <a:solidFill>
+                  <a:schemeClr val="tx1"/>
+                </a:solidFill>
+                <a:latin typeface="+mn-lt"/>
+                <a:ea typeface="+mn-ea"/>
+                <a:cs typeface="+mn-cs"/>
+              </a:defRPr>
+            </a:lvl1pPr>
+            <a:lvl2pPr marL="742950" indent="-285750" algn="l" defTabSz="914400" rtl="0" eaLnBrk="1" latinLnBrk="0" hangingPunct="1">
+              <a:spcBef>
+                <a:spcPct val="20000"/>
+              </a:spcBef>
+              <a:buFont typeface="Arial" pitchFamily="34" charset="0"/>
+              <a:buChar char="–"/>
+              <a:defRPr sz="2800" kern="1200">
+                <a:solidFill>
+                  <a:schemeClr val="tx1"/>
+                </a:solidFill>
+                <a:latin typeface="+mn-lt"/>
+                <a:ea typeface="+mn-ea"/>
+                <a:cs typeface="+mn-cs"/>
+              </a:defRPr>
+            </a:lvl2pPr>
+            <a:lvl3pPr marL="1143000" indent="-228600" algn="l" defTabSz="914400" rtl="0" eaLnBrk="1" latinLnBrk="0" hangingPunct="1">
+              <a:spcBef>
+                <a:spcPct val="20000"/>
+              </a:spcBef>
+              <a:buFont typeface="Arial" pitchFamily="34" charset="0"/>
+              <a:buChar char="•"/>
+              <a:defRPr sz="2400" kern="1200">
+                <a:solidFill>
+                  <a:schemeClr val="tx1"/>
+                </a:solidFill>
+                <a:latin typeface="+mn-lt"/>
+                <a:ea typeface="+mn-ea"/>
+                <a:cs typeface="+mn-cs"/>
+              </a:defRPr>
+            </a:lvl3pPr>
+            <a:lvl4pPr marL="1600200" indent="-228600" algn="l" defTabSz="914400" rtl="0" eaLnBrk="1" latinLnBrk="0" hangingPunct="1">
+              <a:spcBef>
+                <a:spcPct val="20000"/>
+              </a:spcBef>
+              <a:buFont typeface="Arial" pitchFamily="34" charset="0"/>
+              <a:buChar char="–"/>
+              <a:defRPr sz="2000" kern="1200">
+                <a:solidFill>
+                  <a:schemeClr val="tx1"/>
+                </a:solidFill>
+                <a:latin typeface="+mn-lt"/>
+                <a:ea typeface="+mn-ea"/>
+                <a:cs typeface="+mn-cs"/>
+              </a:defRPr>
+            </a:lvl4pPr>
+            <a:lvl5pPr marL="2057400" indent="-228600" algn="l" defTabSz="914400" rtl="0" eaLnBrk="1" latinLnBrk="0" hangingPunct="1">
+              <a:spcBef>
+                <a:spcPct val="20000"/>
+              </a:spcBef>
+              <a:buFont typeface="Arial" pitchFamily="34" charset="0"/>
+              <a:buChar char="»"/>
+              <a:defRPr sz="2000" kern="1200">
+                <a:solidFill>
+                  <a:schemeClr val="tx1"/>
+                </a:solidFill>
+                <a:latin typeface="+mn-lt"/>
+                <a:ea typeface="+mn-ea"/>
+                <a:cs typeface="+mn-cs"/>
+              </a:defRPr>
+            </a:lvl5pPr>
+            <a:lvl6pPr marL="2514600" indent="-228600" algn="l" defTabSz="914400" rtl="0" eaLnBrk="1" latinLnBrk="0" hangingPunct="1">
+              <a:spcBef>
+                <a:spcPct val="20000"/>
+              </a:spcBef>
+              <a:buFont typeface="Arial" pitchFamily="34" charset="0"/>
+              <a:buChar char="•"/>
+              <a:defRPr sz="2000" kern="1200">
+                <a:solidFill>
+                  <a:schemeClr val="tx1"/>
+                </a:solidFill>
+                <a:latin typeface="+mn-lt"/>
+                <a:ea typeface="+mn-ea"/>
+                <a:cs typeface="+mn-cs"/>
+              </a:defRPr>
+            </a:lvl6pPr>
+            <a:lvl7pPr marL="2971800" indent="-228600" algn="l" defTabSz="914400" rtl="0" eaLnBrk="1" latinLnBrk="0" hangingPunct="1">
+              <a:spcBef>
+                <a:spcPct val="20000"/>
+              </a:spcBef>
+              <a:buFont typeface="Arial" pitchFamily="34" charset="0"/>
+              <a:buChar char="•"/>
+              <a:defRPr sz="2000" kern="1200">
+                <a:solidFill>
+                  <a:schemeClr val="tx1"/>
+                </a:solidFill>
+                <a:latin typeface="+mn-lt"/>
+                <a:ea typeface="+mn-ea"/>
+                <a:cs typeface="+mn-cs"/>
+              </a:defRPr>
+            </a:lvl7pPr>
+            <a:lvl8pPr marL="3429000" indent="-228600" algn="l" defTabSz="914400" rtl="0" eaLnBrk="1" latinLnBrk="0" hangingPunct="1">
+              <a:spcBef>
+                <a:spcPct val="20000"/>
+              </a:spcBef>
+              <a:buFont typeface="Arial" pitchFamily="34" charset="0"/>
+              <a:buChar char="•"/>
+              <a:defRPr sz="2000" kern="1200">
+                <a:solidFill>
+                  <a:schemeClr val="tx1"/>
+                </a:solidFill>
+                <a:latin typeface="+mn-lt"/>
+                <a:ea typeface="+mn-ea"/>
+                <a:cs typeface="+mn-cs"/>
+              </a:defRPr>
+            </a:lvl8pPr>
+            <a:lvl9pPr marL="3886200" indent="-228600" algn="l" defTabSz="914400" rtl="0" eaLnBrk="1" latinLnBrk="0" hangingPunct="1">
+              <a:spcBef>
+                <a:spcPct val="20000"/>
+              </a:spcBef>
+              <a:buFont typeface="Arial" pitchFamily="34" charset="0"/>
+              <a:buChar char="•"/>
+              <a:defRPr sz="2000" kern="1200">
+                <a:solidFill>
+                  <a:schemeClr val="tx1"/>
+                </a:solidFill>
+                <a:latin typeface="+mn-lt"/>
+                <a:ea typeface="+mn-ea"/>
+                <a:cs typeface="+mn-cs"/>
+              </a:defRPr>
+            </a:lvl9pPr>
+          </a:lstStyle>
+          <a:p>
+            <a:pPr marL="0" indent="0">
+              <a:buNone/>
+            </a:pPr>
+            <a:r>
+              <a:rPr lang="en-US" sz="2400" dirty="0">
+                <a:solidFill>
+                  <a:srgbClr val="0000FF"/>
+                </a:solidFill>
+                <a:latin typeface="Consolas"/>
+              </a:rPr>
+              <a:t>&lt;</a:t>
+            </a:r>
+            <a:r>
+              <a:rPr lang="en-US" sz="2400" dirty="0">
+                <a:solidFill>
+                  <a:srgbClr val="800000"/>
+                </a:solidFill>
+                <a:latin typeface="Consolas"/>
+              </a:rPr>
+              <a:t>book </a:t>
+            </a:r>
+            <a:r>
+              <a:rPr lang="en-US" sz="2400" dirty="0" err="1">
+                <a:solidFill>
+                  <a:srgbClr val="FF0000"/>
+                </a:solidFill>
+                <a:latin typeface="Consolas"/>
+              </a:rPr>
+              <a:t>isbn</a:t>
+            </a:r>
+            <a:r>
+              <a:rPr lang="en-US" sz="2400" dirty="0">
+                <a:solidFill>
+                  <a:srgbClr val="0000FF"/>
+                </a:solidFill>
+                <a:latin typeface="Consolas"/>
+              </a:rPr>
+              <a:t>="978-5-459-00297-3"&gt;</a:t>
+            </a:r>
+            <a:endParaRPr lang="en-US" sz="2400" dirty="0">
+              <a:solidFill>
+                <a:srgbClr val="000000"/>
+              </a:solidFill>
+              <a:latin typeface="Consolas"/>
+            </a:endParaRPr>
+          </a:p>
+          <a:p>
+            <a:pPr marL="0" indent="0">
+              <a:buNone/>
+            </a:pPr>
+            <a:r>
+              <a:rPr lang="en-US" sz="2400" dirty="0" smtClean="0">
+                <a:solidFill>
+                  <a:srgbClr val="000000"/>
+                </a:solidFill>
+                <a:latin typeface="Consolas"/>
+              </a:rPr>
+              <a:t>  </a:t>
+            </a:r>
+            <a:r>
+              <a:rPr lang="en-US" sz="2400" dirty="0">
+                <a:solidFill>
+                  <a:srgbClr val="0000FF"/>
+                </a:solidFill>
+                <a:latin typeface="Consolas"/>
+              </a:rPr>
+              <a:t>&lt;</a:t>
+            </a:r>
+            <a:r>
+              <a:rPr lang="en-US" sz="2400" dirty="0">
+                <a:solidFill>
+                  <a:srgbClr val="800000"/>
+                </a:solidFill>
+                <a:latin typeface="Consolas"/>
+              </a:rPr>
+              <a:t>cover</a:t>
+            </a:r>
+            <a:r>
+              <a:rPr lang="en-US" sz="2400" dirty="0">
+                <a:solidFill>
+                  <a:srgbClr val="0000FF"/>
+                </a:solidFill>
+                <a:latin typeface="Consolas"/>
+              </a:rPr>
+              <a:t>&gt;</a:t>
+            </a:r>
+            <a:r>
+              <a:rPr lang="en-US" sz="2400" dirty="0">
+                <a:solidFill>
+                  <a:srgbClr val="000000"/>
+                </a:solidFill>
+                <a:latin typeface="Consolas"/>
+              </a:rPr>
+              <a:t>/9j/4AAQSkZJRgABAgEAAAAAA...</a:t>
+            </a:r>
+            <a:r>
+              <a:rPr lang="en-US" sz="2400" dirty="0" err="1">
+                <a:solidFill>
+                  <a:srgbClr val="000000"/>
+                </a:solidFill>
+                <a:latin typeface="Consolas"/>
+              </a:rPr>
+              <a:t>PnOgkECAgYgQQICCQIIH</a:t>
+            </a:r>
+            <a:r>
+              <a:rPr lang="en-US" sz="2400" dirty="0">
+                <a:solidFill>
+                  <a:srgbClr val="000000"/>
+                </a:solidFill>
+                <a:latin typeface="Consolas"/>
+              </a:rPr>
+              <a:t>/2Q==</a:t>
+            </a:r>
+            <a:r>
+              <a:rPr lang="en-US" sz="2400" dirty="0">
+                <a:solidFill>
+                  <a:srgbClr val="0000FF"/>
+                </a:solidFill>
+                <a:latin typeface="Consolas"/>
+              </a:rPr>
+              <a:t>&lt;/</a:t>
+            </a:r>
+            <a:r>
+              <a:rPr lang="en-US" sz="2400" dirty="0">
+                <a:solidFill>
+                  <a:srgbClr val="800000"/>
+                </a:solidFill>
+                <a:latin typeface="Consolas"/>
+              </a:rPr>
+              <a:t>cover</a:t>
+            </a:r>
+            <a:r>
+              <a:rPr lang="en-US" sz="2400" dirty="0">
+                <a:solidFill>
+                  <a:srgbClr val="0000FF"/>
+                </a:solidFill>
+                <a:latin typeface="Consolas"/>
+              </a:rPr>
+              <a:t>&gt;</a:t>
+            </a:r>
+            <a:endParaRPr lang="en-US" sz="2400" dirty="0">
+              <a:solidFill>
+                <a:srgbClr val="000000"/>
+              </a:solidFill>
+              <a:latin typeface="Consolas"/>
+            </a:endParaRPr>
+          </a:p>
+          <a:p>
+            <a:pPr marL="0" indent="0">
+              <a:buNone/>
+            </a:pPr>
+            <a:r>
+              <a:rPr lang="en-US" sz="2400" dirty="0">
+                <a:solidFill>
+                  <a:srgbClr val="0000FF"/>
+                </a:solidFill>
+                <a:latin typeface="Consolas"/>
+              </a:rPr>
+              <a:t>&lt;/</a:t>
+            </a:r>
+            <a:r>
+              <a:rPr lang="en-US" sz="2400" dirty="0">
+                <a:solidFill>
+                  <a:srgbClr val="800000"/>
+                </a:solidFill>
+                <a:latin typeface="Consolas"/>
+              </a:rPr>
+              <a:t>book</a:t>
+            </a:r>
+            <a:r>
+              <a:rPr lang="en-US" sz="2400" dirty="0">
+                <a:solidFill>
+                  <a:srgbClr val="0000FF"/>
+                </a:solidFill>
+                <a:latin typeface="Consolas"/>
+              </a:rPr>
+              <a:t>&gt;</a:t>
+            </a:r>
+            <a:endParaRPr lang="en-US" sz="2400" dirty="0"/>
           </a:p>
         </p:txBody>
       </p:sp>
     </p:spTree>
     <p:extLst>
       <p:ext uri="{BB962C8B-B14F-4D97-AF65-F5344CB8AC3E}">
-        <p14:creationId xmlns:p14="http://schemas.microsoft.com/office/powerpoint/2010/main" val="748900971"/>
+        <p14:creationId xmlns:p14="http://schemas.microsoft.com/office/powerpoint/2010/main" val="766526891"/>
       </p:ext>
     </p:extLst>
   </p:cSld>
@@ -5345,8 +5627,8 @@
           <a:lstStyle/>
           <a:p>
             <a:r>
-              <a:rPr lang="ru-RU" dirty="0" smtClean="0"/>
-              <a:t>Способы</a:t>
+              <a:rPr lang="ru-RU" dirty="0"/>
+              <a:t>Правила разметки</a:t>
             </a:r>
             <a:endParaRPr lang="en-US" dirty="0"/>
           </a:p>
@@ -5364,118 +5646,164 @@
         </p:nvSpPr>
         <p:spPr/>
         <p:txBody>
-          <a:bodyPr/>
+          <a:bodyPr>
+            <a:normAutofit/>
+          </a:bodyPr>
           <a:lstStyle/>
           <a:p>
-            <a:r>
-              <a:rPr lang="en-US" dirty="0"/>
-              <a:t>DTD – </a:t>
-            </a:r>
-            <a:r>
-              <a:rPr lang="en-US" dirty="0">
-                <a:solidFill>
-                  <a:srgbClr val="FF0000"/>
-                </a:solidFill>
-              </a:rPr>
-              <a:t>D</a:t>
-            </a:r>
-            <a:r>
-              <a:rPr lang="en-US" dirty="0"/>
-              <a:t>ocument </a:t>
-            </a:r>
-            <a:r>
-              <a:rPr lang="en-US" dirty="0">
-                <a:solidFill>
-                  <a:srgbClr val="FF0000"/>
-                </a:solidFill>
-              </a:rPr>
-              <a:t>T</a:t>
-            </a:r>
-            <a:r>
-              <a:rPr lang="en-US" dirty="0"/>
-              <a:t>ype </a:t>
-            </a:r>
-            <a:r>
-              <a:rPr lang="en-US" dirty="0" smtClean="0">
-                <a:solidFill>
-                  <a:srgbClr val="FF0000"/>
-                </a:solidFill>
-              </a:rPr>
-              <a:t>D</a:t>
-            </a:r>
-            <a:r>
-              <a:rPr lang="en-US" dirty="0" smtClean="0"/>
-              <a:t>efinition</a:t>
-            </a:r>
-            <a:endParaRPr lang="ru-RU" dirty="0" smtClean="0"/>
-          </a:p>
-          <a:p>
-            <a:r>
-              <a:rPr lang="en-US" dirty="0"/>
-              <a:t>XML </a:t>
-            </a:r>
-            <a:r>
-              <a:rPr lang="en-US" dirty="0" smtClean="0"/>
-              <a:t>Schema</a:t>
-            </a:r>
-            <a:r>
-              <a:rPr lang="ru-RU" dirty="0" smtClean="0"/>
+            <a:pPr lvl="0"/>
+            <a:r>
+              <a:rPr lang="ru-RU" sz="1800" dirty="0"/>
+              <a:t>Все элементы должны быть закрыты</a:t>
+            </a:r>
+            <a:endParaRPr lang="en-US" sz="1800" dirty="0"/>
+          </a:p>
+          <a:p>
+            <a:pPr lvl="0"/>
+            <a:r>
+              <a:rPr lang="ru-RU" sz="1800" dirty="0"/>
+              <a:t>Корневой элемент может быть только один</a:t>
+            </a:r>
+            <a:endParaRPr lang="en-US" sz="1800" dirty="0"/>
+          </a:p>
+          <a:p>
+            <a:pPr lvl="0"/>
+            <a:r>
+              <a:rPr lang="ru-RU" sz="1800" dirty="0"/>
+              <a:t>Регистр имеет значение (&lt;</a:t>
+            </a:r>
+            <a:r>
+              <a:rPr lang="en-US" sz="1800" dirty="0"/>
+              <a:t>book</a:t>
+            </a:r>
+            <a:r>
+              <a:rPr lang="ru-RU" sz="1800" dirty="0"/>
+              <a:t>&gt; != &lt;</a:t>
+            </a:r>
+            <a:r>
+              <a:rPr lang="en-US" sz="1800" dirty="0"/>
+              <a:t>Book</a:t>
+            </a:r>
+            <a:r>
+              <a:rPr lang="ru-RU" sz="1800" dirty="0"/>
+              <a:t>&gt;)</a:t>
+            </a:r>
+            <a:endParaRPr lang="en-US" sz="1800" dirty="0"/>
+          </a:p>
+          <a:p>
+            <a:pPr lvl="0"/>
+            <a:r>
+              <a:rPr lang="ru-RU" sz="1800" dirty="0"/>
+              <a:t>Закрывать нужно в порядке обратном порядку открытия</a:t>
+            </a:r>
+            <a:endParaRPr lang="en-US" sz="1800" dirty="0"/>
+          </a:p>
+          <a:p>
+            <a:pPr lvl="0"/>
+            <a:r>
+              <a:rPr lang="ru-RU" sz="1800" dirty="0"/>
+              <a:t>Значения атрибутов должны быть заключены </a:t>
+            </a:r>
+            <a:r>
+              <a:rPr lang="ru-RU" sz="1800" dirty="0" smtClean="0"/>
+              <a:t>в </a:t>
+            </a:r>
+            <a:r>
+              <a:rPr lang="ru-RU" sz="1800" dirty="0"/>
+              <a:t>кавычки</a:t>
+            </a:r>
+            <a:endParaRPr lang="en-US" sz="1800" dirty="0"/>
+          </a:p>
+          <a:p>
+            <a:r>
+              <a:rPr lang="ru-RU" sz="1800" dirty="0"/>
+              <a:t>При необходимости должна быть указана </a:t>
+            </a:r>
+            <a:r>
+              <a:rPr lang="ru-RU" sz="1800" dirty="0" smtClean="0"/>
+              <a:t>кодировка</a:t>
+            </a:r>
+          </a:p>
+          <a:p>
+            <a:endParaRPr lang="ru-RU" sz="1800" dirty="0"/>
+          </a:p>
+          <a:p>
+            <a:pPr marL="0" indent="0">
+              <a:buNone/>
+            </a:pPr>
+            <a:r>
+              <a:rPr lang="ru-RU" sz="1800" dirty="0"/>
+              <a:t>Документ выполнящий все эти правила называется синтаксически </a:t>
+            </a:r>
+            <a:r>
+              <a:rPr lang="ru-RU" sz="1800" i="1" dirty="0"/>
+              <a:t>верным</a:t>
+            </a:r>
+            <a:r>
+              <a:rPr lang="ru-RU" sz="1800" dirty="0"/>
               <a:t> (</a:t>
             </a:r>
             <a:r>
-              <a:rPr lang="en-US" dirty="0" smtClean="0"/>
-              <a:t>XSD)</a:t>
-            </a:r>
-          </a:p>
-          <a:p>
-            <a:pPr lvl="1"/>
-            <a:r>
-              <a:rPr lang="en-US" dirty="0">
-                <a:hlinkClick r:id="rId2"/>
-              </a:rPr>
-              <a:t>W3C XML Schema Definition Language (XSD) 1.1 Part 1: Structures</a:t>
-            </a:r>
-            <a:endParaRPr lang="en-US" dirty="0"/>
-          </a:p>
-          <a:p>
-            <a:pPr lvl="1"/>
-            <a:r>
-              <a:rPr lang="en-US" dirty="0">
-                <a:hlinkClick r:id="rId3"/>
-              </a:rPr>
-              <a:t>W3C XML Schema Definition Language (XSD) 1.1 Part 2: </a:t>
-            </a:r>
-            <a:r>
-              <a:rPr lang="en-US" dirty="0" err="1">
-                <a:hlinkClick r:id="rId3"/>
-              </a:rPr>
-              <a:t>Datatypes</a:t>
-            </a:r>
-            <a:endParaRPr lang="en-US" dirty="0"/>
-          </a:p>
-          <a:p>
-            <a:endParaRPr lang="en-US" dirty="0" smtClean="0"/>
+              <a:rPr lang="ru-RU" sz="1800" i="1" dirty="0"/>
+              <a:t>well-formed</a:t>
+            </a:r>
+            <a:r>
+              <a:rPr lang="ru-RU" sz="1800" dirty="0"/>
+              <a:t>). Если документ дополнительно соответствует </a:t>
+            </a:r>
+            <a:r>
+              <a:rPr lang="en-US" sz="1800" dirty="0"/>
+              <a:t>DTD </a:t>
+            </a:r>
+            <a:r>
+              <a:rPr lang="ru-RU" sz="1800" dirty="0"/>
+              <a:t>или </a:t>
+            </a:r>
+            <a:r>
+              <a:rPr lang="en-US" sz="1800" dirty="0"/>
+              <a:t>XML Schema</a:t>
+            </a:r>
+            <a:r>
+              <a:rPr lang="ru-RU" sz="1800" dirty="0"/>
+              <a:t>, то он называется </a:t>
+            </a:r>
+            <a:r>
+              <a:rPr lang="ru-RU" sz="1800" i="1" dirty="0"/>
+              <a:t>правильным</a:t>
+            </a:r>
+            <a:r>
+              <a:rPr lang="ru-RU" sz="1800" dirty="0"/>
+              <a:t> (</a:t>
+            </a:r>
+            <a:r>
+              <a:rPr lang="ru-RU" sz="1800" i="1" dirty="0"/>
+              <a:t>valid</a:t>
+            </a:r>
+            <a:r>
+              <a:rPr lang="ru-RU" sz="1800" dirty="0"/>
+              <a:t>).</a:t>
+            </a:r>
+            <a:endParaRPr lang="en-US" sz="1800" dirty="0"/>
           </a:p>
         </p:txBody>
       </p:sp>
     </p:spTree>
     <p:extLst>
       <p:ext uri="{BB962C8B-B14F-4D97-AF65-F5344CB8AC3E}">
-        <p14:creationId xmlns:p14="http://schemas.microsoft.com/office/powerpoint/2010/main" val="3193560450"/>
+        <p14:creationId xmlns:p14="http://schemas.microsoft.com/office/powerpoint/2010/main" val="748900971"/>
       </p:ext>
     </p:extLst>
   </p:cSld>
   <p:clrMapOvr>
     <a:masterClrMapping/>
   </p:clrMapOvr>
-  <mc:AlternateContent xmlns:mc="http://schemas.openxmlformats.org/markup-compatibility/2006" xmlns:p14="http://schemas.microsoft.com/office/powerpoint/2010/main">
-    <mc:Choice Requires="p14">
-      <p:transition spd="slow" p14:dur="2000"/>
-    </mc:Choice>
-    <mc:Fallback xmlns="">
-      <p:transition spd="slow"/>
-    </mc:Fallback>
-  </mc:AlternateContent>
+  <p:timing>
+    <p:tnLst>
+      <p:par>
+        <p:cTn id="1" dur="indefinite" restart="never" nodeType="tmRoot"/>
+      </p:par>
+    </p:tnLst>
+  </p:timing>
 </p:sld>
 </file>
 
@@ -5508,70 +5836,14 @@
         </p:nvSpPr>
         <p:spPr/>
         <p:txBody>
-          <a:bodyPr>
-            <a:normAutofit fontScale="90000"/>
-          </a:bodyPr>
+          <a:bodyPr/>
           <a:lstStyle/>
           <a:p>
             <a:r>
-              <a:rPr lang="en-US" dirty="0" smtClean="0"/>
-              <a:t>XSLT - E</a:t>
-            </a:r>
-            <a:r>
-              <a:rPr lang="en-US" dirty="0" smtClean="0">
-                <a:solidFill>
-                  <a:srgbClr val="FF0000"/>
-                </a:solidFill>
-              </a:rPr>
-              <a:t>x</a:t>
-            </a:r>
-            <a:r>
-              <a:rPr lang="en-US" dirty="0" smtClean="0"/>
-              <a:t>tensible </a:t>
-            </a:r>
-            <a:r>
-              <a:rPr lang="en-US" dirty="0" err="1">
-                <a:solidFill>
-                  <a:srgbClr val="FF0000"/>
-                </a:solidFill>
-              </a:rPr>
-              <a:t>S</a:t>
-            </a:r>
-            <a:r>
-              <a:rPr lang="en-US" dirty="0" err="1"/>
-              <a:t>tylesheet</a:t>
-            </a:r>
-            <a:r>
-              <a:rPr lang="en-US" dirty="0"/>
-              <a:t> </a:t>
-            </a:r>
-            <a:r>
-              <a:rPr lang="en-US" dirty="0">
-                <a:solidFill>
-                  <a:srgbClr val="FF0000"/>
-                </a:solidFill>
-              </a:rPr>
-              <a:t>L</a:t>
-            </a:r>
-            <a:r>
-              <a:rPr lang="en-US" dirty="0"/>
-              <a:t>anguage</a:t>
-            </a:r>
-            <a:br>
-              <a:rPr lang="en-US" dirty="0"/>
-            </a:br>
-            <a:r>
-              <a:rPr lang="en-US" dirty="0">
-                <a:solidFill>
-                  <a:srgbClr val="FF0000"/>
-                </a:solidFill>
-              </a:rPr>
-              <a:t>T</a:t>
-            </a:r>
-            <a:r>
-              <a:rPr lang="en-US" dirty="0"/>
-              <a:t>ransformations</a:t>
-            </a:r>
+              <a:rPr lang="ru-RU" dirty="0" smtClean="0"/>
+              <a:t>Способы</a:t>
+            </a:r>
+            <a:endParaRPr lang="en-US" dirty="0"/>
           </a:p>
         </p:txBody>
       </p:sp>
@@ -5591,47 +5863,121 @@
           <a:lstStyle/>
           <a:p>
             <a:r>
+              <a:rPr lang="en-US" dirty="0"/>
+              <a:t>DTD – </a:t>
+            </a:r>
+            <a:r>
+              <a:rPr lang="en-US" dirty="0">
+                <a:solidFill>
+                  <a:srgbClr val="FF0000"/>
+                </a:solidFill>
+              </a:rPr>
+              <a:t>D</a:t>
+            </a:r>
+            <a:r>
+              <a:rPr lang="en-US" dirty="0"/>
+              <a:t>ocument </a:t>
+            </a:r>
+            <a:r>
+              <a:rPr lang="en-US" dirty="0">
+                <a:solidFill>
+                  <a:srgbClr val="FF0000"/>
+                </a:solidFill>
+              </a:rPr>
+              <a:t>T</a:t>
+            </a:r>
+            <a:r>
+              <a:rPr lang="en-US" dirty="0"/>
+              <a:t>ype </a:t>
+            </a:r>
+            <a:r>
+              <a:rPr lang="en-US" dirty="0" smtClean="0">
+                <a:solidFill>
+                  <a:srgbClr val="FF0000"/>
+                </a:solidFill>
+              </a:rPr>
+              <a:t>D</a:t>
+            </a:r>
+            <a:r>
+              <a:rPr lang="en-US" dirty="0" smtClean="0"/>
+              <a:t>efinition</a:t>
+            </a:r>
+            <a:endParaRPr lang="ru-RU" dirty="0" smtClean="0"/>
+          </a:p>
+          <a:p>
+            <a:r>
+              <a:rPr lang="en-US" dirty="0"/>
+              <a:t>XML </a:t>
+            </a:r>
+            <a:r>
+              <a:rPr lang="en-US" dirty="0" smtClean="0"/>
+              <a:t>Schema</a:t>
+            </a:r>
+            <a:r>
               <a:rPr lang="ru-RU" dirty="0" smtClean="0"/>
-              <a:t>Позволяет производить трансформации одного документа в другой</a:t>
+              <a:t> (</a:t>
             </a:r>
             <a:r>
               <a:rPr lang="en-US" dirty="0" smtClean="0"/>
-              <a:t>, </a:t>
-            </a:r>
-            <a:r>
-              <a:rPr lang="ru-RU" dirty="0"/>
-              <a:t>а </a:t>
-            </a:r>
-            <a:r>
-              <a:rPr lang="ru-RU" dirty="0" smtClean="0"/>
-              <a:t>также в другие форматы.</a:t>
-            </a:r>
-          </a:p>
-          <a:p>
-            <a:r>
-              <a:rPr lang="ru-RU" dirty="0" smtClean="0"/>
-              <a:t>Основан на </a:t>
-            </a:r>
-            <a:r>
-              <a:rPr lang="en-US" dirty="0" smtClean="0"/>
-              <a:t>XML</a:t>
-            </a:r>
-          </a:p>
-          <a:p>
+              <a:t>XSD)</a:t>
+            </a:r>
+          </a:p>
+          <a:p>
+            <a:pPr lvl="1"/>
+            <a:r>
+              <a:rPr lang="en-US" dirty="0">
+                <a:hlinkClick r:id="rId2"/>
+              </a:rPr>
+              <a:t>W3C XML Schema Definition Language (XSD) 1.1 Part 1: Structures</a:t>
+            </a:r>
             <a:endParaRPr lang="en-US" dirty="0"/>
+          </a:p>
+          <a:p>
+            <a:pPr lvl="1"/>
+            <a:r>
+              <a:rPr lang="en-US" dirty="0">
+                <a:hlinkClick r:id="rId3"/>
+              </a:rPr>
+              <a:t>W3C XML Schema Definition Language (XSD) 1.1 Part 2: </a:t>
+            </a:r>
+            <a:r>
+              <a:rPr lang="en-US" dirty="0" err="1">
+                <a:hlinkClick r:id="rId3"/>
+              </a:rPr>
+              <a:t>Datatypes</a:t>
+            </a:r>
+            <a:endParaRPr lang="en-US" dirty="0"/>
+          </a:p>
+          <a:p>
+            <a:endParaRPr lang="en-US" dirty="0" smtClean="0"/>
           </a:p>
         </p:txBody>
       </p:sp>
     </p:spTree>
     <p:extLst>
       <p:ext uri="{BB962C8B-B14F-4D97-AF65-F5344CB8AC3E}">
-        <p14:creationId xmlns:p14="http://schemas.microsoft.com/office/powerpoint/2010/main" val="103880850"/>
+        <p14:creationId xmlns:p14="http://schemas.microsoft.com/office/powerpoint/2010/main" val="3193560450"/>
       </p:ext>
     </p:extLst>
   </p:cSld>
   <p:clrMapOvr>
     <a:masterClrMapping/>
   </p:clrMapOvr>
+  <mc:AlternateContent xmlns:mc="http://schemas.openxmlformats.org/markup-compatibility/2006" xmlns:p14="http://schemas.microsoft.com/office/powerpoint/2010/main">
+    <mc:Choice Requires="p14">
+      <p:transition spd="slow" p14:dur="2000"/>
+    </mc:Choice>
+    <mc:Fallback xmlns="">
+      <p:transition spd="slow"/>
+    </mc:Fallback>
+  </mc:AlternateContent>
+  <p:timing>
+    <p:tnLst>
+      <p:par>
+        <p:cTn id="1" dur="indefinite" restart="never" nodeType="tmRoot"/>
+      </p:par>
+    </p:tnLst>
+  </p:timing>
 </p:sld>
 </file>
 
@@ -5670,22 +6016,64 @@
           <a:lstStyle/>
           <a:p>
             <a:r>
-              <a:rPr lang="en-US" dirty="0" err="1" smtClean="0"/>
-              <a:t>XPath</a:t>
-            </a:r>
-            <a:r>
-              <a:rPr lang="ru-RU" dirty="0" smtClean="0"/>
-              <a:t> – Язык для поиска элементов в </a:t>
-            </a:r>
-            <a:r>
               <a:rPr lang="en-US" dirty="0" smtClean="0"/>
-              <a:t>XML </a:t>
-            </a:r>
-            <a:r>
-              <a:rPr lang="ru-RU" dirty="0" smtClean="0"/>
-              <a:t>документе</a:t>
-            </a:r>
-            <a:endParaRPr lang="en-US" dirty="0"/>
+              <a:t>XSLT - E</a:t>
+            </a:r>
+            <a:r>
+              <a:rPr lang="en-US" dirty="0" smtClean="0">
+                <a:solidFill>
+                  <a:srgbClr val="FF0000"/>
+                </a:solidFill>
+              </a:rPr>
+              <a:t>x</a:t>
+            </a:r>
+            <a:r>
+              <a:rPr lang="en-US" dirty="0" smtClean="0"/>
+              <a:t>tensible </a:t>
+            </a:r>
+            <a:r>
+              <a:rPr lang="en-US" dirty="0" err="1">
+                <a:solidFill>
+                  <a:srgbClr val="FF0000"/>
+                </a:solidFill>
+              </a:rPr>
+              <a:t>S</a:t>
+            </a:r>
+            <a:r>
+              <a:rPr lang="en-US" dirty="0" err="1"/>
+              <a:t>tylesheet</a:t>
+            </a:r>
+            <a:r>
+              <a:rPr lang="en-US" dirty="0"/>
+              <a:t> </a:t>
+            </a:r>
+            <a:r>
+              <a:rPr lang="en-US" dirty="0">
+                <a:solidFill>
+                  <a:srgbClr val="FF0000"/>
+                </a:solidFill>
+              </a:rPr>
+              <a:t>L</a:t>
+            </a:r>
+            <a:r>
+              <a:rPr lang="en-US" dirty="0"/>
+              <a:t>anguage</a:t>
+            </a:r>
+            <a:br>
+              <a:rPr lang="en-US" dirty="0"/>
+            </a:br>
+            <a:r>
+              <a:rPr lang="en-US" dirty="0">
+                <a:solidFill>
+                  <a:srgbClr val="FF0000"/>
+                </a:solidFill>
+              </a:rPr>
+              <a:t>T</a:t>
+            </a:r>
+            <a:r>
+              <a:rPr lang="en-US" dirty="0"/>
+              <a:t>ransformations</a:t>
+            </a:r>
           </a:p>
         </p:txBody>
       </p:sp>
@@ -5705,6 +6093,120 @@
           <a:lstStyle/>
           <a:p>
             <a:r>
+              <a:rPr lang="ru-RU" dirty="0" smtClean="0"/>
+              <a:t>Позволяет производить трансформации одного документа в другой</a:t>
+            </a:r>
+            <a:r>
+              <a:rPr lang="en-US" dirty="0" smtClean="0"/>
+              <a:t>, </a:t>
+            </a:r>
+            <a:r>
+              <a:rPr lang="ru-RU" dirty="0"/>
+              <a:t>а </a:t>
+            </a:r>
+            <a:r>
+              <a:rPr lang="ru-RU" dirty="0" smtClean="0"/>
+              <a:t>также в другие форматы.</a:t>
+            </a:r>
+          </a:p>
+          <a:p>
+            <a:r>
+              <a:rPr lang="ru-RU" dirty="0" smtClean="0"/>
+              <a:t>Основан на </a:t>
+            </a:r>
+            <a:r>
+              <a:rPr lang="en-US" dirty="0" smtClean="0"/>
+              <a:t>XML</a:t>
+            </a:r>
+          </a:p>
+          <a:p>
+            <a:endParaRPr lang="en-US" dirty="0"/>
+          </a:p>
+        </p:txBody>
+      </p:sp>
+    </p:spTree>
+    <p:extLst>
+      <p:ext uri="{BB962C8B-B14F-4D97-AF65-F5344CB8AC3E}">
+        <p14:creationId xmlns:p14="http://schemas.microsoft.com/office/powerpoint/2010/main" val="103880850"/>
+      </p:ext>
+    </p:extLst>
+  </p:cSld>
+  <p:clrMapOvr>
+    <a:masterClrMapping/>
+  </p:clrMapOvr>
+</p:sld>
+</file>
+
+<file path=ppt/slides/slide19.xml><?xml version="1.0" encoding="utf-8"?>
+<p:sld xmlns:a="http://schemas.openxmlformats.org/drawingml/2006/main" xmlns:r="http://schemas.openxmlformats.org/officeDocument/2006/relationships" xmlns:p="http://schemas.openxmlformats.org/presentationml/2006/main">
+  <p:cSld>
+    <p:spTree>
+      <p:nvGrpSpPr>
+        <p:cNvPr id="1" name=""/>
+        <p:cNvGrpSpPr/>
+        <p:nvPr/>
+      </p:nvGrpSpPr>
+      <p:grpSpPr>
+        <a:xfrm>
+          <a:off x="0" y="0"/>
+          <a:ext cx="0" cy="0"/>
+          <a:chOff x="0" y="0"/>
+          <a:chExt cx="0" cy="0"/>
+        </a:xfrm>
+      </p:grpSpPr>
+      <p:sp>
+        <p:nvSpPr>
+          <p:cNvPr id="2" name="Title 1"/>
+          <p:cNvSpPr>
+            <a:spLocks noGrp="1"/>
+          </p:cNvSpPr>
+          <p:nvPr>
+            <p:ph type="title"/>
+          </p:nvPr>
+        </p:nvSpPr>
+        <p:spPr/>
+        <p:txBody>
+          <a:bodyPr>
+            <a:normAutofit fontScale="90000"/>
+          </a:bodyPr>
+          <a:lstStyle/>
+          <a:p>
+            <a:r>
+              <a:rPr lang="en-US" dirty="0" err="1" smtClean="0"/>
+              <a:t>XPath</a:t>
+            </a:r>
+            <a:r>
+              <a:rPr lang="ru-RU" dirty="0" smtClean="0"/>
+              <a:t> – Язык для поиска элементов в </a:t>
+            </a:r>
+            <a:r>
+              <a:rPr lang="en-US" dirty="0" smtClean="0"/>
+              <a:t>XML </a:t>
+            </a:r>
+            <a:r>
+              <a:rPr lang="ru-RU" dirty="0" smtClean="0"/>
+              <a:t>документе</a:t>
+            </a:r>
+            <a:endParaRPr lang="en-US" dirty="0"/>
+          </a:p>
+        </p:txBody>
+      </p:sp>
+      <p:sp>
+        <p:nvSpPr>
+          <p:cNvPr id="3" name="Content Placeholder 2"/>
+          <p:cNvSpPr>
+            <a:spLocks noGrp="1"/>
+          </p:cNvSpPr>
+          <p:nvPr>
+            <p:ph idx="1"/>
+          </p:nvPr>
+        </p:nvSpPr>
+        <p:spPr/>
+        <p:txBody>
+          <a:bodyPr/>
+          <a:lstStyle/>
+          <a:p>
+            <a:r>
               <a:rPr lang="en-US" dirty="0">
                 <a:hlinkClick r:id="rId2"/>
               </a:rPr>
@@ -5778,7 +6280,6 @@
               <a:rPr lang="en-US" dirty="0" smtClean="0"/>
               <a:t> 1.0</a:t>
             </a:r>
-            <a:endParaRPr lang="en-US" dirty="0" smtClean="0"/>
           </a:p>
         </p:txBody>
       </p:sp>
@@ -5802,7 +6303,134 @@
 </p:sld>
 </file>
 
-<file path=ppt/slides/slide19.xml><?xml version="1.0" encoding="utf-8"?>
+<file path=ppt/slides/slide2.xml><?xml version="1.0" encoding="utf-8"?>
+<p:sld xmlns:a="http://schemas.openxmlformats.org/drawingml/2006/main" xmlns:r="http://schemas.openxmlformats.org/officeDocument/2006/relationships" xmlns:p="http://schemas.openxmlformats.org/presentationml/2006/main">
+  <p:cSld>
+    <p:spTree>
+      <p:nvGrpSpPr>
+        <p:cNvPr id="1" name=""/>
+        <p:cNvGrpSpPr/>
+        <p:nvPr/>
+      </p:nvGrpSpPr>
+      <p:grpSpPr>
+        <a:xfrm>
+          <a:off x="0" y="0"/>
+          <a:ext cx="0" cy="0"/>
+          <a:chOff x="0" y="0"/>
+          <a:chExt cx="0" cy="0"/>
+        </a:xfrm>
+      </p:grpSpPr>
+      <p:sp>
+        <p:nvSpPr>
+          <p:cNvPr id="2" name="Title 1"/>
+          <p:cNvSpPr>
+            <a:spLocks noGrp="1"/>
+          </p:cNvSpPr>
+          <p:nvPr>
+            <p:ph type="title"/>
+          </p:nvPr>
+        </p:nvSpPr>
+        <p:spPr/>
+        <p:txBody>
+          <a:bodyPr/>
+          <a:lstStyle/>
+          <a:p>
+            <a:r>
+              <a:rPr lang="ru-RU" dirty="0" smtClean="0"/>
+              <a:t>Литература</a:t>
+            </a:r>
+            <a:endParaRPr lang="en-US" dirty="0"/>
+          </a:p>
+        </p:txBody>
+      </p:sp>
+      <p:sp>
+        <p:nvSpPr>
+          <p:cNvPr id="3" name="Content Placeholder 2"/>
+          <p:cNvSpPr>
+            <a:spLocks noGrp="1"/>
+          </p:cNvSpPr>
+          <p:nvPr>
+            <p:ph idx="1"/>
+          </p:nvPr>
+        </p:nvSpPr>
+        <p:spPr/>
+        <p:txBody>
+          <a:bodyPr/>
+          <a:lstStyle/>
+          <a:p>
+            <a:r>
+              <a:rPr lang="en-US" dirty="0" smtClean="0"/>
+              <a:t>Pro</a:t>
+            </a:r>
+            <a:r>
+              <a:rPr lang="ru-RU" dirty="0" smtClean="0"/>
+              <a:t> </a:t>
+            </a:r>
+            <a:r>
+              <a:rPr lang="en-US" dirty="0" smtClean="0"/>
+              <a:t>.NET 2.0</a:t>
+            </a:r>
+            <a:r>
+              <a:rPr lang="ru-RU" dirty="0" smtClean="0"/>
+              <a:t> </a:t>
+            </a:r>
+            <a:r>
+              <a:rPr lang="en-US" dirty="0" smtClean="0"/>
+              <a:t>XML</a:t>
+            </a:r>
+            <a:r>
+              <a:rPr lang="ru-RU" dirty="0" smtClean="0"/>
+              <a:t>, </a:t>
+            </a:r>
+            <a:r>
+              <a:rPr lang="en-US" dirty="0" err="1"/>
+              <a:t>Bipin</a:t>
+            </a:r>
+            <a:r>
+              <a:rPr lang="en-US" dirty="0"/>
+              <a:t> </a:t>
+            </a:r>
+            <a:r>
+              <a:rPr lang="en-US" dirty="0" smtClean="0"/>
+              <a:t>Joshi</a:t>
+            </a:r>
+            <a:r>
+              <a:rPr lang="ru-RU" dirty="0" smtClean="0"/>
+              <a:t>, </a:t>
+            </a:r>
+            <a:r>
+              <a:rPr lang="en-US" dirty="0" err="1" smtClean="0"/>
+              <a:t>Apress</a:t>
+            </a:r>
+            <a:r>
+              <a:rPr lang="en-US" dirty="0" smtClean="0"/>
+              <a:t> 2007</a:t>
+            </a:r>
+            <a:endParaRPr lang="en-US" dirty="0"/>
+          </a:p>
+        </p:txBody>
+      </p:sp>
+    </p:spTree>
+    <p:extLst>
+      <p:ext uri="{BB962C8B-B14F-4D97-AF65-F5344CB8AC3E}">
+        <p14:creationId xmlns:p14="http://schemas.microsoft.com/office/powerpoint/2010/main" val="1810951574"/>
+      </p:ext>
+    </p:extLst>
+  </p:cSld>
+  <p:clrMapOvr>
+    <a:masterClrMapping/>
+  </p:clrMapOvr>
+  <p:timing>
+    <p:tnLst>
+      <p:par>
+        <p:cTn id="1" dur="indefinite" restart="never" nodeType="tmRoot"/>
+      </p:par>
+    </p:tnLst>
+  </p:timing>
+</p:sld>
+</file>
+
+<file path=ppt/slides/slide20.xml><?xml version="1.0" encoding="utf-8"?>
 <p:sld xmlns:a="http://schemas.openxmlformats.org/drawingml/2006/main" xmlns:r="http://schemas.openxmlformats.org/officeDocument/2006/relationships" xmlns:p="http://schemas.openxmlformats.org/presentationml/2006/main">
   <p:cSld>
     <p:spTree>
@@ -7396,366 +8024,6 @@
 </p:sld>
 </file>
 
-<file path=ppt/slides/slide2.xml><?xml version="1.0" encoding="utf-8"?>
-<p:sld xmlns:a="http://schemas.openxmlformats.org/drawingml/2006/main" xmlns:r="http://schemas.openxmlformats.org/officeDocument/2006/relationships" xmlns:p="http://schemas.openxmlformats.org/presentationml/2006/main">
-  <p:cSld>
-    <p:spTree>
-      <p:nvGrpSpPr>
-        <p:cNvPr id="1" name=""/>
-        <p:cNvGrpSpPr/>
-        <p:nvPr/>
-      </p:nvGrpSpPr>
-      <p:grpSpPr>
-        <a:xfrm>
-          <a:off x="0" y="0"/>
-          <a:ext cx="0" cy="0"/>
-          <a:chOff x="0" y="0"/>
-          <a:chExt cx="0" cy="0"/>
-        </a:xfrm>
-      </p:grpSpPr>
-      <p:sp>
-        <p:nvSpPr>
-          <p:cNvPr id="2" name="Title 1"/>
-          <p:cNvSpPr>
-            <a:spLocks noGrp="1"/>
-          </p:cNvSpPr>
-          <p:nvPr>
-            <p:ph type="title"/>
-          </p:nvPr>
-        </p:nvSpPr>
-        <p:spPr/>
-        <p:txBody>
-          <a:bodyPr/>
-          <a:lstStyle/>
-          <a:p>
-            <a:r>
-              <a:rPr lang="ru-RU" dirty="0" smtClean="0"/>
-              <a:t>Литература</a:t>
-            </a:r>
-            <a:endParaRPr lang="en-US" dirty="0"/>
-          </a:p>
-        </p:txBody>
-      </p:sp>
-      <p:sp>
-        <p:nvSpPr>
-          <p:cNvPr id="3" name="Content Placeholder 2"/>
-          <p:cNvSpPr>
-            <a:spLocks noGrp="1"/>
-          </p:cNvSpPr>
-          <p:nvPr>
-            <p:ph idx="1"/>
-          </p:nvPr>
-        </p:nvSpPr>
-        <p:spPr/>
-        <p:txBody>
-          <a:bodyPr/>
-          <a:lstStyle/>
-          <a:p>
-            <a:r>
-              <a:rPr lang="en-US" dirty="0" smtClean="0"/>
-              <a:t>Pro</a:t>
-            </a:r>
-            <a:r>
-              <a:rPr lang="ru-RU" dirty="0" smtClean="0"/>
-              <a:t> </a:t>
-            </a:r>
-            <a:r>
-              <a:rPr lang="en-US" dirty="0" smtClean="0"/>
-              <a:t>.NET 2.0</a:t>
-            </a:r>
-            <a:r>
-              <a:rPr lang="ru-RU" dirty="0" smtClean="0"/>
-              <a:t> </a:t>
-            </a:r>
-            <a:r>
-              <a:rPr lang="en-US" dirty="0" smtClean="0"/>
-              <a:t>XML</a:t>
-            </a:r>
-            <a:r>
-              <a:rPr lang="ru-RU" dirty="0" smtClean="0"/>
-              <a:t>, </a:t>
-            </a:r>
-            <a:r>
-              <a:rPr lang="en-US" dirty="0" err="1"/>
-              <a:t>Bipin</a:t>
-            </a:r>
-            <a:r>
-              <a:rPr lang="en-US" dirty="0"/>
-              <a:t> </a:t>
-            </a:r>
-            <a:r>
-              <a:rPr lang="en-US" dirty="0" smtClean="0"/>
-              <a:t>Joshi</a:t>
-            </a:r>
-            <a:r>
-              <a:rPr lang="ru-RU" dirty="0" smtClean="0"/>
-              <a:t>, </a:t>
-            </a:r>
-            <a:r>
-              <a:rPr lang="en-US" dirty="0" err="1" smtClean="0"/>
-              <a:t>Apress</a:t>
-            </a:r>
-            <a:r>
-              <a:rPr lang="en-US" dirty="0" smtClean="0"/>
-              <a:t> 2007</a:t>
-            </a:r>
-            <a:endParaRPr lang="en-US" dirty="0"/>
-          </a:p>
-        </p:txBody>
-      </p:sp>
-    </p:spTree>
-    <p:extLst>
-      <p:ext uri="{BB962C8B-B14F-4D97-AF65-F5344CB8AC3E}">
-        <p14:creationId xmlns:p14="http://schemas.microsoft.com/office/powerpoint/2010/main" val="1810951574"/>
-      </p:ext>
-    </p:extLst>
-  </p:cSld>
-  <p:clrMapOvr>
-    <a:masterClrMapping/>
-  </p:clrMapOvr>
-  <p:timing>
-    <p:tnLst>
-      <p:par>
-        <p:cTn id="1" dur="indefinite" restart="never" nodeType="tmRoot"/>
-      </p:par>
-    </p:tnLst>
-  </p:timing>
-</p:sld>
-</file>
-
-<file path=ppt/slides/slide20.xml><?xml version="1.0" encoding="utf-8"?>
-<p:sld xmlns:a="http://schemas.openxmlformats.org/drawingml/2006/main" xmlns:r="http://schemas.openxmlformats.org/officeDocument/2006/relationships" xmlns:p="http://schemas.openxmlformats.org/presentationml/2006/main">
-  <p:cSld>
-    <p:spTree>
-      <p:nvGrpSpPr>
-        <p:cNvPr id="1" name=""/>
-        <p:cNvGrpSpPr/>
-        <p:nvPr/>
-      </p:nvGrpSpPr>
-      <p:grpSpPr>
-        <a:xfrm>
-          <a:off x="0" y="0"/>
-          <a:ext cx="0" cy="0"/>
-          <a:chOff x="0" y="0"/>
-          <a:chExt cx="0" cy="0"/>
-        </a:xfrm>
-      </p:grpSpPr>
-      <p:sp>
-        <p:nvSpPr>
-          <p:cNvPr id="2" name="Title 1"/>
-          <p:cNvSpPr>
-            <a:spLocks noGrp="1"/>
-          </p:cNvSpPr>
-          <p:nvPr>
-            <p:ph type="title"/>
-          </p:nvPr>
-        </p:nvSpPr>
-        <p:spPr/>
-        <p:txBody>
-          <a:bodyPr/>
-          <a:lstStyle/>
-          <a:p>
-            <a:r>
-              <a:rPr lang="en-US" dirty="0" smtClean="0"/>
-              <a:t>DOM &amp; SAX</a:t>
-            </a:r>
-            <a:endParaRPr lang="ru-RU" dirty="0"/>
-          </a:p>
-        </p:txBody>
-      </p:sp>
-      <p:sp>
-        <p:nvSpPr>
-          <p:cNvPr id="3" name="Content Placeholder 2"/>
-          <p:cNvSpPr>
-            <a:spLocks noGrp="1"/>
-          </p:cNvSpPr>
-          <p:nvPr>
-            <p:ph idx="1"/>
-          </p:nvPr>
-        </p:nvSpPr>
-        <p:spPr/>
-        <p:txBody>
-          <a:bodyPr>
-            <a:normAutofit lnSpcReduction="10000"/>
-          </a:bodyPr>
-          <a:lstStyle/>
-          <a:p>
-            <a:r>
-              <a:rPr lang="en-US" dirty="0" smtClean="0"/>
-              <a:t>DOM – </a:t>
-            </a:r>
-            <a:r>
-              <a:rPr lang="en-US" dirty="0" smtClean="0">
-                <a:solidFill>
-                  <a:srgbClr val="FF0000"/>
-                </a:solidFill>
-              </a:rPr>
-              <a:t>D</a:t>
-            </a:r>
-            <a:r>
-              <a:rPr lang="en-US" dirty="0" smtClean="0"/>
-              <a:t>ocument </a:t>
-            </a:r>
-            <a:r>
-              <a:rPr lang="en-US" dirty="0" smtClean="0">
-                <a:solidFill>
-                  <a:srgbClr val="FF0000"/>
-                </a:solidFill>
-              </a:rPr>
-              <a:t>O</a:t>
-            </a:r>
-            <a:r>
-              <a:rPr lang="en-US" dirty="0" smtClean="0"/>
-              <a:t>bject </a:t>
-            </a:r>
-            <a:r>
-              <a:rPr lang="en-US" dirty="0" smtClean="0">
-                <a:solidFill>
-                  <a:srgbClr val="FF0000"/>
-                </a:solidFill>
-              </a:rPr>
-              <a:t>M</a:t>
-            </a:r>
-            <a:r>
-              <a:rPr lang="en-US" dirty="0" smtClean="0"/>
-              <a:t>odel</a:t>
-            </a:r>
-          </a:p>
-          <a:p>
-            <a:pPr lvl="1"/>
-            <a:r>
-              <a:rPr lang="ru-RU" dirty="0" smtClean="0"/>
-              <a:t>Класс </a:t>
-            </a:r>
-            <a:r>
-              <a:rPr lang="en-US" dirty="0" err="1" smtClean="0"/>
-              <a:t>System.Xml.XmlDocument</a:t>
-            </a:r>
-            <a:endParaRPr lang="en-US" dirty="0" smtClean="0"/>
-          </a:p>
-          <a:p>
-            <a:pPr lvl="1"/>
-            <a:r>
-              <a:rPr lang="ru-RU" dirty="0" smtClean="0"/>
-              <a:t>Загружает </a:t>
-            </a:r>
-            <a:r>
-              <a:rPr lang="en-US" dirty="0" smtClean="0"/>
-              <a:t>XML </a:t>
-            </a:r>
-            <a:r>
-              <a:rPr lang="ru-RU" dirty="0"/>
-              <a:t>документ </a:t>
-            </a:r>
-            <a:r>
-              <a:rPr lang="ru-RU" dirty="0" smtClean="0"/>
-              <a:t>целиком в память</a:t>
-            </a:r>
-          </a:p>
-          <a:p>
-            <a:pPr lvl="1"/>
-            <a:r>
-              <a:rPr lang="ru-RU" dirty="0" smtClean="0"/>
-              <a:t>Позволяет одновременно читать и изменять </a:t>
-            </a:r>
-            <a:r>
-              <a:rPr lang="en-US" dirty="0" smtClean="0"/>
-              <a:t>XML</a:t>
-            </a:r>
-            <a:endParaRPr lang="en-US" dirty="0" smtClean="0"/>
-          </a:p>
-          <a:p>
-            <a:r>
-              <a:rPr lang="en-US" dirty="0" smtClean="0"/>
-              <a:t>SAX – </a:t>
-            </a:r>
-            <a:r>
-              <a:rPr lang="en-US" dirty="0" smtClean="0">
-                <a:solidFill>
-                  <a:srgbClr val="FF0000"/>
-                </a:solidFill>
-              </a:rPr>
-              <a:t>S</a:t>
-            </a:r>
-            <a:r>
-              <a:rPr lang="en-US" dirty="0" smtClean="0"/>
-              <a:t>imple </a:t>
-            </a:r>
-            <a:r>
-              <a:rPr lang="en-US" dirty="0" smtClean="0">
-                <a:solidFill>
-                  <a:srgbClr val="FF0000"/>
-                </a:solidFill>
-              </a:rPr>
-              <a:t>A</a:t>
-            </a:r>
-            <a:r>
-              <a:rPr lang="en-US" dirty="0" smtClean="0"/>
-              <a:t>PI for </a:t>
-            </a:r>
-            <a:r>
-              <a:rPr lang="en-US" dirty="0" smtClean="0">
-                <a:solidFill>
-                  <a:srgbClr val="FF0000"/>
-                </a:solidFill>
-              </a:rPr>
-              <a:t>X</a:t>
-            </a:r>
-            <a:r>
-              <a:rPr lang="en-US" dirty="0" smtClean="0"/>
-              <a:t>ML</a:t>
-            </a:r>
-          </a:p>
-          <a:p>
-            <a:pPr lvl="1"/>
-            <a:r>
-              <a:rPr lang="ru-RU" dirty="0" smtClean="0"/>
-              <a:t>Классы </a:t>
-            </a:r>
-            <a:r>
-              <a:rPr lang="en-US" dirty="0" err="1" smtClean="0"/>
-              <a:t>System.Xml.XmlReader</a:t>
-            </a:r>
-            <a:r>
-              <a:rPr lang="en-US" dirty="0"/>
-              <a:t>/ </a:t>
-            </a:r>
-            <a:r>
-              <a:rPr lang="en-US" dirty="0" err="1" smtClean="0"/>
-              <a:t>System.Xml.XmlWriter</a:t>
-            </a:r>
-            <a:endParaRPr lang="ru-RU" dirty="0" smtClean="0"/>
-          </a:p>
-          <a:p>
-            <a:pPr lvl="1"/>
-            <a:r>
-              <a:rPr lang="ru-RU" dirty="0" smtClean="0"/>
-              <a:t>Работа идет</a:t>
-            </a:r>
-            <a:endParaRPr lang="ru-RU" dirty="0"/>
-          </a:p>
-        </p:txBody>
-      </p:sp>
-    </p:spTree>
-    <p:extLst>
-      <p:ext uri="{BB962C8B-B14F-4D97-AF65-F5344CB8AC3E}">
-        <p14:creationId xmlns:p14="http://schemas.microsoft.com/office/powerpoint/2010/main" val="786506698"/>
-      </p:ext>
-    </p:extLst>
-  </p:cSld>
-  <p:clrMapOvr>
-    <a:masterClrMapping/>
-  </p:clrMapOvr>
-  <p:timing>
-    <p:tnLst>
-      <p:par>
-        <p:cTn id="1" dur="indefinite" restart="never" nodeType="tmRoot"/>
-      </p:par>
-    </p:tnLst>
-  </p:timing>
-</p:sld>
-</file>
-
 <file path=ppt/slides/slide21.xml><?xml version="1.0" encoding="utf-8"?>
 <p:sld xmlns:a="http://schemas.openxmlformats.org/drawingml/2006/main" xmlns:r="http://schemas.openxmlformats.org/officeDocument/2006/relationships" xmlns:p="http://schemas.openxmlformats.org/presentationml/2006/main">
   <p:cSld>
@@ -7790,11 +8058,7 @@
           <a:p>
             <a:r>
               <a:rPr lang="en-US" dirty="0" smtClean="0"/>
-              <a:t>XML </a:t>
-            </a:r>
-            <a:r>
-              <a:rPr lang="ru-RU" dirty="0" smtClean="0"/>
-              <a:t>комментарии</a:t>
+              <a:t>DOM &amp; SAX</a:t>
             </a:r>
             <a:endParaRPr lang="ru-RU" dirty="0"/>
           </a:p>
@@ -7813,144 +8077,169 @@
         <p:spPr/>
         <p:txBody>
           <a:bodyPr>
-            <a:normAutofit fontScale="85000" lnSpcReduction="20000"/>
+            <a:normAutofit lnSpcReduction="10000"/>
           </a:bodyPr>
           <a:lstStyle/>
           <a:p>
-            <a:pPr marL="0" indent="0">
-              <a:buNone/>
-            </a:pPr>
+            <a:r>
+              <a:rPr lang="en-US" dirty="0" smtClean="0"/>
+              <a:t>DOM – </a:t>
+            </a:r>
+            <a:r>
+              <a:rPr lang="en-US" dirty="0" smtClean="0">
+                <a:solidFill>
+                  <a:srgbClr val="FF0000"/>
+                </a:solidFill>
+              </a:rPr>
+              <a:t>D</a:t>
+            </a:r>
+            <a:r>
+              <a:rPr lang="en-US" dirty="0" smtClean="0"/>
+              <a:t>ocument </a:t>
+            </a:r>
+            <a:r>
+              <a:rPr lang="en-US" dirty="0" smtClean="0">
+                <a:solidFill>
+                  <a:srgbClr val="FF0000"/>
+                </a:solidFill>
+              </a:rPr>
+              <a:t>O</a:t>
+            </a:r>
+            <a:r>
+              <a:rPr lang="en-US" dirty="0" smtClean="0"/>
+              <a:t>bject </a:t>
+            </a:r>
+            <a:r>
+              <a:rPr lang="en-US" dirty="0" smtClean="0">
+                <a:solidFill>
+                  <a:srgbClr val="FF0000"/>
+                </a:solidFill>
+              </a:rPr>
+              <a:t>M</a:t>
+            </a:r>
+            <a:r>
+              <a:rPr lang="en-US" dirty="0" smtClean="0"/>
+              <a:t>odel</a:t>
+            </a:r>
+          </a:p>
+          <a:p>
+            <a:pPr lvl="1"/>
+            <a:r>
+              <a:rPr lang="ru-RU" dirty="0" smtClean="0"/>
+              <a:t>Класс </a:t>
+            </a:r>
+            <a:r>
+              <a:rPr lang="en-US" dirty="0" err="1" smtClean="0"/>
+              <a:t>System.Xml.XmlDocument</a:t>
+            </a:r>
+            <a:endParaRPr lang="en-US" dirty="0" smtClean="0"/>
+          </a:p>
+          <a:p>
+            <a:pPr lvl="1"/>
+            <a:r>
+              <a:rPr lang="ru-RU" dirty="0" smtClean="0"/>
+              <a:t>Загружает </a:t>
+            </a:r>
             <a:r>
               <a:rPr lang="en-US" dirty="0" smtClean="0"/>
               <a:t>XML </a:t>
             </a:r>
             <a:r>
+              <a:rPr lang="ru-RU" dirty="0"/>
+              <a:t>документ </a:t>
+            </a:r>
+            <a:r>
               <a:rPr lang="ru-RU" dirty="0" smtClean="0"/>
-              <a:t>комментарии предназначены для автоматизации документирования программы и для поддержки </a:t>
+              <a:t>целиком в память</a:t>
+            </a:r>
+          </a:p>
+          <a:p>
+            <a:pPr lvl="1"/>
+            <a:r>
+              <a:rPr lang="ru-RU" dirty="0" smtClean="0"/>
+              <a:t>Позволяет одновременно читать и изменять </a:t>
+            </a:r>
+            <a:r>
+              <a:rPr lang="en-US" dirty="0" smtClean="0"/>
+              <a:t>XML</a:t>
+            </a:r>
+          </a:p>
+          <a:p>
+            <a:r>
+              <a:rPr lang="en-US" dirty="0" smtClean="0"/>
+              <a:t>SAX – </a:t>
+            </a:r>
+            <a:r>
+              <a:rPr lang="en-US" dirty="0" smtClean="0">
+                <a:solidFill>
+                  <a:srgbClr val="FF0000"/>
+                </a:solidFill>
+              </a:rPr>
+              <a:t>S</a:t>
+            </a:r>
+            <a:r>
+              <a:rPr lang="en-US" dirty="0" smtClean="0"/>
+              <a:t>imple </a:t>
+            </a:r>
+            <a:r>
+              <a:rPr lang="en-US" dirty="0" smtClean="0">
+                <a:solidFill>
+                  <a:srgbClr val="FF0000"/>
+                </a:solidFill>
+              </a:rPr>
+              <a:t>A</a:t>
+            </a:r>
+            <a:r>
+              <a:rPr lang="en-US" dirty="0" smtClean="0"/>
+              <a:t>PI for </a:t>
+            </a:r>
+            <a:r>
+              <a:rPr lang="en-US" dirty="0" smtClean="0">
+                <a:solidFill>
+                  <a:srgbClr val="FF0000"/>
+                </a:solidFill>
+              </a:rPr>
+              <a:t>X</a:t>
+            </a:r>
+            <a:r>
+              <a:rPr lang="en-US" dirty="0" smtClean="0"/>
+              <a:t>ML</a:t>
+            </a:r>
+          </a:p>
+          <a:p>
+            <a:pPr lvl="1"/>
+            <a:r>
+              <a:rPr lang="ru-RU" dirty="0" smtClean="0"/>
+              <a:t>Классы </a:t>
             </a:r>
             <a:r>
               <a:rPr lang="en-US" dirty="0" err="1" smtClean="0"/>
-              <a:t>InteliiSense</a:t>
-            </a:r>
-            <a:r>
-              <a:rPr lang="en-US" dirty="0" smtClean="0"/>
-              <a:t> </a:t>
-            </a:r>
+              <a:t>System.Xml.XmlReader</a:t>
+            </a:r>
+            <a:r>
+              <a:rPr lang="en-US" dirty="0"/>
+              <a:t>/ </a:t>
+            </a:r>
+            <a:r>
+              <a:rPr lang="en-US" dirty="0" err="1" smtClean="0"/>
+              <a:t>System.Xml.XmlWriter</a:t>
+            </a:r>
+            <a:endParaRPr lang="ru-RU" dirty="0" smtClean="0"/>
+          </a:p>
+          <a:p>
+            <a:pPr lvl="1"/>
             <a:r>
               <a:rPr lang="ru-RU" dirty="0" smtClean="0"/>
-              <a:t>для типов из внешних библиотек.</a:t>
-            </a:r>
-          </a:p>
-          <a:p>
-            <a:pPr marL="0" indent="0">
-              <a:buNone/>
-            </a:pPr>
-            <a:endParaRPr lang="en-US" dirty="0" smtClean="0"/>
-          </a:p>
-          <a:p>
-            <a:r>
-              <a:rPr lang="ru-RU" dirty="0" smtClean="0"/>
-              <a:t>Начинаются </a:t>
-            </a:r>
-            <a:r>
-              <a:rPr lang="ru-RU" dirty="0" smtClean="0"/>
-              <a:t>с </a:t>
-            </a:r>
-            <a:r>
-              <a:rPr lang="en-US" dirty="0" smtClean="0"/>
-              <a:t>///</a:t>
-            </a:r>
-          </a:p>
-          <a:p>
-            <a:r>
-              <a:rPr lang="ru-RU" dirty="0" smtClean="0"/>
-              <a:t>Поддерживаемые элементы</a:t>
-            </a:r>
-          </a:p>
-          <a:p>
-            <a:pPr lvl="1"/>
-            <a:r>
-              <a:rPr lang="en-US" dirty="0"/>
-              <a:t>&lt;summary</a:t>
-            </a:r>
-            <a:r>
-              <a:rPr lang="en-US" dirty="0" smtClean="0"/>
-              <a:t>&gt;</a:t>
-            </a:r>
-            <a:endParaRPr lang="ru-RU" dirty="0" smtClean="0"/>
-          </a:p>
-          <a:p>
-            <a:pPr lvl="1"/>
-            <a:r>
-              <a:rPr lang="en-US" dirty="0"/>
-              <a:t>&lt;</a:t>
-            </a:r>
-            <a:r>
-              <a:rPr lang="en-US" dirty="0" err="1"/>
-              <a:t>param</a:t>
-            </a:r>
-            <a:r>
-              <a:rPr lang="en-US" dirty="0"/>
-              <a:t> name</a:t>
-            </a:r>
-            <a:r>
-              <a:rPr lang="en-US" dirty="0" smtClean="0"/>
-              <a:t>="</a:t>
-            </a:r>
-            <a:r>
-              <a:rPr lang="ru-RU" dirty="0" smtClean="0"/>
-              <a:t>ИмяПараметра</a:t>
-            </a:r>
-            <a:r>
-              <a:rPr lang="en-US" dirty="0" smtClean="0"/>
-              <a:t>"&gt;</a:t>
-            </a:r>
-            <a:endParaRPr lang="ru-RU" dirty="0" smtClean="0"/>
-          </a:p>
-          <a:p>
-            <a:pPr lvl="1"/>
-            <a:r>
-              <a:rPr lang="en-US" dirty="0"/>
-              <a:t>&lt;returns</a:t>
-            </a:r>
-            <a:r>
-              <a:rPr lang="en-US" dirty="0" smtClean="0"/>
-              <a:t>&gt;</a:t>
-            </a:r>
-            <a:endParaRPr lang="ru-RU" dirty="0" smtClean="0"/>
-          </a:p>
-          <a:p>
-            <a:pPr lvl="1"/>
-            <a:r>
-              <a:rPr lang="en-US" dirty="0"/>
-              <a:t>&lt;remarks</a:t>
-            </a:r>
-            <a:r>
-              <a:rPr lang="en-US" dirty="0" smtClean="0"/>
-              <a:t>&gt;</a:t>
-            </a:r>
-            <a:endParaRPr lang="ru-RU" dirty="0" smtClean="0"/>
-          </a:p>
-          <a:p>
-            <a:pPr lvl="1"/>
-            <a:r>
-              <a:rPr lang="ru-RU" dirty="0" smtClean="0"/>
-              <a:t>и другие ...</a:t>
-            </a:r>
-            <a:endParaRPr lang="en-US" dirty="0" smtClean="0"/>
-          </a:p>
-          <a:p>
-            <a:pPr marL="0" indent="0">
-              <a:buNone/>
-            </a:pPr>
-            <a:endParaRPr lang="en-US" dirty="0" smtClean="0"/>
+              <a:t>Работа идет</a:t>
+            </a:r>
+            <a:endParaRPr lang="ru-RU" dirty="0"/>
           </a:p>
         </p:txBody>
       </p:sp>
     </p:spTree>
     <p:extLst>
       <p:ext uri="{BB962C8B-B14F-4D97-AF65-F5344CB8AC3E}">
-        <p14:creationId xmlns:p14="http://schemas.microsoft.com/office/powerpoint/2010/main" val="2726345138"/>
+        <p14:creationId xmlns:p14="http://schemas.microsoft.com/office/powerpoint/2010/main" val="786506698"/>
       </p:ext>
     </p:extLst>
   </p:cSld>
@@ -8011,110 +8300,153 @@
           </a:p>
         </p:txBody>
       </p:sp>
-      <p:pic>
-        <p:nvPicPr>
-          <p:cNvPr id="1026" name="Picture 2"/>
-          <p:cNvPicPr>
-            <a:picLocks noChangeAspect="1" noChangeArrowheads="1"/>
-          </p:cNvPicPr>
-          <p:nvPr/>
-        </p:nvPicPr>
-        <p:blipFill>
-          <a:blip r:embed="rId2">
-            <a:extLst>
-              <a:ext uri="{28A0092B-C50C-407E-A947-70E740481C1C}">
-                <a14:useLocalDpi xmlns:a14="http://schemas.microsoft.com/office/drawing/2010/main" val="0"/>
-              </a:ext>
-            </a:extLst>
-          </a:blip>
-          <a:srcRect/>
-          <a:stretch>
-            <a:fillRect/>
-          </a:stretch>
-        </p:blipFill>
-        <p:spPr bwMode="auto">
-          <a:xfrm>
-            <a:off x="3275856" y="1328986"/>
-            <a:ext cx="5669280" cy="4610100"/>
-          </a:xfrm>
-          <a:prstGeom prst="rect">
-            <a:avLst/>
-          </a:prstGeom>
-          <a:noFill/>
-          <a:ln>
-            <a:noFill/>
-          </a:ln>
-          <a:extLst>
-            <a:ext uri="{909E8E84-426E-40DD-AFC4-6F175D3DCCD1}">
-              <a14:hiddenFill xmlns:a14="http://schemas.microsoft.com/office/drawing/2010/main">
-                <a:solidFill>
-                  <a:schemeClr val="accent1"/>
-                </a:solidFill>
-              </a14:hiddenFill>
-            </a:ext>
-            <a:ext uri="{91240B29-F687-4F45-9708-019B960494DF}">
-              <a14:hiddenLine xmlns:a14="http://schemas.microsoft.com/office/drawing/2010/main" w="9525">
-                <a:solidFill>
-                  <a:schemeClr val="tx1"/>
-                </a:solidFill>
-                <a:miter lim="800000"/>
-                <a:headEnd/>
-                <a:tailEnd/>
-              </a14:hiddenLine>
-            </a:ext>
-          </a:extLst>
-        </p:spPr>
-      </p:pic>
       <p:sp>
         <p:nvSpPr>
-          <p:cNvPr id="4" name="TextBox 3"/>
-          <p:cNvSpPr txBox="1"/>
-          <p:nvPr/>
+          <p:cNvPr id="3" name="Content Placeholder 2"/>
+          <p:cNvSpPr>
+            <a:spLocks noGrp="1"/>
+          </p:cNvSpPr>
+          <p:nvPr>
+            <p:ph idx="1"/>
+          </p:nvPr>
         </p:nvSpPr>
-        <p:spPr>
-          <a:xfrm>
-            <a:off x="251520" y="1557367"/>
-            <a:ext cx="3024336" cy="4031873"/>
-          </a:xfrm>
-          <a:prstGeom prst="rect">
-            <a:avLst/>
-          </a:prstGeom>
-          <a:noFill/>
-        </p:spPr>
+        <p:spPr/>
         <p:txBody>
-          <a:bodyPr wrap="square" rtlCol="0">
-            <a:spAutoFit/>
+          <a:bodyPr>
+            <a:normAutofit fontScale="85000" lnSpcReduction="20000"/>
           </a:bodyPr>
           <a:lstStyle/>
           <a:p>
-            <a:r>
-              <a:rPr lang="ru-RU" sz="3200" dirty="0" smtClean="0"/>
-              <a:t>Установите опцию </a:t>
-            </a:r>
-            <a:r>
-              <a:rPr lang="en-US" sz="3200" dirty="0" smtClean="0"/>
-              <a:t>“XML documentation file” </a:t>
-            </a:r>
-            <a:r>
-              <a:rPr lang="ru-RU" sz="3200" dirty="0" smtClean="0"/>
-              <a:t>в свойствах проекта для генерации </a:t>
-            </a:r>
-            <a:r>
-              <a:rPr lang="en-US" sz="3200" dirty="0" smtClean="0"/>
+            <a:pPr marL="0" indent="0">
+              <a:buNone/>
+            </a:pPr>
+            <a:r>
+              <a:rPr lang="en-US" dirty="0" smtClean="0"/>
               <a:t>XML </a:t>
             </a:r>
             <a:r>
-              <a:rPr lang="ru-RU" sz="3200" dirty="0" smtClean="0"/>
-              <a:t>файла с комментариями</a:t>
-            </a:r>
-            <a:endParaRPr lang="en-US" sz="3200" dirty="0" smtClean="0"/>
+              <a:rPr lang="ru-RU" dirty="0" smtClean="0"/>
+              <a:t>комментарии предназначены для автоматизации документирования программы и для поддержки </a:t>
+            </a:r>
+            <a:r>
+              <a:rPr lang="en-US" dirty="0" err="1" smtClean="0"/>
+              <a:t>InteliiSense</a:t>
+            </a:r>
+            <a:r>
+              <a:rPr lang="en-US" dirty="0" smtClean="0"/>
+              <a:t> </a:t>
+            </a:r>
+            <a:r>
+              <a:rPr lang="ru-RU" dirty="0" smtClean="0"/>
+              <a:t>для типов из внешних библиотек.</a:t>
+            </a:r>
+          </a:p>
+          <a:p>
+            <a:pPr marL="0" indent="0">
+              <a:buNone/>
+            </a:pPr>
+            <a:endParaRPr lang="en-US" dirty="0" smtClean="0"/>
+          </a:p>
+          <a:p>
+            <a:r>
+              <a:rPr lang="ru-RU" dirty="0" smtClean="0"/>
+              <a:t>Начинаются с </a:t>
+            </a:r>
+            <a:r>
+              <a:rPr lang="en-US" dirty="0" smtClean="0"/>
+              <a:t>///</a:t>
+            </a:r>
+          </a:p>
+          <a:p>
+            <a:r>
+              <a:rPr lang="ru-RU" dirty="0" smtClean="0"/>
+              <a:t>Поддерживаемые элементы</a:t>
+            </a:r>
+          </a:p>
+          <a:p>
+            <a:pPr lvl="1"/>
+            <a:r>
+              <a:rPr lang="en-US" dirty="0"/>
+              <a:t>&lt;summary</a:t>
+            </a:r>
+            <a:r>
+              <a:rPr lang="en-US" dirty="0" smtClean="0"/>
+              <a:t>&gt;</a:t>
+            </a:r>
+            <a:endParaRPr lang="ru-RU" dirty="0" smtClean="0"/>
+          </a:p>
+          <a:p>
+            <a:pPr lvl="1"/>
+            <a:r>
+              <a:rPr lang="en-US" dirty="0"/>
+              <a:t>&lt;</a:t>
+            </a:r>
+            <a:r>
+              <a:rPr lang="en-US" dirty="0" err="1"/>
+              <a:t>param</a:t>
+            </a:r>
+            <a:r>
+              <a:rPr lang="en-US" dirty="0"/>
+              <a:t> name</a:t>
+            </a:r>
+            <a:r>
+              <a:rPr lang="en-US" dirty="0" smtClean="0"/>
+              <a:t>="</a:t>
+            </a:r>
+            <a:r>
+              <a:rPr lang="ru-RU" dirty="0" smtClean="0"/>
+              <a:t>ИмяПараметра</a:t>
+            </a:r>
+            <a:r>
+              <a:rPr lang="en-US" dirty="0" smtClean="0"/>
+              <a:t>"&gt;</a:t>
+            </a:r>
+            <a:endParaRPr lang="ru-RU" dirty="0" smtClean="0"/>
+          </a:p>
+          <a:p>
+            <a:pPr lvl="1"/>
+            <a:r>
+              <a:rPr lang="en-US" dirty="0"/>
+              <a:t>&lt;returns</a:t>
+            </a:r>
+            <a:r>
+              <a:rPr lang="en-US" dirty="0" smtClean="0"/>
+              <a:t>&gt;</a:t>
+            </a:r>
+            <a:endParaRPr lang="ru-RU" dirty="0" smtClean="0"/>
+          </a:p>
+          <a:p>
+            <a:pPr lvl="1"/>
+            <a:r>
+              <a:rPr lang="en-US" dirty="0"/>
+              <a:t>&lt;remarks</a:t>
+            </a:r>
+            <a:r>
+              <a:rPr lang="en-US" dirty="0" smtClean="0"/>
+              <a:t>&gt;</a:t>
+            </a:r>
+            <a:endParaRPr lang="ru-RU" dirty="0" smtClean="0"/>
+          </a:p>
+          <a:p>
+            <a:pPr lvl="1"/>
+            <a:r>
+              <a:rPr lang="ru-RU" dirty="0" smtClean="0"/>
+              <a:t>и другие ...</a:t>
+            </a:r>
+            <a:endParaRPr lang="en-US" dirty="0" smtClean="0"/>
+          </a:p>
+          <a:p>
+            <a:pPr marL="0" indent="0">
+              <a:buNone/>
+            </a:pPr>
+            <a:endParaRPr lang="en-US" dirty="0" smtClean="0"/>
           </a:p>
         </p:txBody>
       </p:sp>
     </p:spTree>
     <p:extLst>
       <p:ext uri="{BB962C8B-B14F-4D97-AF65-F5344CB8AC3E}">
-        <p14:creationId xmlns:p14="http://schemas.microsoft.com/office/powerpoint/2010/main" val="238274862"/>
+        <p14:creationId xmlns:p14="http://schemas.microsoft.com/office/powerpoint/2010/main" val="2726345138"/>
       </p:ext>
     </p:extLst>
   </p:cSld>
@@ -8158,44 +8490,140 @@
             <p:ph type="title"/>
           </p:nvPr>
         </p:nvSpPr>
+        <p:spPr/>
+        <p:txBody>
+          <a:bodyPr/>
+          <a:lstStyle/>
+          <a:p>
+            <a:r>
+              <a:rPr lang="en-US" dirty="0" smtClean="0"/>
+              <a:t>XML </a:t>
+            </a:r>
+            <a:r>
+              <a:rPr lang="ru-RU" dirty="0" smtClean="0"/>
+              <a:t>комментарии</a:t>
+            </a:r>
+            <a:endParaRPr lang="ru-RU" dirty="0"/>
+          </a:p>
+        </p:txBody>
+      </p:sp>
+      <p:pic>
+        <p:nvPicPr>
+          <p:cNvPr id="1026" name="Picture 2"/>
+          <p:cNvPicPr>
+            <a:picLocks noChangeAspect="1" noChangeArrowheads="1"/>
+          </p:cNvPicPr>
+          <p:nvPr/>
+        </p:nvPicPr>
+        <p:blipFill>
+          <a:blip r:embed="rId2">
+            <a:extLst>
+              <a:ext uri="{28A0092B-C50C-407E-A947-70E740481C1C}">
+                <a14:useLocalDpi xmlns:a14="http://schemas.microsoft.com/office/drawing/2010/main" val="0"/>
+              </a:ext>
+            </a:extLst>
+          </a:blip>
+          <a:srcRect/>
+          <a:stretch>
+            <a:fillRect/>
+          </a:stretch>
+        </p:blipFill>
+        <p:spPr bwMode="auto">
+          <a:xfrm>
+            <a:off x="3275856" y="1328986"/>
+            <a:ext cx="5669280" cy="4610100"/>
+          </a:xfrm>
+          <a:prstGeom prst="rect">
+            <a:avLst/>
+          </a:prstGeom>
+          <a:noFill/>
+          <a:ln>
+            <a:noFill/>
+          </a:ln>
+          <a:extLst>
+            <a:ext uri="{909E8E84-426E-40DD-AFC4-6F175D3DCCD1}">
+              <a14:hiddenFill xmlns:a14="http://schemas.microsoft.com/office/drawing/2010/main">
+                <a:solidFill>
+                  <a:schemeClr val="accent1"/>
+                </a:solidFill>
+              </a14:hiddenFill>
+            </a:ext>
+            <a:ext uri="{91240B29-F687-4F45-9708-019B960494DF}">
+              <a14:hiddenLine xmlns:a14="http://schemas.microsoft.com/office/drawing/2010/main" w="9525">
+                <a:solidFill>
+                  <a:schemeClr val="tx1"/>
+                </a:solidFill>
+                <a:miter lim="800000"/>
+                <a:headEnd/>
+                <a:tailEnd/>
+              </a14:hiddenLine>
+            </a:ext>
+          </a:extLst>
+        </p:spPr>
+      </p:pic>
+      <p:sp>
+        <p:nvSpPr>
+          <p:cNvPr id="4" name="TextBox 3"/>
+          <p:cNvSpPr txBox="1"/>
+          <p:nvPr/>
+        </p:nvSpPr>
         <p:spPr>
           <a:xfrm>
-            <a:off x="457200" y="2857500"/>
-            <a:ext cx="8229600" cy="1143000"/>
+            <a:off x="251520" y="1557367"/>
+            <a:ext cx="3024336" cy="4031873"/>
           </a:xfrm>
+          <a:prstGeom prst="rect">
+            <a:avLst/>
+          </a:prstGeom>
+          <a:noFill/>
         </p:spPr>
         <p:txBody>
-          <a:bodyPr>
-            <a:normAutofit/>
+          <a:bodyPr wrap="square" rtlCol="0">
+            <a:spAutoFit/>
           </a:bodyPr>
           <a:lstStyle/>
           <a:p>
             <a:r>
-              <a:rPr lang="ru-RU" dirty="0" smtClean="0"/>
-              <a:t>Чтение </a:t>
-            </a:r>
-            <a:r>
-              <a:rPr lang="en-US" dirty="0" smtClean="0"/>
-              <a:t>XML. </a:t>
-            </a:r>
-            <a:r>
-              <a:rPr lang="ru-RU" dirty="0" smtClean="0"/>
-              <a:t>Демонстрация.</a:t>
-            </a:r>
-            <a:endParaRPr lang="ru-RU" dirty="0"/>
+              <a:rPr lang="ru-RU" sz="3200" dirty="0" smtClean="0"/>
+              <a:t>Установите опцию </a:t>
+            </a:r>
+            <a:r>
+              <a:rPr lang="en-US" sz="3200" dirty="0" smtClean="0"/>
+              <a:t>“XML documentation file” </a:t>
+            </a:r>
+            <a:r>
+              <a:rPr lang="ru-RU" sz="3200" dirty="0" smtClean="0"/>
+              <a:t>в свойствах проекта для генерации </a:t>
+            </a:r>
+            <a:r>
+              <a:rPr lang="en-US" sz="3200" dirty="0" smtClean="0"/>
+              <a:t>XML </a:t>
+            </a:r>
+            <a:r>
+              <a:rPr lang="ru-RU" sz="3200" dirty="0" smtClean="0"/>
+              <a:t>файла с комментариями</a:t>
+            </a:r>
+            <a:endParaRPr lang="en-US" sz="3200" dirty="0" smtClean="0"/>
           </a:p>
         </p:txBody>
       </p:sp>
     </p:spTree>
     <p:extLst>
       <p:ext uri="{BB962C8B-B14F-4D97-AF65-F5344CB8AC3E}">
-        <p14:creationId xmlns:p14="http://schemas.microsoft.com/office/powerpoint/2010/main" val="607863742"/>
+        <p14:creationId xmlns:p14="http://schemas.microsoft.com/office/powerpoint/2010/main" val="238274862"/>
       </p:ext>
     </p:extLst>
   </p:cSld>
   <p:clrMapOvr>
     <a:masterClrMapping/>
   </p:clrMapOvr>
+  <p:timing>
+    <p:tnLst>
+      <p:par>
+        <p:cTn id="1" dur="indefinite" restart="never" nodeType="tmRoot"/>
+      </p:par>
+    </p:tnLst>
+  </p:timing>
 </p:sld>
 </file>
 
@@ -8226,101 +8654,29 @@
             <p:ph type="title"/>
           </p:nvPr>
         </p:nvSpPr>
-        <p:spPr/>
-        <p:txBody>
-          <a:bodyPr/>
-          <a:lstStyle/>
-          <a:p>
-            <a:r>
-              <a:rPr lang="en-US" dirty="0" smtClean="0"/>
-              <a:t>XML </a:t>
-            </a:r>
-            <a:r>
-              <a:rPr lang="ru-RU" dirty="0" smtClean="0"/>
-              <a:t>сериализация (</a:t>
-            </a:r>
-            <a:r>
-              <a:rPr lang="en-US" dirty="0" smtClean="0"/>
-              <a:t>serialization</a:t>
-            </a:r>
-            <a:r>
-              <a:rPr lang="ru-RU" dirty="0" smtClean="0"/>
-              <a:t>)</a:t>
-            </a:r>
-            <a:endParaRPr lang="ru-RU" dirty="0"/>
-          </a:p>
-        </p:txBody>
-      </p:sp>
-      <p:sp>
-        <p:nvSpPr>
-          <p:cNvPr id="3" name="Content Placeholder 2"/>
-          <p:cNvSpPr>
-            <a:spLocks noGrp="1"/>
-          </p:cNvSpPr>
-          <p:nvPr>
-            <p:ph idx="1"/>
-          </p:nvPr>
-        </p:nvSpPr>
-        <p:spPr/>
+        <p:spPr>
+          <a:xfrm>
+            <a:off x="457200" y="2857500"/>
+            <a:ext cx="8229600" cy="1143000"/>
+          </a:xfrm>
+        </p:spPr>
         <p:txBody>
           <a:bodyPr>
-            <a:normAutofit lnSpcReduction="10000"/>
+            <a:normAutofit/>
           </a:bodyPr>
           <a:lstStyle/>
           <a:p>
             <a:r>
-              <a:rPr lang="ru-RU" dirty="0"/>
-              <a:t>Сериализация – сохранение данных об объекте </a:t>
-            </a:r>
-            <a:r>
               <a:rPr lang="ru-RU" dirty="0" smtClean="0"/>
-              <a:t>в поток</a:t>
-            </a:r>
-            <a:endParaRPr lang="ru-RU" dirty="0"/>
-          </a:p>
-          <a:p>
+              <a:t>Чтение </a:t>
+            </a:r>
+            <a:r>
+              <a:rPr lang="en-US" dirty="0" smtClean="0"/>
+              <a:t>XML. </a:t>
+            </a:r>
             <a:r>
               <a:rPr lang="ru-RU" dirty="0" smtClean="0"/>
-              <a:t>Десериализация</a:t>
-            </a:r>
-            <a:r>
-              <a:rPr lang="en-US" dirty="0" smtClean="0"/>
-              <a:t> </a:t>
-            </a:r>
-            <a:r>
-              <a:rPr lang="ru-RU" dirty="0" smtClean="0"/>
-              <a:t>– </a:t>
-            </a:r>
-            <a:r>
-              <a:rPr lang="ru-RU" dirty="0"/>
-              <a:t>обратный процесс восстановления </a:t>
-            </a:r>
-            <a:r>
-              <a:rPr lang="ru-RU" dirty="0" smtClean="0"/>
-              <a:t>объекта</a:t>
-            </a:r>
-          </a:p>
-          <a:p>
-            <a:endParaRPr lang="en-US" dirty="0" smtClean="0"/>
-          </a:p>
-          <a:p>
-            <a:r>
-              <a:rPr lang="ru-RU" dirty="0" smtClean="0"/>
-              <a:t>Примеры использования:</a:t>
-            </a:r>
-          </a:p>
-          <a:p>
-            <a:pPr lvl="1"/>
-            <a:r>
-              <a:rPr lang="ru-RU" dirty="0" smtClean="0"/>
-              <a:t>Передача объекта между разными программи/машинами.</a:t>
-            </a:r>
-          </a:p>
-          <a:p>
-            <a:pPr lvl="1"/>
-            <a:r>
-              <a:rPr lang="ru-RU" dirty="0" smtClean="0"/>
-              <a:t>Файлы конфигурации</a:t>
+              <a:t>Демонстрация.</a:t>
             </a:r>
             <a:endParaRPr lang="ru-RU" dirty="0"/>
           </a:p>
@@ -8329,7 +8685,7 @@
     </p:spTree>
     <p:extLst>
       <p:ext uri="{BB962C8B-B14F-4D97-AF65-F5344CB8AC3E}">
-        <p14:creationId xmlns:p14="http://schemas.microsoft.com/office/powerpoint/2010/main" val="4243754449"/>
+        <p14:creationId xmlns:p14="http://schemas.microsoft.com/office/powerpoint/2010/main" val="607863742"/>
       </p:ext>
     </p:extLst>
   </p:cSld>
@@ -8366,6 +8722,146 @@
             <p:ph type="title"/>
           </p:nvPr>
         </p:nvSpPr>
+        <p:spPr/>
+        <p:txBody>
+          <a:bodyPr/>
+          <a:lstStyle/>
+          <a:p>
+            <a:r>
+              <a:rPr lang="en-US" dirty="0" smtClean="0"/>
+              <a:t>XML </a:t>
+            </a:r>
+            <a:r>
+              <a:rPr lang="ru-RU" dirty="0" smtClean="0"/>
+              <a:t>сериализация (</a:t>
+            </a:r>
+            <a:r>
+              <a:rPr lang="en-US" dirty="0" smtClean="0"/>
+              <a:t>serialization</a:t>
+            </a:r>
+            <a:r>
+              <a:rPr lang="ru-RU" dirty="0" smtClean="0"/>
+              <a:t>)</a:t>
+            </a:r>
+            <a:endParaRPr lang="ru-RU" dirty="0"/>
+          </a:p>
+        </p:txBody>
+      </p:sp>
+      <p:sp>
+        <p:nvSpPr>
+          <p:cNvPr id="3" name="Content Placeholder 2"/>
+          <p:cNvSpPr>
+            <a:spLocks noGrp="1"/>
+          </p:cNvSpPr>
+          <p:nvPr>
+            <p:ph idx="1"/>
+          </p:nvPr>
+        </p:nvSpPr>
+        <p:spPr/>
+        <p:txBody>
+          <a:bodyPr>
+            <a:normAutofit lnSpcReduction="10000"/>
+          </a:bodyPr>
+          <a:lstStyle/>
+          <a:p>
+            <a:r>
+              <a:rPr lang="ru-RU" dirty="0"/>
+              <a:t>Сериализация – сохранение данных об объекте </a:t>
+            </a:r>
+            <a:r>
+              <a:rPr lang="ru-RU" dirty="0" smtClean="0"/>
+              <a:t>в поток</a:t>
+            </a:r>
+            <a:endParaRPr lang="ru-RU" dirty="0"/>
+          </a:p>
+          <a:p>
+            <a:r>
+              <a:rPr lang="ru-RU" dirty="0" smtClean="0"/>
+              <a:t>Десериализация</a:t>
+            </a:r>
+            <a:r>
+              <a:rPr lang="en-US" dirty="0" smtClean="0"/>
+              <a:t> </a:t>
+            </a:r>
+            <a:r>
+              <a:rPr lang="ru-RU" dirty="0" smtClean="0"/>
+              <a:t>– </a:t>
+            </a:r>
+            <a:r>
+              <a:rPr lang="ru-RU" dirty="0"/>
+              <a:t>обратный процесс восстановления </a:t>
+            </a:r>
+            <a:r>
+              <a:rPr lang="ru-RU" dirty="0" smtClean="0"/>
+              <a:t>объекта</a:t>
+            </a:r>
+          </a:p>
+          <a:p>
+            <a:endParaRPr lang="en-US" dirty="0" smtClean="0"/>
+          </a:p>
+          <a:p>
+            <a:r>
+              <a:rPr lang="ru-RU" dirty="0" smtClean="0"/>
+              <a:t>Примеры использования:</a:t>
+            </a:r>
+          </a:p>
+          <a:p>
+            <a:pPr lvl="1"/>
+            <a:r>
+              <a:rPr lang="ru-RU" dirty="0" smtClean="0"/>
+              <a:t>Передача объекта между разными программи/машинами.</a:t>
+            </a:r>
+          </a:p>
+          <a:p>
+            <a:pPr lvl="1"/>
+            <a:r>
+              <a:rPr lang="ru-RU" dirty="0" smtClean="0"/>
+              <a:t>Файлы конфигурации</a:t>
+            </a:r>
+            <a:endParaRPr lang="ru-RU" dirty="0"/>
+          </a:p>
+        </p:txBody>
+      </p:sp>
+    </p:spTree>
+    <p:extLst>
+      <p:ext uri="{BB962C8B-B14F-4D97-AF65-F5344CB8AC3E}">
+        <p14:creationId xmlns:p14="http://schemas.microsoft.com/office/powerpoint/2010/main" val="4243754449"/>
+      </p:ext>
+    </p:extLst>
+  </p:cSld>
+  <p:clrMapOvr>
+    <a:masterClrMapping/>
+  </p:clrMapOvr>
+</p:sld>
+</file>
+
+<file path=ppt/slides/slide26.xml><?xml version="1.0" encoding="utf-8"?>
+<p:sld xmlns:a="http://schemas.openxmlformats.org/drawingml/2006/main" xmlns:r="http://schemas.openxmlformats.org/officeDocument/2006/relationships" xmlns:p="http://schemas.openxmlformats.org/presentationml/2006/main">
+  <p:cSld>
+    <p:spTree>
+      <p:nvGrpSpPr>
+        <p:cNvPr id="1" name=""/>
+        <p:cNvGrpSpPr/>
+        <p:nvPr/>
+      </p:nvGrpSpPr>
+      <p:grpSpPr>
+        <a:xfrm>
+          <a:off x="0" y="0"/>
+          <a:ext cx="0" cy="0"/>
+          <a:chOff x="0" y="0"/>
+          <a:chExt cx="0" cy="0"/>
+        </a:xfrm>
+      </p:grpSpPr>
+      <p:sp>
+        <p:nvSpPr>
+          <p:cNvPr id="2" name="Title 1"/>
+          <p:cNvSpPr>
+            <a:spLocks noGrp="1"/>
+          </p:cNvSpPr>
+          <p:nvPr>
+            <p:ph type="title"/>
+          </p:nvPr>
+        </p:nvSpPr>
         <p:spPr>
           <a:xfrm>
             <a:off x="457200" y="-234280"/>
@@ -10680,7 +11176,7 @@
 </p:sld>
 </file>
 
-<file path=ppt/slides/slide26.xml><?xml version="1.0" encoding="utf-8"?>
+<file path=ppt/slides/slide27.xml><?xml version="1.0" encoding="utf-8"?>
 <p:sld xmlns:a="http://schemas.openxmlformats.org/drawingml/2006/main" xmlns:r="http://schemas.openxmlformats.org/officeDocument/2006/relationships" xmlns:p="http://schemas.openxmlformats.org/presentationml/2006/main">
   <p:cSld>
     <p:bg>

</xml_diff>

<commit_message>
Added link to Sandcastle Help Builder project
</commit_message>
<xml_diff>
--- a/Presentation/lesson-06-xml.pptx
+++ b/Presentation/lesson-06-xml.pptx
@@ -5,7 +5,7 @@
     <p:sldMasterId id="2147483648" r:id="rId1"/>
   </p:sldMasterIdLst>
   <p:notesMasterIdLst>
-    <p:notesMasterId r:id="rId29"/>
+    <p:notesMasterId r:id="rId30"/>
   </p:notesMasterIdLst>
   <p:sldIdLst>
     <p:sldId id="257" r:id="rId2"/>
@@ -31,10 +31,11 @@
     <p:sldId id="276" r:id="rId22"/>
     <p:sldId id="278" r:id="rId23"/>
     <p:sldId id="284" r:id="rId24"/>
-    <p:sldId id="277" r:id="rId25"/>
-    <p:sldId id="280" r:id="rId26"/>
-    <p:sldId id="282" r:id="rId27"/>
-    <p:sldId id="285" r:id="rId28"/>
+    <p:sldId id="287" r:id="rId25"/>
+    <p:sldId id="277" r:id="rId26"/>
+    <p:sldId id="280" r:id="rId27"/>
+    <p:sldId id="282" r:id="rId28"/>
+    <p:sldId id="285" r:id="rId29"/>
   </p:sldIdLst>
   <p:sldSz cx="9144000" cy="6858000" type="screen4x3"/>
   <p:notesSz cx="6858000" cy="9144000"/>
@@ -218,7 +219,7 @@
           <a:p>
             <a:fld id="{B24A7054-7FFB-49F4-A126-5DF6E687FF53}" type="datetimeFigureOut">
               <a:rPr lang="ru-RU" smtClean="0"/>
-              <a:t>21.10.2013</a:t>
+              <a:t>25.10.2013</a:t>
             </a:fld>
             <a:endParaRPr lang="ru-RU"/>
           </a:p>
@@ -1281,7 +1282,7 @@
           <a:p>
             <a:fld id="{8E6E6A2A-E9D3-4A0D-B04A-ABDD367A1E08}" type="datetimeFigureOut">
               <a:rPr lang="ru-RU" smtClean="0"/>
-              <a:t>21.10.2013</a:t>
+              <a:t>25.10.2013</a:t>
             </a:fld>
             <a:endParaRPr lang="ru-RU"/>
           </a:p>
@@ -2729,7 +2730,7 @@
           <a:p>
             <a:fld id="{AC3D3127-B7C4-45E3-9797-C527EC9FDD78}" type="datetimeFigureOut">
               <a:rPr lang="ru-RU" smtClean="0"/>
-              <a:t>21.10.2013</a:t>
+              <a:t>25.10.2013</a:t>
             </a:fld>
             <a:endParaRPr lang="ru-RU"/>
           </a:p>
@@ -8439,6 +8440,12 @@
             <a:pPr marL="0" indent="0">
               <a:buNone/>
             </a:pPr>
+            <a:endParaRPr lang="ru-RU" dirty="0" smtClean="0"/>
+          </a:p>
+          <a:p>
+            <a:pPr marL="0" indent="0">
+              <a:buNone/>
+            </a:pPr>
             <a:endParaRPr lang="en-US" dirty="0" smtClean="0"/>
           </a:p>
         </p:txBody>
@@ -8503,6 +8510,14 @@
               <a:rPr lang="ru-RU" dirty="0" smtClean="0"/>
               <a:t>комментарии</a:t>
             </a:r>
+            <a:r>
+              <a:rPr lang="en-US" dirty="0" smtClean="0"/>
+              <a:t>: </a:t>
+            </a:r>
+            <a:r>
+              <a:rPr lang="ru-RU" dirty="0" smtClean="0"/>
+              <a:t>Настройка</a:t>
+            </a:r>
             <a:endParaRPr lang="ru-RU" dirty="0"/>
           </a:p>
         </p:txBody>
@@ -8654,44 +8669,110 @@
             <p:ph type="title"/>
           </p:nvPr>
         </p:nvSpPr>
-        <p:spPr>
-          <a:xfrm>
-            <a:off x="457200" y="2857500"/>
-            <a:ext cx="8229600" cy="1143000"/>
-          </a:xfrm>
-        </p:spPr>
+        <p:spPr/>
+        <p:txBody>
+          <a:bodyPr/>
+          <a:lstStyle/>
+          <a:p>
+            <a:r>
+              <a:rPr lang="en-US" dirty="0" smtClean="0"/>
+              <a:t>XML </a:t>
+            </a:r>
+            <a:r>
+              <a:rPr lang="ru-RU" dirty="0" smtClean="0"/>
+              <a:t>комментарии</a:t>
+            </a:r>
+            <a:r>
+              <a:rPr lang="en-US" dirty="0" smtClean="0"/>
+              <a:t>: Sandcastle</a:t>
+            </a:r>
+            <a:endParaRPr lang="ru-RU" dirty="0"/>
+          </a:p>
+        </p:txBody>
+      </p:sp>
+      <p:sp>
+        <p:nvSpPr>
+          <p:cNvPr id="3" name="Content Placeholder 2"/>
+          <p:cNvSpPr>
+            <a:spLocks noGrp="1"/>
+          </p:cNvSpPr>
+          <p:nvPr>
+            <p:ph idx="1"/>
+          </p:nvPr>
+        </p:nvSpPr>
+        <p:spPr/>
         <p:txBody>
           <a:bodyPr>
             <a:normAutofit/>
           </a:bodyPr>
           <a:lstStyle/>
           <a:p>
+            <a:pPr marL="0" indent="0">
+              <a:buNone/>
+            </a:pPr>
             <a:r>
               <a:rPr lang="ru-RU" dirty="0" smtClean="0"/>
-              <a:t>Чтение </a:t>
+              <a:t>Полученный </a:t>
             </a:r>
             <a:r>
               <a:rPr lang="en-US" dirty="0" smtClean="0"/>
-              <a:t>XML. </a:t>
+              <a:t>XML </a:t>
             </a:r>
             <a:r>
               <a:rPr lang="ru-RU" dirty="0" smtClean="0"/>
-              <a:t>Демонстрация.</a:t>
-            </a:r>
-            <a:endParaRPr lang="ru-RU" dirty="0"/>
+              <a:t>файл неудобен для чтения человеком. </a:t>
+            </a:r>
+            <a:r>
+              <a:rPr lang="ru-RU" dirty="0" smtClean="0"/>
+              <a:t>Однако его можно обработать с помощью программы </a:t>
+            </a:r>
+            <a:r>
+              <a:rPr lang="en-US" dirty="0" smtClean="0"/>
+              <a:t>Sandcastle</a:t>
+            </a:r>
+            <a:r>
+              <a:rPr lang="en-US" dirty="0"/>
+              <a:t> </a:t>
+            </a:r>
+            <a:r>
+              <a:rPr lang="en-US" dirty="0" smtClean="0"/>
+              <a:t>(</a:t>
+            </a:r>
+            <a:r>
+              <a:rPr lang="en-US" dirty="0" smtClean="0">
+                <a:hlinkClick r:id="rId2"/>
+              </a:rPr>
+              <a:t>shfb.codeplex.com</a:t>
+            </a:r>
+            <a:r>
+              <a:rPr lang="en-US" dirty="0" smtClean="0"/>
+              <a:t>) </a:t>
+            </a:r>
+            <a:r>
+              <a:rPr lang="ru-RU" dirty="0" smtClean="0"/>
+              <a:t>и получить файл(ы) справки.</a:t>
+            </a:r>
+            <a:endParaRPr lang="en-US" dirty="0" smtClean="0"/>
           </a:p>
         </p:txBody>
       </p:sp>
     </p:spTree>
     <p:extLst>
       <p:ext uri="{BB962C8B-B14F-4D97-AF65-F5344CB8AC3E}">
-        <p14:creationId xmlns:p14="http://schemas.microsoft.com/office/powerpoint/2010/main" val="607863742"/>
+        <p14:creationId xmlns:p14="http://schemas.microsoft.com/office/powerpoint/2010/main" val="2734608499"/>
       </p:ext>
     </p:extLst>
   </p:cSld>
   <p:clrMapOvr>
     <a:masterClrMapping/>
   </p:clrMapOvr>
+  <p:timing>
+    <p:tnLst>
+      <p:par>
+        <p:cTn id="1" dur="indefinite" restart="never" nodeType="tmRoot"/>
+      </p:par>
+    </p:tnLst>
+  </p:timing>
 </p:sld>
 </file>
 
@@ -8722,101 +8803,29 @@
             <p:ph type="title"/>
           </p:nvPr>
         </p:nvSpPr>
-        <p:spPr/>
-        <p:txBody>
-          <a:bodyPr/>
-          <a:lstStyle/>
-          <a:p>
-            <a:r>
-              <a:rPr lang="en-US" dirty="0" smtClean="0"/>
-              <a:t>XML </a:t>
-            </a:r>
-            <a:r>
-              <a:rPr lang="ru-RU" dirty="0" smtClean="0"/>
-              <a:t>сериализация (</a:t>
-            </a:r>
-            <a:r>
-              <a:rPr lang="en-US" dirty="0" smtClean="0"/>
-              <a:t>serialization</a:t>
-            </a:r>
-            <a:r>
-              <a:rPr lang="ru-RU" dirty="0" smtClean="0"/>
-              <a:t>)</a:t>
-            </a:r>
-            <a:endParaRPr lang="ru-RU" dirty="0"/>
-          </a:p>
-        </p:txBody>
-      </p:sp>
-      <p:sp>
-        <p:nvSpPr>
-          <p:cNvPr id="3" name="Content Placeholder 2"/>
-          <p:cNvSpPr>
-            <a:spLocks noGrp="1"/>
-          </p:cNvSpPr>
-          <p:nvPr>
-            <p:ph idx="1"/>
-          </p:nvPr>
-        </p:nvSpPr>
-        <p:spPr/>
+        <p:spPr>
+          <a:xfrm>
+            <a:off x="457200" y="2857500"/>
+            <a:ext cx="8229600" cy="1143000"/>
+          </a:xfrm>
+        </p:spPr>
         <p:txBody>
           <a:bodyPr>
-            <a:normAutofit lnSpcReduction="10000"/>
+            <a:normAutofit/>
           </a:bodyPr>
           <a:lstStyle/>
           <a:p>
             <a:r>
-              <a:rPr lang="ru-RU" dirty="0"/>
-              <a:t>Сериализация – сохранение данных об объекте </a:t>
-            </a:r>
-            <a:r>
               <a:rPr lang="ru-RU" dirty="0" smtClean="0"/>
-              <a:t>в поток</a:t>
-            </a:r>
-            <a:endParaRPr lang="ru-RU" dirty="0"/>
-          </a:p>
-          <a:p>
+              <a:t>Чтение </a:t>
+            </a:r>
+            <a:r>
+              <a:rPr lang="en-US" dirty="0" smtClean="0"/>
+              <a:t>XML. </a:t>
+            </a:r>
             <a:r>
               <a:rPr lang="ru-RU" dirty="0" smtClean="0"/>
-              <a:t>Десериализация</a:t>
-            </a:r>
-            <a:r>
-              <a:rPr lang="en-US" dirty="0" smtClean="0"/>
-              <a:t> </a:t>
-            </a:r>
-            <a:r>
-              <a:rPr lang="ru-RU" dirty="0" smtClean="0"/>
-              <a:t>– </a:t>
-            </a:r>
-            <a:r>
-              <a:rPr lang="ru-RU" dirty="0"/>
-              <a:t>обратный процесс восстановления </a:t>
-            </a:r>
-            <a:r>
-              <a:rPr lang="ru-RU" dirty="0" smtClean="0"/>
-              <a:t>объекта</a:t>
-            </a:r>
-          </a:p>
-          <a:p>
-            <a:endParaRPr lang="en-US" dirty="0" smtClean="0"/>
-          </a:p>
-          <a:p>
-            <a:r>
-              <a:rPr lang="ru-RU" dirty="0" smtClean="0"/>
-              <a:t>Примеры использования:</a:t>
-            </a:r>
-          </a:p>
-          <a:p>
-            <a:pPr lvl="1"/>
-            <a:r>
-              <a:rPr lang="ru-RU" dirty="0" smtClean="0"/>
-              <a:t>Передача объекта между разными программи/машинами.</a:t>
-            </a:r>
-          </a:p>
-          <a:p>
-            <a:pPr lvl="1"/>
-            <a:r>
-              <a:rPr lang="ru-RU" dirty="0" smtClean="0"/>
-              <a:t>Файлы конфигурации</a:t>
+              <a:t>Демонстрация.</a:t>
             </a:r>
             <a:endParaRPr lang="ru-RU" dirty="0"/>
           </a:p>
@@ -8825,7 +8834,7 @@
     </p:spTree>
     <p:extLst>
       <p:ext uri="{BB962C8B-B14F-4D97-AF65-F5344CB8AC3E}">
-        <p14:creationId xmlns:p14="http://schemas.microsoft.com/office/powerpoint/2010/main" val="4243754449"/>
+        <p14:creationId xmlns:p14="http://schemas.microsoft.com/office/powerpoint/2010/main" val="607863742"/>
       </p:ext>
     </p:extLst>
   </p:cSld>
@@ -8862,6 +8871,146 @@
             <p:ph type="title"/>
           </p:nvPr>
         </p:nvSpPr>
+        <p:spPr/>
+        <p:txBody>
+          <a:bodyPr/>
+          <a:lstStyle/>
+          <a:p>
+            <a:r>
+              <a:rPr lang="en-US" dirty="0" smtClean="0"/>
+              <a:t>XML </a:t>
+            </a:r>
+            <a:r>
+              <a:rPr lang="ru-RU" dirty="0" smtClean="0"/>
+              <a:t>сериализация (</a:t>
+            </a:r>
+            <a:r>
+              <a:rPr lang="en-US" dirty="0" smtClean="0"/>
+              <a:t>serialization</a:t>
+            </a:r>
+            <a:r>
+              <a:rPr lang="ru-RU" dirty="0" smtClean="0"/>
+              <a:t>)</a:t>
+            </a:r>
+            <a:endParaRPr lang="ru-RU" dirty="0"/>
+          </a:p>
+        </p:txBody>
+      </p:sp>
+      <p:sp>
+        <p:nvSpPr>
+          <p:cNvPr id="3" name="Content Placeholder 2"/>
+          <p:cNvSpPr>
+            <a:spLocks noGrp="1"/>
+          </p:cNvSpPr>
+          <p:nvPr>
+            <p:ph idx="1"/>
+          </p:nvPr>
+        </p:nvSpPr>
+        <p:spPr/>
+        <p:txBody>
+          <a:bodyPr>
+            <a:normAutofit lnSpcReduction="10000"/>
+          </a:bodyPr>
+          <a:lstStyle/>
+          <a:p>
+            <a:r>
+              <a:rPr lang="ru-RU" dirty="0"/>
+              <a:t>Сериализация – сохранение данных об объекте </a:t>
+            </a:r>
+            <a:r>
+              <a:rPr lang="ru-RU" dirty="0" smtClean="0"/>
+              <a:t>в поток</a:t>
+            </a:r>
+            <a:endParaRPr lang="ru-RU" dirty="0"/>
+          </a:p>
+          <a:p>
+            <a:r>
+              <a:rPr lang="ru-RU" dirty="0" smtClean="0"/>
+              <a:t>Десериализация</a:t>
+            </a:r>
+            <a:r>
+              <a:rPr lang="en-US" dirty="0" smtClean="0"/>
+              <a:t> </a:t>
+            </a:r>
+            <a:r>
+              <a:rPr lang="ru-RU" dirty="0" smtClean="0"/>
+              <a:t>– </a:t>
+            </a:r>
+            <a:r>
+              <a:rPr lang="ru-RU" dirty="0"/>
+              <a:t>обратный процесс восстановления </a:t>
+            </a:r>
+            <a:r>
+              <a:rPr lang="ru-RU" dirty="0" smtClean="0"/>
+              <a:t>объекта</a:t>
+            </a:r>
+          </a:p>
+          <a:p>
+            <a:endParaRPr lang="en-US" dirty="0" smtClean="0"/>
+          </a:p>
+          <a:p>
+            <a:r>
+              <a:rPr lang="ru-RU" dirty="0" smtClean="0"/>
+              <a:t>Примеры использования:</a:t>
+            </a:r>
+          </a:p>
+          <a:p>
+            <a:pPr lvl="1"/>
+            <a:r>
+              <a:rPr lang="ru-RU" dirty="0" smtClean="0"/>
+              <a:t>Передача объекта между разными программи/машинами.</a:t>
+            </a:r>
+          </a:p>
+          <a:p>
+            <a:pPr lvl="1"/>
+            <a:r>
+              <a:rPr lang="ru-RU" dirty="0" smtClean="0"/>
+              <a:t>Файлы конфигурации</a:t>
+            </a:r>
+            <a:endParaRPr lang="ru-RU" dirty="0"/>
+          </a:p>
+        </p:txBody>
+      </p:sp>
+    </p:spTree>
+    <p:extLst>
+      <p:ext uri="{BB962C8B-B14F-4D97-AF65-F5344CB8AC3E}">
+        <p14:creationId xmlns:p14="http://schemas.microsoft.com/office/powerpoint/2010/main" val="4243754449"/>
+      </p:ext>
+    </p:extLst>
+  </p:cSld>
+  <p:clrMapOvr>
+    <a:masterClrMapping/>
+  </p:clrMapOvr>
+</p:sld>
+</file>
+
+<file path=ppt/slides/slide27.xml><?xml version="1.0" encoding="utf-8"?>
+<p:sld xmlns:a="http://schemas.openxmlformats.org/drawingml/2006/main" xmlns:r="http://schemas.openxmlformats.org/officeDocument/2006/relationships" xmlns:p="http://schemas.openxmlformats.org/presentationml/2006/main">
+  <p:cSld>
+    <p:spTree>
+      <p:nvGrpSpPr>
+        <p:cNvPr id="1" name=""/>
+        <p:cNvGrpSpPr/>
+        <p:nvPr/>
+      </p:nvGrpSpPr>
+      <p:grpSpPr>
+        <a:xfrm>
+          <a:off x="0" y="0"/>
+          <a:ext cx="0" cy="0"/>
+          <a:chOff x="0" y="0"/>
+          <a:chExt cx="0" cy="0"/>
+        </a:xfrm>
+      </p:grpSpPr>
+      <p:sp>
+        <p:nvSpPr>
+          <p:cNvPr id="2" name="Title 1"/>
+          <p:cNvSpPr>
+            <a:spLocks noGrp="1"/>
+          </p:cNvSpPr>
+          <p:nvPr>
+            <p:ph type="title"/>
+          </p:nvPr>
+        </p:nvSpPr>
         <p:spPr>
           <a:xfrm>
             <a:off x="457200" y="-234280"/>
@@ -11176,7 +11325,7 @@
 </p:sld>
 </file>
 
-<file path=ppt/slides/slide27.xml><?xml version="1.0" encoding="utf-8"?>
+<file path=ppt/slides/slide28.xml><?xml version="1.0" encoding="utf-8"?>
 <p:sld xmlns:a="http://schemas.openxmlformats.org/drawingml/2006/main" xmlns:r="http://schemas.openxmlformats.org/officeDocument/2006/relationships" xmlns:p="http://schemas.openxmlformats.org/presentationml/2006/main">
   <p:cSld>
     <p:bg>

</xml_diff>

<commit_message>
Rearranged info about XML comments
</commit_message>
<xml_diff>
--- a/Presentation/lesson-06-xml.pptx
+++ b/Presentation/lesson-06-xml.pptx
@@ -5,7 +5,7 @@
     <p:sldMasterId id="2147483648" r:id="rId1"/>
   </p:sldMasterIdLst>
   <p:notesMasterIdLst>
-    <p:notesMasterId r:id="rId30"/>
+    <p:notesMasterId r:id="rId31"/>
   </p:notesMasterIdLst>
   <p:sldIdLst>
     <p:sldId id="257" r:id="rId2"/>
@@ -30,12 +30,13 @@
     <p:sldId id="283" r:id="rId21"/>
     <p:sldId id="276" r:id="rId22"/>
     <p:sldId id="278" r:id="rId23"/>
-    <p:sldId id="284" r:id="rId24"/>
-    <p:sldId id="287" r:id="rId25"/>
-    <p:sldId id="277" r:id="rId26"/>
-    <p:sldId id="280" r:id="rId27"/>
-    <p:sldId id="282" r:id="rId28"/>
-    <p:sldId id="285" r:id="rId29"/>
+    <p:sldId id="288" r:id="rId24"/>
+    <p:sldId id="284" r:id="rId25"/>
+    <p:sldId id="287" r:id="rId26"/>
+    <p:sldId id="277" r:id="rId27"/>
+    <p:sldId id="280" r:id="rId28"/>
+    <p:sldId id="282" r:id="rId29"/>
+    <p:sldId id="285" r:id="rId30"/>
   </p:sldIdLst>
   <p:sldSz cx="9144000" cy="6858000" type="screen4x3"/>
   <p:notesSz cx="6858000" cy="9144000"/>
@@ -219,7 +220,7 @@
           <a:p>
             <a:fld id="{B24A7054-7FFB-49F4-A126-5DF6E687FF53}" type="datetimeFigureOut">
               <a:rPr lang="ru-RU" smtClean="0"/>
-              <a:t>31.10.2013</a:t>
+              <a:t>11.04.2014</a:t>
             </a:fld>
             <a:endParaRPr lang="ru-RU"/>
           </a:p>
@@ -1282,7 +1283,7 @@
           <a:p>
             <a:fld id="{8E6E6A2A-E9D3-4A0D-B04A-ABDD367A1E08}" type="datetimeFigureOut">
               <a:rPr lang="ru-RU" smtClean="0"/>
-              <a:t>31.10.2013</a:t>
+              <a:t>11.04.2014</a:t>
             </a:fld>
             <a:endParaRPr lang="ru-RU"/>
           </a:p>
@@ -2730,7 +2731,7 @@
           <a:p>
             <a:fld id="{AC3D3127-B7C4-45E3-9797-C527EC9FDD78}" type="datetimeFigureOut">
               <a:rPr lang="ru-RU" smtClean="0"/>
-              <a:t>31.10.2013</a:t>
+              <a:t>11.04.2014</a:t>
             </a:fld>
             <a:endParaRPr lang="ru-RU"/>
           </a:p>
@@ -8575,7 +8576,7 @@
         <p:spPr/>
         <p:txBody>
           <a:bodyPr>
-            <a:normAutofit fontScale="85000" lnSpcReduction="20000"/>
+            <a:normAutofit fontScale="92500" lnSpcReduction="10000"/>
           </a:bodyPr>
           <a:lstStyle/>
           <a:p>
@@ -8618,82 +8619,43 @@
               <a:rPr lang="en-US" dirty="0" smtClean="0"/>
               <a:t>///</a:t>
             </a:r>
+            <a:endParaRPr lang="ru-RU" dirty="0" smtClean="0"/>
           </a:p>
           <a:p>
             <a:r>
               <a:rPr lang="ru-RU" dirty="0" smtClean="0"/>
-              <a:t>Поддерживаемые элементы</a:t>
-            </a:r>
-          </a:p>
-          <a:p>
-            <a:pPr lvl="1"/>
-            <a:r>
-              <a:rPr lang="en-US" dirty="0"/>
-              <a:t>&lt;summary</a:t>
+              <a:t>Являются строковыми комментариями как и </a:t>
             </a:r>
             <a:r>
               <a:rPr lang="en-US" dirty="0" smtClean="0"/>
-              <a:t>&gt;</a:t>
+              <a:t>//</a:t>
             </a:r>
             <a:endParaRPr lang="ru-RU" dirty="0" smtClean="0"/>
           </a:p>
           <a:p>
-            <a:pPr lvl="1"/>
-            <a:r>
-              <a:rPr lang="en-US" dirty="0"/>
-              <a:t>&lt;</a:t>
-            </a:r>
-            <a:r>
-              <a:rPr lang="en-US" dirty="0" err="1"/>
-              <a:t>param</a:t>
-            </a:r>
-            <a:r>
-              <a:rPr lang="en-US" dirty="0"/>
-              <a:t> name</a:t>
+            <a:r>
+              <a:rPr lang="ru-RU" dirty="0" smtClean="0"/>
+              <a:t>П</a:t>
+            </a:r>
+            <a:r>
+              <a:rPr lang="ru-RU" dirty="0" smtClean="0"/>
+              <a:t>рименяются в основном к </a:t>
             </a:r>
             <a:r>
               <a:rPr lang="en-US" dirty="0" smtClean="0"/>
-              <a:t>="</a:t>
+              <a:t>public </a:t>
             </a:r>
             <a:r>
               <a:rPr lang="ru-RU" dirty="0" smtClean="0"/>
-              <a:t>ИмяПараметра</a:t>
+              <a:t>и </a:t>
             </a:r>
             <a:r>
               <a:rPr lang="en-US" dirty="0" smtClean="0"/>
-              <a:t>"&gt;</a:t>
-            </a:r>
-            <a:endParaRPr lang="ru-RU" dirty="0" smtClean="0"/>
-          </a:p>
-          <a:p>
-            <a:pPr lvl="1"/>
-            <a:r>
-              <a:rPr lang="en-US" dirty="0"/>
-              <a:t>&lt;returns</a:t>
-            </a:r>
-            <a:r>
-              <a:rPr lang="en-US" dirty="0" smtClean="0"/>
-              <a:t>&gt;</a:t>
-            </a:r>
-            <a:endParaRPr lang="ru-RU" dirty="0" smtClean="0"/>
-          </a:p>
-          <a:p>
-            <a:pPr lvl="1"/>
-            <a:r>
-              <a:rPr lang="en-US" dirty="0"/>
-              <a:t>&lt;remarks</a:t>
-            </a:r>
-            <a:r>
-              <a:rPr lang="en-US" dirty="0" smtClean="0"/>
-              <a:t>&gt;</a:t>
-            </a:r>
-            <a:endParaRPr lang="ru-RU" dirty="0" smtClean="0"/>
-          </a:p>
-          <a:p>
-            <a:pPr lvl="1"/>
+              <a:t>protected</a:t>
+            </a:r>
             <a:r>
               <a:rPr lang="ru-RU" dirty="0" smtClean="0"/>
-              <a:t>и другие ...</a:t>
+              <a:t> членам/типам</a:t>
             </a:r>
             <a:endParaRPr lang="en-US" dirty="0" smtClean="0"/>
           </a:p>
@@ -8764,6 +8726,923 @@
           <a:lstStyle/>
           <a:p>
             <a:r>
+              <a:rPr lang="ru-RU" dirty="0" smtClean="0"/>
+              <a:t>Элементы </a:t>
+            </a:r>
+            <a:r>
+              <a:rPr lang="en-US" dirty="0" smtClean="0"/>
+              <a:t>XML </a:t>
+            </a:r>
+            <a:r>
+              <a:rPr lang="ru-RU" dirty="0" smtClean="0"/>
+              <a:t>комментариев</a:t>
+            </a:r>
+            <a:endParaRPr lang="ru-RU" dirty="0"/>
+          </a:p>
+        </p:txBody>
+      </p:sp>
+      <p:graphicFrame>
+        <p:nvGraphicFramePr>
+          <p:cNvPr id="4" name="Table 3"/>
+          <p:cNvGraphicFramePr>
+            <a:graphicFrameLocks noGrp="1"/>
+          </p:cNvGraphicFramePr>
+          <p:nvPr>
+            <p:extLst>
+              <p:ext uri="{D42A27DB-BD31-4B8C-83A1-F6EECF244321}">
+                <p14:modId xmlns:p14="http://schemas.microsoft.com/office/powerpoint/2010/main" val="4234408051"/>
+              </p:ext>
+            </p:extLst>
+          </p:nvPr>
+        </p:nvGraphicFramePr>
+        <p:xfrm>
+          <a:off x="575556" y="1340768"/>
+          <a:ext cx="7992888" cy="2768600"/>
+        </p:xfrm>
+        <a:graphic>
+          <a:graphicData uri="http://schemas.openxmlformats.org/drawingml/2006/table">
+            <a:tbl>
+              <a:tblPr firstRow="1" bandRow="1">
+                <a:tableStyleId>{5C22544A-7EE6-4342-B048-85BDC9FD1C3A}</a:tableStyleId>
+              </a:tblPr>
+              <a:tblGrid>
+                <a:gridCol w="3996444"/>
+                <a:gridCol w="3996444"/>
+              </a:tblGrid>
+              <a:tr h="370840">
+                <a:tc>
+                  <a:txBody>
+                    <a:bodyPr/>
+                    <a:lstStyle/>
+                    <a:p>
+                      <a:r>
+                        <a:rPr lang="ru-RU" dirty="0" smtClean="0">
+                          <a:solidFill>
+                            <a:srgbClr val="002060"/>
+                          </a:solidFill>
+                        </a:rPr>
+                        <a:t>Название элемента</a:t>
+                      </a:r>
+                      <a:endParaRPr lang="ru-RU" dirty="0">
+                        <a:solidFill>
+                          <a:srgbClr val="002060"/>
+                        </a:solidFill>
+                      </a:endParaRPr>
+                    </a:p>
+                  </a:txBody>
+                  <a:tcPr>
+                    <a:lnL w="12700" cap="flat" cmpd="sng" algn="ctr">
+                      <a:solidFill>
+                        <a:srgbClr val="002060"/>
+                      </a:solidFill>
+                      <a:prstDash val="solid"/>
+                      <a:round/>
+                      <a:headEnd type="none" w="med" len="med"/>
+                      <a:tailEnd type="none" w="med" len="med"/>
+                    </a:lnL>
+                    <a:lnR w="12700" cap="flat" cmpd="sng" algn="ctr">
+                      <a:solidFill>
+                        <a:srgbClr val="002060"/>
+                      </a:solidFill>
+                      <a:prstDash val="solid"/>
+                      <a:round/>
+                      <a:headEnd type="none" w="med" len="med"/>
+                      <a:tailEnd type="none" w="med" len="med"/>
+                    </a:lnR>
+                    <a:lnT w="12700" cap="flat" cmpd="sng" algn="ctr">
+                      <a:solidFill>
+                        <a:srgbClr val="002060"/>
+                      </a:solidFill>
+                      <a:prstDash val="solid"/>
+                      <a:round/>
+                      <a:headEnd type="none" w="med" len="med"/>
+                      <a:tailEnd type="none" w="med" len="med"/>
+                    </a:lnT>
+                    <a:lnB w="12700" cap="flat" cmpd="sng" algn="ctr">
+                      <a:solidFill>
+                        <a:srgbClr val="002060"/>
+                      </a:solidFill>
+                      <a:prstDash val="solid"/>
+                      <a:round/>
+                      <a:headEnd type="none" w="med" len="med"/>
+                      <a:tailEnd type="none" w="med" len="med"/>
+                    </a:lnB>
+                  </a:tcPr>
+                </a:tc>
+                <a:tc>
+                  <a:txBody>
+                    <a:bodyPr/>
+                    <a:lstStyle/>
+                    <a:p>
+                      <a:r>
+                        <a:rPr lang="ru-RU" dirty="0" smtClean="0">
+                          <a:solidFill>
+                            <a:srgbClr val="002060"/>
+                          </a:solidFill>
+                        </a:rPr>
+                        <a:t>Назначение</a:t>
+                      </a:r>
+                      <a:endParaRPr lang="ru-RU" dirty="0">
+                        <a:solidFill>
+                          <a:srgbClr val="002060"/>
+                        </a:solidFill>
+                      </a:endParaRPr>
+                    </a:p>
+                  </a:txBody>
+                  <a:tcPr>
+                    <a:lnL w="12700" cap="flat" cmpd="sng" algn="ctr">
+                      <a:solidFill>
+                        <a:srgbClr val="002060"/>
+                      </a:solidFill>
+                      <a:prstDash val="solid"/>
+                      <a:round/>
+                      <a:headEnd type="none" w="med" len="med"/>
+                      <a:tailEnd type="none" w="med" len="med"/>
+                    </a:lnL>
+                    <a:lnR w="12700" cap="flat" cmpd="sng" algn="ctr">
+                      <a:solidFill>
+                        <a:srgbClr val="002060"/>
+                      </a:solidFill>
+                      <a:prstDash val="solid"/>
+                      <a:round/>
+                      <a:headEnd type="none" w="med" len="med"/>
+                      <a:tailEnd type="none" w="med" len="med"/>
+                    </a:lnR>
+                    <a:lnT w="12700" cap="flat" cmpd="sng" algn="ctr">
+                      <a:solidFill>
+                        <a:srgbClr val="002060"/>
+                      </a:solidFill>
+                      <a:prstDash val="solid"/>
+                      <a:round/>
+                      <a:headEnd type="none" w="med" len="med"/>
+                      <a:tailEnd type="none" w="med" len="med"/>
+                    </a:lnT>
+                    <a:lnB w="12700" cap="flat" cmpd="sng" algn="ctr">
+                      <a:solidFill>
+                        <a:srgbClr val="002060"/>
+                      </a:solidFill>
+                      <a:prstDash val="solid"/>
+                      <a:round/>
+                      <a:headEnd type="none" w="med" len="med"/>
+                      <a:tailEnd type="none" w="med" len="med"/>
+                    </a:lnB>
+                  </a:tcPr>
+                </a:tc>
+              </a:tr>
+              <a:tr h="370840">
+                <a:tc>
+                  <a:txBody>
+                    <a:bodyPr/>
+                    <a:lstStyle/>
+                    <a:p>
+                      <a:r>
+                        <a:rPr lang="en-US" dirty="0" smtClean="0">
+                          <a:solidFill>
+                            <a:srgbClr val="002060"/>
+                          </a:solidFill>
+                        </a:rPr>
+                        <a:t>&lt;summary&gt;</a:t>
+                      </a:r>
+                      <a:endParaRPr lang="ru-RU" dirty="0">
+                        <a:solidFill>
+                          <a:srgbClr val="002060"/>
+                        </a:solidFill>
+                      </a:endParaRPr>
+                    </a:p>
+                  </a:txBody>
+                  <a:tcPr>
+                    <a:lnL w="12700" cap="flat" cmpd="sng" algn="ctr">
+                      <a:solidFill>
+                        <a:srgbClr val="002060"/>
+                      </a:solidFill>
+                      <a:prstDash val="solid"/>
+                      <a:round/>
+                      <a:headEnd type="none" w="med" len="med"/>
+                      <a:tailEnd type="none" w="med" len="med"/>
+                    </a:lnL>
+                    <a:lnR w="12700" cap="flat" cmpd="sng" algn="ctr">
+                      <a:solidFill>
+                        <a:srgbClr val="002060"/>
+                      </a:solidFill>
+                      <a:prstDash val="solid"/>
+                      <a:round/>
+                      <a:headEnd type="none" w="med" len="med"/>
+                      <a:tailEnd type="none" w="med" len="med"/>
+                    </a:lnR>
+                    <a:lnT w="12700" cap="flat" cmpd="sng" algn="ctr">
+                      <a:solidFill>
+                        <a:srgbClr val="002060"/>
+                      </a:solidFill>
+                      <a:prstDash val="solid"/>
+                      <a:round/>
+                      <a:headEnd type="none" w="med" len="med"/>
+                      <a:tailEnd type="none" w="med" len="med"/>
+                    </a:lnT>
+                    <a:lnB w="12700" cap="flat" cmpd="sng" algn="ctr">
+                      <a:solidFill>
+                        <a:srgbClr val="002060"/>
+                      </a:solidFill>
+                      <a:prstDash val="solid"/>
+                      <a:round/>
+                      <a:headEnd type="none" w="med" len="med"/>
+                      <a:tailEnd type="none" w="med" len="med"/>
+                    </a:lnB>
+                  </a:tcPr>
+                </a:tc>
+                <a:tc>
+                  <a:txBody>
+                    <a:bodyPr/>
+                    <a:lstStyle/>
+                    <a:p>
+                      <a:r>
+                        <a:rPr lang="ru-RU" dirty="0" smtClean="0">
+                          <a:solidFill>
+                            <a:srgbClr val="002060"/>
+                          </a:solidFill>
+                        </a:rPr>
+                        <a:t>Общее</a:t>
+                      </a:r>
+                      <a:r>
+                        <a:rPr lang="ru-RU" baseline="0" dirty="0" smtClean="0">
+                          <a:solidFill>
+                            <a:srgbClr val="002060"/>
+                          </a:solidFill>
+                        </a:rPr>
+                        <a:t> описание. Видно в </a:t>
+                      </a:r>
+                      <a:r>
+                        <a:rPr lang="en-US" baseline="0" dirty="0" smtClean="0">
+                          <a:solidFill>
+                            <a:srgbClr val="002060"/>
+                          </a:solidFill>
+                        </a:rPr>
+                        <a:t>IntelliSense</a:t>
+                      </a:r>
+                      <a:endParaRPr lang="ru-RU" dirty="0">
+                        <a:solidFill>
+                          <a:srgbClr val="002060"/>
+                        </a:solidFill>
+                      </a:endParaRPr>
+                    </a:p>
+                  </a:txBody>
+                  <a:tcPr>
+                    <a:lnL w="12700" cap="flat" cmpd="sng" algn="ctr">
+                      <a:solidFill>
+                        <a:srgbClr val="002060"/>
+                      </a:solidFill>
+                      <a:prstDash val="solid"/>
+                      <a:round/>
+                      <a:headEnd type="none" w="med" len="med"/>
+                      <a:tailEnd type="none" w="med" len="med"/>
+                    </a:lnL>
+                    <a:lnR w="12700" cap="flat" cmpd="sng" algn="ctr">
+                      <a:solidFill>
+                        <a:srgbClr val="002060"/>
+                      </a:solidFill>
+                      <a:prstDash val="solid"/>
+                      <a:round/>
+                      <a:headEnd type="none" w="med" len="med"/>
+                      <a:tailEnd type="none" w="med" len="med"/>
+                    </a:lnR>
+                    <a:lnT w="12700" cap="flat" cmpd="sng" algn="ctr">
+                      <a:solidFill>
+                        <a:srgbClr val="002060"/>
+                      </a:solidFill>
+                      <a:prstDash val="solid"/>
+                      <a:round/>
+                      <a:headEnd type="none" w="med" len="med"/>
+                      <a:tailEnd type="none" w="med" len="med"/>
+                    </a:lnT>
+                    <a:lnB w="12700" cap="flat" cmpd="sng" algn="ctr">
+                      <a:solidFill>
+                        <a:srgbClr val="002060"/>
+                      </a:solidFill>
+                      <a:prstDash val="solid"/>
+                      <a:round/>
+                      <a:headEnd type="none" w="med" len="med"/>
+                      <a:tailEnd type="none" w="med" len="med"/>
+                    </a:lnB>
+                  </a:tcPr>
+                </a:tc>
+              </a:tr>
+              <a:tr h="370840">
+                <a:tc>
+                  <a:txBody>
+                    <a:bodyPr/>
+                    <a:lstStyle/>
+                    <a:p>
+                      <a:r>
+                        <a:rPr lang="en-US" dirty="0" smtClean="0">
+                          <a:solidFill>
+                            <a:srgbClr val="002060"/>
+                          </a:solidFill>
+                        </a:rPr>
+                        <a:t>&lt;</a:t>
+                      </a:r>
+                      <a:r>
+                        <a:rPr lang="en-US" dirty="0" err="1" smtClean="0">
+                          <a:solidFill>
+                            <a:srgbClr val="002060"/>
+                          </a:solidFill>
+                        </a:rPr>
+                        <a:t>param</a:t>
+                      </a:r>
+                      <a:r>
+                        <a:rPr lang="en-US" dirty="0" smtClean="0">
+                          <a:solidFill>
+                            <a:srgbClr val="002060"/>
+                          </a:solidFill>
+                        </a:rPr>
+                        <a:t> name="</a:t>
+                      </a:r>
+                      <a:r>
+                        <a:rPr lang="ru-RU" dirty="0" smtClean="0">
+                          <a:solidFill>
+                            <a:srgbClr val="002060"/>
+                          </a:solidFill>
+                        </a:rPr>
+                        <a:t>Имя Параметра"&gt;</a:t>
+                      </a:r>
+                      <a:endParaRPr lang="ru-RU" dirty="0">
+                        <a:solidFill>
+                          <a:srgbClr val="002060"/>
+                        </a:solidFill>
+                      </a:endParaRPr>
+                    </a:p>
+                  </a:txBody>
+                  <a:tcPr>
+                    <a:lnL w="12700" cap="flat" cmpd="sng" algn="ctr">
+                      <a:solidFill>
+                        <a:srgbClr val="002060"/>
+                      </a:solidFill>
+                      <a:prstDash val="solid"/>
+                      <a:round/>
+                      <a:headEnd type="none" w="med" len="med"/>
+                      <a:tailEnd type="none" w="med" len="med"/>
+                    </a:lnL>
+                    <a:lnR w="12700" cap="flat" cmpd="sng" algn="ctr">
+                      <a:solidFill>
+                        <a:srgbClr val="002060"/>
+                      </a:solidFill>
+                      <a:prstDash val="solid"/>
+                      <a:round/>
+                      <a:headEnd type="none" w="med" len="med"/>
+                      <a:tailEnd type="none" w="med" len="med"/>
+                    </a:lnR>
+                    <a:lnT w="12700" cap="flat" cmpd="sng" algn="ctr">
+                      <a:solidFill>
+                        <a:srgbClr val="002060"/>
+                      </a:solidFill>
+                      <a:prstDash val="solid"/>
+                      <a:round/>
+                      <a:headEnd type="none" w="med" len="med"/>
+                      <a:tailEnd type="none" w="med" len="med"/>
+                    </a:lnT>
+                    <a:lnB w="12700" cap="flat" cmpd="sng" algn="ctr">
+                      <a:solidFill>
+                        <a:srgbClr val="002060"/>
+                      </a:solidFill>
+                      <a:prstDash val="solid"/>
+                      <a:round/>
+                      <a:headEnd type="none" w="med" len="med"/>
+                      <a:tailEnd type="none" w="med" len="med"/>
+                    </a:lnB>
+                  </a:tcPr>
+                </a:tc>
+                <a:tc>
+                  <a:txBody>
+                    <a:bodyPr/>
+                    <a:lstStyle/>
+                    <a:p>
+                      <a:r>
+                        <a:rPr lang="ru-RU" dirty="0" smtClean="0">
+                          <a:solidFill>
+                            <a:srgbClr val="002060"/>
+                          </a:solidFill>
+                        </a:rPr>
+                        <a:t>Описание параметра метода</a:t>
+                      </a:r>
+                      <a:endParaRPr lang="ru-RU" dirty="0">
+                        <a:solidFill>
+                          <a:srgbClr val="002060"/>
+                        </a:solidFill>
+                      </a:endParaRPr>
+                    </a:p>
+                  </a:txBody>
+                  <a:tcPr>
+                    <a:lnL w="12700" cap="flat" cmpd="sng" algn="ctr">
+                      <a:solidFill>
+                        <a:srgbClr val="002060"/>
+                      </a:solidFill>
+                      <a:prstDash val="solid"/>
+                      <a:round/>
+                      <a:headEnd type="none" w="med" len="med"/>
+                      <a:tailEnd type="none" w="med" len="med"/>
+                    </a:lnL>
+                    <a:lnR w="12700" cap="flat" cmpd="sng" algn="ctr">
+                      <a:solidFill>
+                        <a:srgbClr val="002060"/>
+                      </a:solidFill>
+                      <a:prstDash val="solid"/>
+                      <a:round/>
+                      <a:headEnd type="none" w="med" len="med"/>
+                      <a:tailEnd type="none" w="med" len="med"/>
+                    </a:lnR>
+                    <a:lnT w="12700" cap="flat" cmpd="sng" algn="ctr">
+                      <a:solidFill>
+                        <a:srgbClr val="002060"/>
+                      </a:solidFill>
+                      <a:prstDash val="solid"/>
+                      <a:round/>
+                      <a:headEnd type="none" w="med" len="med"/>
+                      <a:tailEnd type="none" w="med" len="med"/>
+                    </a:lnT>
+                    <a:lnB w="12700" cap="flat" cmpd="sng" algn="ctr">
+                      <a:solidFill>
+                        <a:srgbClr val="002060"/>
+                      </a:solidFill>
+                      <a:prstDash val="solid"/>
+                      <a:round/>
+                      <a:headEnd type="none" w="med" len="med"/>
+                      <a:tailEnd type="none" w="med" len="med"/>
+                    </a:lnB>
+                  </a:tcPr>
+                </a:tc>
+              </a:tr>
+              <a:tr h="370840">
+                <a:tc>
+                  <a:txBody>
+                    <a:bodyPr/>
+                    <a:lstStyle/>
+                    <a:p>
+                      <a:r>
+                        <a:rPr lang="en-US" dirty="0" smtClean="0">
+                          <a:solidFill>
+                            <a:srgbClr val="002060"/>
+                          </a:solidFill>
+                        </a:rPr>
+                        <a:t>&lt;returns&gt;</a:t>
+                      </a:r>
+                      <a:endParaRPr lang="ru-RU" dirty="0">
+                        <a:solidFill>
+                          <a:srgbClr val="002060"/>
+                        </a:solidFill>
+                      </a:endParaRPr>
+                    </a:p>
+                  </a:txBody>
+                  <a:tcPr>
+                    <a:lnL w="12700" cap="flat" cmpd="sng" algn="ctr">
+                      <a:solidFill>
+                        <a:srgbClr val="002060"/>
+                      </a:solidFill>
+                      <a:prstDash val="solid"/>
+                      <a:round/>
+                      <a:headEnd type="none" w="med" len="med"/>
+                      <a:tailEnd type="none" w="med" len="med"/>
+                    </a:lnL>
+                    <a:lnR w="12700" cap="flat" cmpd="sng" algn="ctr">
+                      <a:solidFill>
+                        <a:srgbClr val="002060"/>
+                      </a:solidFill>
+                      <a:prstDash val="solid"/>
+                      <a:round/>
+                      <a:headEnd type="none" w="med" len="med"/>
+                      <a:tailEnd type="none" w="med" len="med"/>
+                    </a:lnR>
+                    <a:lnT w="12700" cap="flat" cmpd="sng" algn="ctr">
+                      <a:solidFill>
+                        <a:srgbClr val="002060"/>
+                      </a:solidFill>
+                      <a:prstDash val="solid"/>
+                      <a:round/>
+                      <a:headEnd type="none" w="med" len="med"/>
+                      <a:tailEnd type="none" w="med" len="med"/>
+                    </a:lnT>
+                    <a:lnB w="12700" cap="flat" cmpd="sng" algn="ctr">
+                      <a:solidFill>
+                        <a:srgbClr val="002060"/>
+                      </a:solidFill>
+                      <a:prstDash val="solid"/>
+                      <a:round/>
+                      <a:headEnd type="none" w="med" len="med"/>
+                      <a:tailEnd type="none" w="med" len="med"/>
+                    </a:lnB>
+                  </a:tcPr>
+                </a:tc>
+                <a:tc>
+                  <a:txBody>
+                    <a:bodyPr/>
+                    <a:lstStyle/>
+                    <a:p>
+                      <a:r>
+                        <a:rPr lang="ru-RU" dirty="0" smtClean="0">
+                          <a:solidFill>
+                            <a:srgbClr val="002060"/>
+                          </a:solidFill>
+                        </a:rPr>
+                        <a:t>Описание возвращаемого</a:t>
+                      </a:r>
+                      <a:r>
+                        <a:rPr lang="ru-RU" baseline="0" dirty="0" smtClean="0">
+                          <a:solidFill>
+                            <a:srgbClr val="002060"/>
+                          </a:solidFill>
+                        </a:rPr>
+                        <a:t> значения</a:t>
+                      </a:r>
+                      <a:endParaRPr lang="ru-RU" dirty="0">
+                        <a:solidFill>
+                          <a:srgbClr val="002060"/>
+                        </a:solidFill>
+                      </a:endParaRPr>
+                    </a:p>
+                  </a:txBody>
+                  <a:tcPr>
+                    <a:lnL w="12700" cap="flat" cmpd="sng" algn="ctr">
+                      <a:solidFill>
+                        <a:srgbClr val="002060"/>
+                      </a:solidFill>
+                      <a:prstDash val="solid"/>
+                      <a:round/>
+                      <a:headEnd type="none" w="med" len="med"/>
+                      <a:tailEnd type="none" w="med" len="med"/>
+                    </a:lnL>
+                    <a:lnR w="12700" cap="flat" cmpd="sng" algn="ctr">
+                      <a:solidFill>
+                        <a:srgbClr val="002060"/>
+                      </a:solidFill>
+                      <a:prstDash val="solid"/>
+                      <a:round/>
+                      <a:headEnd type="none" w="med" len="med"/>
+                      <a:tailEnd type="none" w="med" len="med"/>
+                    </a:lnR>
+                    <a:lnT w="12700" cap="flat" cmpd="sng" algn="ctr">
+                      <a:solidFill>
+                        <a:srgbClr val="002060"/>
+                      </a:solidFill>
+                      <a:prstDash val="solid"/>
+                      <a:round/>
+                      <a:headEnd type="none" w="med" len="med"/>
+                      <a:tailEnd type="none" w="med" len="med"/>
+                    </a:lnT>
+                    <a:lnB w="12700" cap="flat" cmpd="sng" algn="ctr">
+                      <a:solidFill>
+                        <a:srgbClr val="002060"/>
+                      </a:solidFill>
+                      <a:prstDash val="solid"/>
+                      <a:round/>
+                      <a:headEnd type="none" w="med" len="med"/>
+                      <a:tailEnd type="none" w="med" len="med"/>
+                    </a:lnB>
+                  </a:tcPr>
+                </a:tc>
+              </a:tr>
+              <a:tr h="370840">
+                <a:tc>
+                  <a:txBody>
+                    <a:bodyPr/>
+                    <a:lstStyle/>
+                    <a:p>
+                      <a:r>
+                        <a:rPr lang="en-US" dirty="0" smtClean="0">
+                          <a:solidFill>
+                            <a:srgbClr val="002060"/>
+                          </a:solidFill>
+                        </a:rPr>
+                        <a:t>&lt;remarks&gt;</a:t>
+                      </a:r>
+                      <a:endParaRPr lang="ru-RU" dirty="0">
+                        <a:solidFill>
+                          <a:srgbClr val="002060"/>
+                        </a:solidFill>
+                      </a:endParaRPr>
+                    </a:p>
+                  </a:txBody>
+                  <a:tcPr>
+                    <a:lnL w="12700" cap="flat" cmpd="sng" algn="ctr">
+                      <a:solidFill>
+                        <a:srgbClr val="002060"/>
+                      </a:solidFill>
+                      <a:prstDash val="solid"/>
+                      <a:round/>
+                      <a:headEnd type="none" w="med" len="med"/>
+                      <a:tailEnd type="none" w="med" len="med"/>
+                    </a:lnL>
+                    <a:lnR w="12700" cap="flat" cmpd="sng" algn="ctr">
+                      <a:solidFill>
+                        <a:srgbClr val="002060"/>
+                      </a:solidFill>
+                      <a:prstDash val="solid"/>
+                      <a:round/>
+                      <a:headEnd type="none" w="med" len="med"/>
+                      <a:tailEnd type="none" w="med" len="med"/>
+                    </a:lnR>
+                    <a:lnT w="12700" cap="flat" cmpd="sng" algn="ctr">
+                      <a:solidFill>
+                        <a:srgbClr val="002060"/>
+                      </a:solidFill>
+                      <a:prstDash val="solid"/>
+                      <a:round/>
+                      <a:headEnd type="none" w="med" len="med"/>
+                      <a:tailEnd type="none" w="med" len="med"/>
+                    </a:lnT>
+                    <a:lnB w="12700" cap="flat" cmpd="sng" algn="ctr">
+                      <a:solidFill>
+                        <a:srgbClr val="002060"/>
+                      </a:solidFill>
+                      <a:prstDash val="solid"/>
+                      <a:round/>
+                      <a:headEnd type="none" w="med" len="med"/>
+                      <a:tailEnd type="none" w="med" len="med"/>
+                    </a:lnB>
+                  </a:tcPr>
+                </a:tc>
+                <a:tc>
+                  <a:txBody>
+                    <a:bodyPr/>
+                    <a:lstStyle/>
+                    <a:p>
+                      <a:r>
+                        <a:rPr lang="ru-RU" dirty="0" smtClean="0">
+                          <a:solidFill>
+                            <a:srgbClr val="002060"/>
+                          </a:solidFill>
+                        </a:rPr>
+                        <a:t>Дополнительные комментарии</a:t>
+                      </a:r>
+                      <a:endParaRPr lang="ru-RU" dirty="0">
+                        <a:solidFill>
+                          <a:srgbClr val="002060"/>
+                        </a:solidFill>
+                      </a:endParaRPr>
+                    </a:p>
+                  </a:txBody>
+                  <a:tcPr>
+                    <a:lnL w="12700" cap="flat" cmpd="sng" algn="ctr">
+                      <a:solidFill>
+                        <a:srgbClr val="002060"/>
+                      </a:solidFill>
+                      <a:prstDash val="solid"/>
+                      <a:round/>
+                      <a:headEnd type="none" w="med" len="med"/>
+                      <a:tailEnd type="none" w="med" len="med"/>
+                    </a:lnL>
+                    <a:lnR w="12700" cap="flat" cmpd="sng" algn="ctr">
+                      <a:solidFill>
+                        <a:srgbClr val="002060"/>
+                      </a:solidFill>
+                      <a:prstDash val="solid"/>
+                      <a:round/>
+                      <a:headEnd type="none" w="med" len="med"/>
+                      <a:tailEnd type="none" w="med" len="med"/>
+                    </a:lnR>
+                    <a:lnT w="12700" cap="flat" cmpd="sng" algn="ctr">
+                      <a:solidFill>
+                        <a:srgbClr val="002060"/>
+                      </a:solidFill>
+                      <a:prstDash val="solid"/>
+                      <a:round/>
+                      <a:headEnd type="none" w="med" len="med"/>
+                      <a:tailEnd type="none" w="med" len="med"/>
+                    </a:lnT>
+                    <a:lnB w="12700" cap="flat" cmpd="sng" algn="ctr">
+                      <a:solidFill>
+                        <a:srgbClr val="002060"/>
+                      </a:solidFill>
+                      <a:prstDash val="solid"/>
+                      <a:round/>
+                      <a:headEnd type="none" w="med" len="med"/>
+                      <a:tailEnd type="none" w="med" len="med"/>
+                    </a:lnB>
+                  </a:tcPr>
+                </a:tc>
+              </a:tr>
+              <a:tr h="370840">
+                <a:tc>
+                  <a:txBody>
+                    <a:bodyPr/>
+                    <a:lstStyle/>
+                    <a:p>
+                      <a:r>
+                        <a:rPr lang="en-US" dirty="0" smtClean="0">
+                          <a:solidFill>
+                            <a:srgbClr val="002060"/>
+                          </a:solidFill>
+                        </a:rPr>
+                        <a:t>&lt;exception </a:t>
+                      </a:r>
+                      <a:r>
+                        <a:rPr lang="en-US" dirty="0" err="1" smtClean="0">
+                          <a:solidFill>
+                            <a:srgbClr val="002060"/>
+                          </a:solidFill>
+                        </a:rPr>
+                        <a:t>cref</a:t>
+                      </a:r>
+                      <a:r>
+                        <a:rPr lang="en-US" dirty="0" smtClean="0">
+                          <a:solidFill>
+                            <a:srgbClr val="002060"/>
+                          </a:solidFill>
+                        </a:rPr>
+                        <a:t>=</a:t>
+                      </a:r>
+                      <a:r>
+                        <a:rPr lang="en-US" dirty="0" smtClean="0">
+                          <a:solidFill>
+                            <a:srgbClr val="002060"/>
+                          </a:solidFill>
+                        </a:rPr>
+                        <a:t>"</a:t>
+                      </a:r>
+                      <a:r>
+                        <a:rPr lang="ru-RU" dirty="0" smtClean="0">
+                          <a:solidFill>
+                            <a:srgbClr val="002060"/>
+                          </a:solidFill>
+                        </a:rPr>
+                        <a:t>Имя</a:t>
+                      </a:r>
+                      <a:r>
+                        <a:rPr lang="ru-RU" baseline="0" dirty="0" smtClean="0">
+                          <a:solidFill>
+                            <a:srgbClr val="002060"/>
+                          </a:solidFill>
+                        </a:rPr>
+                        <a:t> Типа</a:t>
+                      </a:r>
+                      <a:r>
+                        <a:rPr lang="en-US" dirty="0" smtClean="0">
+                          <a:solidFill>
+                            <a:srgbClr val="002060"/>
+                          </a:solidFill>
+                        </a:rPr>
+                        <a:t>"&gt;</a:t>
+                      </a:r>
+                      <a:endParaRPr lang="ru-RU" dirty="0">
+                        <a:solidFill>
+                          <a:srgbClr val="002060"/>
+                        </a:solidFill>
+                      </a:endParaRPr>
+                    </a:p>
+                  </a:txBody>
+                  <a:tcPr>
+                    <a:lnL w="12700" cap="flat" cmpd="sng" algn="ctr">
+                      <a:solidFill>
+                        <a:srgbClr val="002060"/>
+                      </a:solidFill>
+                      <a:prstDash val="solid"/>
+                      <a:round/>
+                      <a:headEnd type="none" w="med" len="med"/>
+                      <a:tailEnd type="none" w="med" len="med"/>
+                    </a:lnL>
+                    <a:lnR w="12700" cap="flat" cmpd="sng" algn="ctr">
+                      <a:solidFill>
+                        <a:srgbClr val="002060"/>
+                      </a:solidFill>
+                      <a:prstDash val="solid"/>
+                      <a:round/>
+                      <a:headEnd type="none" w="med" len="med"/>
+                      <a:tailEnd type="none" w="med" len="med"/>
+                    </a:lnR>
+                    <a:lnT w="12700" cap="flat" cmpd="sng" algn="ctr">
+                      <a:solidFill>
+                        <a:srgbClr val="002060"/>
+                      </a:solidFill>
+                      <a:prstDash val="solid"/>
+                      <a:round/>
+                      <a:headEnd type="none" w="med" len="med"/>
+                      <a:tailEnd type="none" w="med" len="med"/>
+                    </a:lnT>
+                    <a:lnB w="12700" cap="flat" cmpd="sng" algn="ctr">
+                      <a:solidFill>
+                        <a:srgbClr val="002060"/>
+                      </a:solidFill>
+                      <a:prstDash val="solid"/>
+                      <a:round/>
+                      <a:headEnd type="none" w="med" len="med"/>
+                      <a:tailEnd type="none" w="med" len="med"/>
+                    </a:lnB>
+                  </a:tcPr>
+                </a:tc>
+                <a:tc>
+                  <a:txBody>
+                    <a:bodyPr/>
+                    <a:lstStyle/>
+                    <a:p>
+                      <a:r>
+                        <a:rPr lang="ru-RU" dirty="0" smtClean="0">
+                          <a:solidFill>
+                            <a:srgbClr val="002060"/>
+                          </a:solidFill>
+                        </a:rPr>
+                        <a:t>Описание</a:t>
+                      </a:r>
+                      <a:r>
+                        <a:rPr lang="ru-RU" baseline="0" dirty="0" smtClean="0">
+                          <a:solidFill>
+                            <a:srgbClr val="002060"/>
+                          </a:solidFill>
+                        </a:rPr>
+                        <a:t> причины по которой данный член генерирует заданное исключение.</a:t>
+                      </a:r>
+                      <a:endParaRPr lang="ru-RU" dirty="0">
+                        <a:solidFill>
+                          <a:srgbClr val="002060"/>
+                        </a:solidFill>
+                      </a:endParaRPr>
+                    </a:p>
+                  </a:txBody>
+                  <a:tcPr>
+                    <a:lnL w="12700" cap="flat" cmpd="sng" algn="ctr">
+                      <a:solidFill>
+                        <a:srgbClr val="002060"/>
+                      </a:solidFill>
+                      <a:prstDash val="solid"/>
+                      <a:round/>
+                      <a:headEnd type="none" w="med" len="med"/>
+                      <a:tailEnd type="none" w="med" len="med"/>
+                    </a:lnL>
+                    <a:lnR w="12700" cap="flat" cmpd="sng" algn="ctr">
+                      <a:solidFill>
+                        <a:srgbClr val="002060"/>
+                      </a:solidFill>
+                      <a:prstDash val="solid"/>
+                      <a:round/>
+                      <a:headEnd type="none" w="med" len="med"/>
+                      <a:tailEnd type="none" w="med" len="med"/>
+                    </a:lnR>
+                    <a:lnT w="12700" cap="flat" cmpd="sng" algn="ctr">
+                      <a:solidFill>
+                        <a:srgbClr val="002060"/>
+                      </a:solidFill>
+                      <a:prstDash val="solid"/>
+                      <a:round/>
+                      <a:headEnd type="none" w="med" len="med"/>
+                      <a:tailEnd type="none" w="med" len="med"/>
+                    </a:lnT>
+                    <a:lnB w="12700" cap="flat" cmpd="sng" algn="ctr">
+                      <a:solidFill>
+                        <a:srgbClr val="002060"/>
+                      </a:solidFill>
+                      <a:prstDash val="solid"/>
+                      <a:round/>
+                      <a:headEnd type="none" w="med" len="med"/>
+                      <a:tailEnd type="none" w="med" len="med"/>
+                    </a:lnB>
+                  </a:tcPr>
+                </a:tc>
+              </a:tr>
+            </a:tbl>
+          </a:graphicData>
+        </a:graphic>
+      </p:graphicFrame>
+    </p:spTree>
+    <p:extLst>
+      <p:ext uri="{BB962C8B-B14F-4D97-AF65-F5344CB8AC3E}">
+        <p14:creationId xmlns:p14="http://schemas.microsoft.com/office/powerpoint/2010/main" val="2556787862"/>
+      </p:ext>
+    </p:extLst>
+  </p:cSld>
+  <p:clrMapOvr>
+    <a:masterClrMapping/>
+  </p:clrMapOvr>
+</p:sld>
+</file>
+
+<file path=ppt/slides/slide24.xml><?xml version="1.0" encoding="utf-8"?>
+<p:sld xmlns:a="http://schemas.openxmlformats.org/drawingml/2006/main" xmlns:r="http://schemas.openxmlformats.org/officeDocument/2006/relationships" xmlns:p="http://schemas.openxmlformats.org/presentationml/2006/main">
+  <p:cSld>
+    <p:spTree>
+      <p:nvGrpSpPr>
+        <p:cNvPr id="1" name=""/>
+        <p:cNvGrpSpPr/>
+        <p:nvPr/>
+      </p:nvGrpSpPr>
+      <p:grpSpPr>
+        <a:xfrm>
+          <a:off x="0" y="0"/>
+          <a:ext cx="0" cy="0"/>
+          <a:chOff x="0" y="0"/>
+          <a:chExt cx="0" cy="0"/>
+        </a:xfrm>
+      </p:grpSpPr>
+      <p:sp>
+        <p:nvSpPr>
+          <p:cNvPr id="2" name="Title 1"/>
+          <p:cNvSpPr>
+            <a:spLocks noGrp="1"/>
+          </p:cNvSpPr>
+          <p:nvPr>
+            <p:ph type="title"/>
+          </p:nvPr>
+        </p:nvSpPr>
+        <p:spPr/>
+        <p:txBody>
+          <a:bodyPr/>
+          <a:lstStyle/>
+          <a:p>
+            <a:r>
               <a:rPr lang="en-US" dirty="0" smtClean="0"/>
               <a:t>XML </a:t>
             </a:r>
@@ -8887,136 +9766,6 @@
     <p:extLst>
       <p:ext uri="{BB962C8B-B14F-4D97-AF65-F5344CB8AC3E}">
         <p14:creationId xmlns:p14="http://schemas.microsoft.com/office/powerpoint/2010/main" val="238274862"/>
-      </p:ext>
-    </p:extLst>
-  </p:cSld>
-  <p:clrMapOvr>
-    <a:masterClrMapping/>
-  </p:clrMapOvr>
-  <p:timing>
-    <p:tnLst>
-      <p:par>
-        <p:cTn id="1" dur="indefinite" restart="never" nodeType="tmRoot"/>
-      </p:par>
-    </p:tnLst>
-  </p:timing>
-</p:sld>
-</file>
-
-<file path=ppt/slides/slide24.xml><?xml version="1.0" encoding="utf-8"?>
-<p:sld xmlns:a="http://schemas.openxmlformats.org/drawingml/2006/main" xmlns:r="http://schemas.openxmlformats.org/officeDocument/2006/relationships" xmlns:p="http://schemas.openxmlformats.org/presentationml/2006/main">
-  <p:cSld>
-    <p:spTree>
-      <p:nvGrpSpPr>
-        <p:cNvPr id="1" name=""/>
-        <p:cNvGrpSpPr/>
-        <p:nvPr/>
-      </p:nvGrpSpPr>
-      <p:grpSpPr>
-        <a:xfrm>
-          <a:off x="0" y="0"/>
-          <a:ext cx="0" cy="0"/>
-          <a:chOff x="0" y="0"/>
-          <a:chExt cx="0" cy="0"/>
-        </a:xfrm>
-      </p:grpSpPr>
-      <p:sp>
-        <p:nvSpPr>
-          <p:cNvPr id="2" name="Title 1"/>
-          <p:cNvSpPr>
-            <a:spLocks noGrp="1"/>
-          </p:cNvSpPr>
-          <p:nvPr>
-            <p:ph type="title"/>
-          </p:nvPr>
-        </p:nvSpPr>
-        <p:spPr/>
-        <p:txBody>
-          <a:bodyPr/>
-          <a:lstStyle/>
-          <a:p>
-            <a:r>
-              <a:rPr lang="en-US" dirty="0" smtClean="0"/>
-              <a:t>XML </a:t>
-            </a:r>
-            <a:r>
-              <a:rPr lang="ru-RU" dirty="0" smtClean="0"/>
-              <a:t>комментарии</a:t>
-            </a:r>
-            <a:r>
-              <a:rPr lang="en-US" dirty="0" smtClean="0"/>
-              <a:t>: Sandcastle</a:t>
-            </a:r>
-            <a:endParaRPr lang="ru-RU" dirty="0"/>
-          </a:p>
-        </p:txBody>
-      </p:sp>
-      <p:sp>
-        <p:nvSpPr>
-          <p:cNvPr id="3" name="Content Placeholder 2"/>
-          <p:cNvSpPr>
-            <a:spLocks noGrp="1"/>
-          </p:cNvSpPr>
-          <p:nvPr>
-            <p:ph idx="1"/>
-          </p:nvPr>
-        </p:nvSpPr>
-        <p:spPr/>
-        <p:txBody>
-          <a:bodyPr>
-            <a:normAutofit/>
-          </a:bodyPr>
-          <a:lstStyle/>
-          <a:p>
-            <a:pPr marL="0" indent="0">
-              <a:buNone/>
-            </a:pPr>
-            <a:r>
-              <a:rPr lang="ru-RU" dirty="0" smtClean="0"/>
-              <a:t>Полученный </a:t>
-            </a:r>
-            <a:r>
-              <a:rPr lang="en-US" dirty="0" smtClean="0"/>
-              <a:t>XML </a:t>
-            </a:r>
-            <a:r>
-              <a:rPr lang="ru-RU" dirty="0" smtClean="0"/>
-              <a:t>файл неудобен для чтения человеком. Однако его можно обработать с помощью программы </a:t>
-            </a:r>
-            <a:r>
-              <a:rPr lang="en-US" dirty="0" smtClean="0"/>
-              <a:t>Sandcastle</a:t>
-            </a:r>
-            <a:r>
-              <a:rPr lang="en-US" dirty="0"/>
-              <a:t> </a:t>
-            </a:r>
-            <a:r>
-              <a:rPr lang="en-US" dirty="0" smtClean="0"/>
-              <a:t>(</a:t>
-            </a:r>
-            <a:r>
-              <a:rPr lang="en-US" dirty="0" smtClean="0">
-                <a:hlinkClick r:id="rId2"/>
-              </a:rPr>
-              <a:t>shfb.codeplex.com</a:t>
-            </a:r>
-            <a:r>
-              <a:rPr lang="en-US" dirty="0" smtClean="0"/>
-              <a:t>) </a:t>
-            </a:r>
-            <a:r>
-              <a:rPr lang="ru-RU" dirty="0" smtClean="0"/>
-              <a:t>и получить файл(ы) справки.</a:t>
-            </a:r>
-            <a:endParaRPr lang="en-US" dirty="0" smtClean="0"/>
-          </a:p>
-        </p:txBody>
-      </p:sp>
-    </p:spTree>
-    <p:extLst>
-      <p:ext uri="{BB962C8B-B14F-4D97-AF65-F5344CB8AC3E}">
-        <p14:creationId xmlns:p14="http://schemas.microsoft.com/office/powerpoint/2010/main" val="2734608499"/>
       </p:ext>
     </p:extLst>
   </p:cSld>
@@ -9060,44 +9809,106 @@
             <p:ph type="title"/>
           </p:nvPr>
         </p:nvSpPr>
-        <p:spPr>
-          <a:xfrm>
-            <a:off x="457200" y="2857500"/>
-            <a:ext cx="8229600" cy="1143000"/>
-          </a:xfrm>
-        </p:spPr>
+        <p:spPr/>
+        <p:txBody>
+          <a:bodyPr/>
+          <a:lstStyle/>
+          <a:p>
+            <a:r>
+              <a:rPr lang="en-US" dirty="0" smtClean="0"/>
+              <a:t>XML </a:t>
+            </a:r>
+            <a:r>
+              <a:rPr lang="ru-RU" dirty="0" smtClean="0"/>
+              <a:t>комментарии</a:t>
+            </a:r>
+            <a:r>
+              <a:rPr lang="en-US" dirty="0" smtClean="0"/>
+              <a:t>: Sandcastle</a:t>
+            </a:r>
+            <a:endParaRPr lang="ru-RU" dirty="0"/>
+          </a:p>
+        </p:txBody>
+      </p:sp>
+      <p:sp>
+        <p:nvSpPr>
+          <p:cNvPr id="3" name="Content Placeholder 2"/>
+          <p:cNvSpPr>
+            <a:spLocks noGrp="1"/>
+          </p:cNvSpPr>
+          <p:nvPr>
+            <p:ph idx="1"/>
+          </p:nvPr>
+        </p:nvSpPr>
+        <p:spPr/>
         <p:txBody>
           <a:bodyPr>
             <a:normAutofit/>
           </a:bodyPr>
           <a:lstStyle/>
           <a:p>
+            <a:pPr marL="0" indent="0">
+              <a:buNone/>
+            </a:pPr>
             <a:r>
               <a:rPr lang="ru-RU" dirty="0" smtClean="0"/>
-              <a:t>Чтение </a:t>
+              <a:t>Полученный </a:t>
             </a:r>
             <a:r>
               <a:rPr lang="en-US" dirty="0" smtClean="0"/>
-              <a:t>XML. </a:t>
+              <a:t>XML </a:t>
             </a:r>
             <a:r>
               <a:rPr lang="ru-RU" dirty="0" smtClean="0"/>
-              <a:t>Демонстрация.</a:t>
-            </a:r>
-            <a:endParaRPr lang="ru-RU" dirty="0"/>
+              <a:t>файл неудобен для чтения человеком. Однако его можно обработать с помощью программы </a:t>
+            </a:r>
+            <a:r>
+              <a:rPr lang="en-US" dirty="0" smtClean="0"/>
+              <a:t>Sandcastle</a:t>
+            </a:r>
+            <a:r>
+              <a:rPr lang="en-US" dirty="0"/>
+              <a:t> </a:t>
+            </a:r>
+            <a:r>
+              <a:rPr lang="en-US" dirty="0" smtClean="0"/>
+              <a:t>(</a:t>
+            </a:r>
+            <a:r>
+              <a:rPr lang="en-US" dirty="0" smtClean="0">
+                <a:hlinkClick r:id="rId2"/>
+              </a:rPr>
+              <a:t>shfb.codeplex.com</a:t>
+            </a:r>
+            <a:r>
+              <a:rPr lang="en-US" dirty="0" smtClean="0"/>
+              <a:t>) </a:t>
+            </a:r>
+            <a:r>
+              <a:rPr lang="ru-RU" dirty="0" smtClean="0"/>
+              <a:t>и получить файл(ы) справки.</a:t>
+            </a:r>
+            <a:endParaRPr lang="en-US" dirty="0" smtClean="0"/>
           </a:p>
         </p:txBody>
       </p:sp>
     </p:spTree>
     <p:extLst>
       <p:ext uri="{BB962C8B-B14F-4D97-AF65-F5344CB8AC3E}">
-        <p14:creationId xmlns:p14="http://schemas.microsoft.com/office/powerpoint/2010/main" val="607863742"/>
+        <p14:creationId xmlns:p14="http://schemas.microsoft.com/office/powerpoint/2010/main" val="2734608499"/>
       </p:ext>
     </p:extLst>
   </p:cSld>
   <p:clrMapOvr>
     <a:masterClrMapping/>
   </p:clrMapOvr>
+  <p:timing>
+    <p:tnLst>
+      <p:par>
+        <p:cTn id="1" dur="indefinite" restart="never" nodeType="tmRoot"/>
+      </p:par>
+    </p:tnLst>
+  </p:timing>
 </p:sld>
 </file>
 
@@ -9128,101 +9939,29 @@
             <p:ph type="title"/>
           </p:nvPr>
         </p:nvSpPr>
-        <p:spPr/>
-        <p:txBody>
-          <a:bodyPr/>
-          <a:lstStyle/>
-          <a:p>
-            <a:r>
-              <a:rPr lang="en-US" dirty="0" smtClean="0"/>
-              <a:t>XML </a:t>
-            </a:r>
-            <a:r>
-              <a:rPr lang="ru-RU" dirty="0" smtClean="0"/>
-              <a:t>сериализация (</a:t>
-            </a:r>
-            <a:r>
-              <a:rPr lang="en-US" dirty="0" smtClean="0"/>
-              <a:t>serialization</a:t>
-            </a:r>
-            <a:r>
-              <a:rPr lang="ru-RU" dirty="0" smtClean="0"/>
-              <a:t>)</a:t>
-            </a:r>
-            <a:endParaRPr lang="ru-RU" dirty="0"/>
-          </a:p>
-        </p:txBody>
-      </p:sp>
-      <p:sp>
-        <p:nvSpPr>
-          <p:cNvPr id="3" name="Content Placeholder 2"/>
-          <p:cNvSpPr>
-            <a:spLocks noGrp="1"/>
-          </p:cNvSpPr>
-          <p:nvPr>
-            <p:ph idx="1"/>
-          </p:nvPr>
-        </p:nvSpPr>
-        <p:spPr/>
+        <p:spPr>
+          <a:xfrm>
+            <a:off x="457200" y="2857500"/>
+            <a:ext cx="8229600" cy="1143000"/>
+          </a:xfrm>
+        </p:spPr>
         <p:txBody>
           <a:bodyPr>
-            <a:normAutofit lnSpcReduction="10000"/>
+            <a:normAutofit/>
           </a:bodyPr>
           <a:lstStyle/>
           <a:p>
             <a:r>
-              <a:rPr lang="ru-RU" dirty="0"/>
-              <a:t>Сериализация – сохранение данных об объекте </a:t>
-            </a:r>
-            <a:r>
               <a:rPr lang="ru-RU" dirty="0" smtClean="0"/>
-              <a:t>в поток</a:t>
-            </a:r>
-            <a:endParaRPr lang="ru-RU" dirty="0"/>
-          </a:p>
-          <a:p>
+              <a:t>Чтение </a:t>
+            </a:r>
+            <a:r>
+              <a:rPr lang="en-US" dirty="0" smtClean="0"/>
+              <a:t>XML. </a:t>
+            </a:r>
             <a:r>
               <a:rPr lang="ru-RU" dirty="0" smtClean="0"/>
-              <a:t>Десериализация</a:t>
-            </a:r>
-            <a:r>
-              <a:rPr lang="en-US" dirty="0" smtClean="0"/>
-              <a:t> </a:t>
-            </a:r>
-            <a:r>
-              <a:rPr lang="ru-RU" dirty="0" smtClean="0"/>
-              <a:t>– </a:t>
-            </a:r>
-            <a:r>
-              <a:rPr lang="ru-RU" dirty="0"/>
-              <a:t>обратный процесс восстановления </a:t>
-            </a:r>
-            <a:r>
-              <a:rPr lang="ru-RU" dirty="0" smtClean="0"/>
-              <a:t>объекта</a:t>
-            </a:r>
-          </a:p>
-          <a:p>
-            <a:endParaRPr lang="en-US" dirty="0" smtClean="0"/>
-          </a:p>
-          <a:p>
-            <a:r>
-              <a:rPr lang="ru-RU" dirty="0" smtClean="0"/>
-              <a:t>Примеры использования:</a:t>
-            </a:r>
-          </a:p>
-          <a:p>
-            <a:pPr lvl="1"/>
-            <a:r>
-              <a:rPr lang="ru-RU" dirty="0" smtClean="0"/>
-              <a:t>Передача объекта между разными программи/машинами.</a:t>
-            </a:r>
-          </a:p>
-          <a:p>
-            <a:pPr lvl="1"/>
-            <a:r>
-              <a:rPr lang="ru-RU" dirty="0" smtClean="0"/>
-              <a:t>Файлы конфигурации</a:t>
+              <a:t>Демонстрация.</a:t>
             </a:r>
             <a:endParaRPr lang="ru-RU" dirty="0"/>
           </a:p>
@@ -9231,7 +9970,7 @@
     </p:spTree>
     <p:extLst>
       <p:ext uri="{BB962C8B-B14F-4D97-AF65-F5344CB8AC3E}">
-        <p14:creationId xmlns:p14="http://schemas.microsoft.com/office/powerpoint/2010/main" val="4243754449"/>
+        <p14:creationId xmlns:p14="http://schemas.microsoft.com/office/powerpoint/2010/main" val="607863742"/>
       </p:ext>
     </p:extLst>
   </p:cSld>
@@ -9268,6 +10007,146 @@
             <p:ph type="title"/>
           </p:nvPr>
         </p:nvSpPr>
+        <p:spPr/>
+        <p:txBody>
+          <a:bodyPr/>
+          <a:lstStyle/>
+          <a:p>
+            <a:r>
+              <a:rPr lang="en-US" dirty="0" smtClean="0"/>
+              <a:t>XML </a:t>
+            </a:r>
+            <a:r>
+              <a:rPr lang="ru-RU" dirty="0" smtClean="0"/>
+              <a:t>сериализация (</a:t>
+            </a:r>
+            <a:r>
+              <a:rPr lang="en-US" dirty="0" smtClean="0"/>
+              <a:t>serialization</a:t>
+            </a:r>
+            <a:r>
+              <a:rPr lang="ru-RU" dirty="0" smtClean="0"/>
+              <a:t>)</a:t>
+            </a:r>
+            <a:endParaRPr lang="ru-RU" dirty="0"/>
+          </a:p>
+        </p:txBody>
+      </p:sp>
+      <p:sp>
+        <p:nvSpPr>
+          <p:cNvPr id="3" name="Content Placeholder 2"/>
+          <p:cNvSpPr>
+            <a:spLocks noGrp="1"/>
+          </p:cNvSpPr>
+          <p:nvPr>
+            <p:ph idx="1"/>
+          </p:nvPr>
+        </p:nvSpPr>
+        <p:spPr/>
+        <p:txBody>
+          <a:bodyPr>
+            <a:normAutofit lnSpcReduction="10000"/>
+          </a:bodyPr>
+          <a:lstStyle/>
+          <a:p>
+            <a:r>
+              <a:rPr lang="ru-RU" dirty="0"/>
+              <a:t>Сериализация – сохранение данных об объекте </a:t>
+            </a:r>
+            <a:r>
+              <a:rPr lang="ru-RU" dirty="0" smtClean="0"/>
+              <a:t>в поток</a:t>
+            </a:r>
+            <a:endParaRPr lang="ru-RU" dirty="0"/>
+          </a:p>
+          <a:p>
+            <a:r>
+              <a:rPr lang="ru-RU" dirty="0" smtClean="0"/>
+              <a:t>Десериализация</a:t>
+            </a:r>
+            <a:r>
+              <a:rPr lang="en-US" dirty="0" smtClean="0"/>
+              <a:t> </a:t>
+            </a:r>
+            <a:r>
+              <a:rPr lang="ru-RU" dirty="0" smtClean="0"/>
+              <a:t>– </a:t>
+            </a:r>
+            <a:r>
+              <a:rPr lang="ru-RU" dirty="0"/>
+              <a:t>обратный процесс восстановления </a:t>
+            </a:r>
+            <a:r>
+              <a:rPr lang="ru-RU" dirty="0" smtClean="0"/>
+              <a:t>объекта</a:t>
+            </a:r>
+          </a:p>
+          <a:p>
+            <a:endParaRPr lang="en-US" dirty="0" smtClean="0"/>
+          </a:p>
+          <a:p>
+            <a:r>
+              <a:rPr lang="ru-RU" dirty="0" smtClean="0"/>
+              <a:t>Примеры использования:</a:t>
+            </a:r>
+          </a:p>
+          <a:p>
+            <a:pPr lvl="1"/>
+            <a:r>
+              <a:rPr lang="ru-RU" dirty="0" smtClean="0"/>
+              <a:t>Передача объекта между разными программи/машинами.</a:t>
+            </a:r>
+          </a:p>
+          <a:p>
+            <a:pPr lvl="1"/>
+            <a:r>
+              <a:rPr lang="ru-RU" dirty="0" smtClean="0"/>
+              <a:t>Файлы конфигурации</a:t>
+            </a:r>
+            <a:endParaRPr lang="ru-RU" dirty="0"/>
+          </a:p>
+        </p:txBody>
+      </p:sp>
+    </p:spTree>
+    <p:extLst>
+      <p:ext uri="{BB962C8B-B14F-4D97-AF65-F5344CB8AC3E}">
+        <p14:creationId xmlns:p14="http://schemas.microsoft.com/office/powerpoint/2010/main" val="4243754449"/>
+      </p:ext>
+    </p:extLst>
+  </p:cSld>
+  <p:clrMapOvr>
+    <a:masterClrMapping/>
+  </p:clrMapOvr>
+</p:sld>
+</file>
+
+<file path=ppt/slides/slide28.xml><?xml version="1.0" encoding="utf-8"?>
+<p:sld xmlns:a="http://schemas.openxmlformats.org/drawingml/2006/main" xmlns:r="http://schemas.openxmlformats.org/officeDocument/2006/relationships" xmlns:p="http://schemas.openxmlformats.org/presentationml/2006/main">
+  <p:cSld>
+    <p:spTree>
+      <p:nvGrpSpPr>
+        <p:cNvPr id="1" name=""/>
+        <p:cNvGrpSpPr/>
+        <p:nvPr/>
+      </p:nvGrpSpPr>
+      <p:grpSpPr>
+        <a:xfrm>
+          <a:off x="0" y="0"/>
+          <a:ext cx="0" cy="0"/>
+          <a:chOff x="0" y="0"/>
+          <a:chExt cx="0" cy="0"/>
+        </a:xfrm>
+      </p:grpSpPr>
+      <p:sp>
+        <p:nvSpPr>
+          <p:cNvPr id="2" name="Title 1"/>
+          <p:cNvSpPr>
+            <a:spLocks noGrp="1"/>
+          </p:cNvSpPr>
+          <p:nvPr>
+            <p:ph type="title"/>
+          </p:nvPr>
+        </p:nvSpPr>
         <p:spPr>
           <a:xfrm>
             <a:off x="457200" y="-234280"/>
@@ -11582,7 +12461,7 @@
 </p:sld>
 </file>
 
-<file path=ppt/slides/slide28.xml><?xml version="1.0" encoding="utf-8"?>
+<file path=ppt/slides/slide29.xml><?xml version="1.0" encoding="utf-8"?>
 <p:sld xmlns:a="http://schemas.openxmlformats.org/drawingml/2006/main" xmlns:r="http://schemas.openxmlformats.org/officeDocument/2006/relationships" xmlns:p="http://schemas.openxmlformats.org/presentationml/2006/main">
   <p:cSld>
     <p:bg>

</xml_diff>

<commit_message>
Added LINQ to XML method
</commit_message>
<xml_diff>
--- a/Presentation/lesson-06-xml.pptx
+++ b/Presentation/lesson-06-xml.pptx
@@ -222,7 +222,7 @@
           <a:p>
             <a:fld id="{B24A7054-7FFB-49F4-A126-5DF6E687FF53}" type="datetimeFigureOut">
               <a:rPr lang="ru-RU" smtClean="0"/>
-              <a:t>22.09.2014</a:t>
+              <a:t>16.10.2014</a:t>
             </a:fld>
             <a:endParaRPr lang="ru-RU"/>
           </a:p>
@@ -1285,7 +1285,7 @@
           <a:p>
             <a:fld id="{8E6E6A2A-E9D3-4A0D-B04A-ABDD367A1E08}" type="datetimeFigureOut">
               <a:rPr lang="ru-RU" smtClean="0"/>
-              <a:t>22.09.2014</a:t>
+              <a:t>16.10.2014</a:t>
             </a:fld>
             <a:endParaRPr lang="ru-RU"/>
           </a:p>
@@ -2733,7 +2733,7 @@
           <a:p>
             <a:fld id="{AC3D3127-B7C4-45E3-9797-C527EC9FDD78}" type="datetimeFigureOut">
               <a:rPr lang="ru-RU" smtClean="0"/>
-              <a:t>22.09.2014</a:t>
+              <a:t>16.10.2014</a:t>
             </a:fld>
             <a:endParaRPr lang="ru-RU"/>
           </a:p>
@@ -8423,7 +8423,7 @@
         <p:spPr/>
         <p:txBody>
           <a:bodyPr>
-            <a:normAutofit lnSpcReduction="10000"/>
+            <a:normAutofit fontScale="92500" lnSpcReduction="10000"/>
           </a:bodyPr>
           <a:lstStyle/>
           <a:p>
@@ -8472,11 +8472,51 @@
             <a:pPr lvl="1"/>
             <a:r>
               <a:rPr lang="ru-RU" dirty="0" smtClean="0"/>
-              <a:t>Класс </a:t>
+              <a:t>Класс</a:t>
+            </a:r>
+            <a:r>
+              <a:rPr lang="ru-RU" dirty="0"/>
+              <a:t>ы</a:t>
+            </a:r>
+            <a:r>
+              <a:rPr lang="ru-RU" dirty="0" smtClean="0"/>
+              <a:t> </a:t>
             </a:r>
             <a:r>
               <a:rPr lang="en-US" dirty="0" err="1" smtClean="0"/>
-              <a:t>System.Xml.XmlDocument</a:t>
+              <a:t>System.Xml</a:t>
+            </a:r>
+            <a:r>
+              <a:rPr lang="en-US" dirty="0" smtClean="0"/>
+              <a:t>.</a:t>
+            </a:r>
+            <a:r>
+              <a:rPr lang="ru-RU" dirty="0" smtClean="0"/>
+              <a:t>*</a:t>
+            </a:r>
+            <a:endParaRPr lang="en-US" dirty="0" smtClean="0"/>
+          </a:p>
+          <a:p>
+            <a:pPr lvl="1"/>
+            <a:r>
+              <a:rPr lang="en-US" dirty="0"/>
+              <a:t>LINQ to </a:t>
+            </a:r>
+            <a:r>
+              <a:rPr lang="en-US" dirty="0" smtClean="0"/>
+              <a:t>XML</a:t>
+            </a:r>
+            <a:r>
+              <a:rPr lang="ru-RU" dirty="0" smtClean="0"/>
+              <a:t>. Классы </a:t>
+            </a:r>
+            <a:r>
+              <a:rPr lang="en-US" err="1" smtClean="0"/>
+              <a:t>System.Xml.Linq</a:t>
+            </a:r>
+            <a:r>
+              <a:rPr lang="en-US" smtClean="0"/>
+              <a:t>.*</a:t>
             </a:r>
             <a:endParaRPr lang="en-US" dirty="0" smtClean="0"/>
           </a:p>
@@ -8576,7 +8616,7 @@
             <a:pPr lvl="1"/>
             <a:r>
               <a:rPr lang="ru-RU" dirty="0" smtClean="0"/>
-              <a:t>Работа идет</a:t>
+              <a:t>Чтение или запись, но не то и другое одновременно</a:t>
             </a:r>
             <a:endParaRPr lang="ru-RU" dirty="0"/>
           </a:p>

</xml_diff>

<commit_message>
More XML usage scenarios
</commit_message>
<xml_diff>
--- a/Presentation/lesson-06-xml.pptx
+++ b/Presentation/lesson-06-xml.pptx
@@ -14590,7 +14590,11 @@
           <a:p>
             <a:r>
               <a:rPr lang="ru-RU" dirty="0" smtClean="0"/>
-              <a:t>Файлы конфигурации приложений/сборок (</a:t>
+              <a:t>Файлы конфигурации </a:t>
+            </a:r>
+            <a:r>
+              <a:rPr lang="ru-RU" dirty="0" smtClean="0"/>
+              <a:t>(</a:t>
             </a:r>
             <a:r>
               <a:rPr lang="en-US" dirty="0" smtClean="0"/>
@@ -14608,7 +14612,42 @@
           <a:p>
             <a:r>
               <a:rPr lang="ru-RU" dirty="0" smtClean="0"/>
-              <a:t>Файлы манифестов для </a:t>
+              <a:t>Язык описания </a:t>
+            </a:r>
+            <a:r>
+              <a:rPr lang="en-US" dirty="0" smtClean="0"/>
+              <a:t>UI </a:t>
+            </a:r>
+            <a:r>
+              <a:rPr lang="ru-RU" dirty="0" smtClean="0"/>
+              <a:t>в</a:t>
+            </a:r>
+            <a:r>
+              <a:rPr lang="ru-RU" dirty="0" smtClean="0"/>
+              <a:t> </a:t>
+            </a:r>
+            <a:r>
+              <a:rPr lang="en-US" dirty="0" smtClean="0"/>
+              <a:t>WPF</a:t>
+            </a:r>
+            <a:r>
+              <a:rPr lang="ru-RU" dirty="0" smtClean="0"/>
+              <a:t> - </a:t>
+            </a:r>
+            <a:r>
+              <a:rPr lang="en-US" dirty="0" smtClean="0"/>
+              <a:t>XAML</a:t>
+            </a:r>
+            <a:endParaRPr lang="en-US" dirty="0" smtClean="0"/>
+          </a:p>
+          <a:p>
+            <a:r>
+              <a:rPr lang="ru-RU" dirty="0" smtClean="0"/>
+              <a:t>Файлы манифестов </a:t>
+            </a:r>
+            <a:r>
+              <a:rPr lang="ru-RU" dirty="0" smtClean="0"/>
+              <a:t>приложений для </a:t>
             </a:r>
             <a:r>
               <a:rPr lang="en-US" dirty="0" smtClean="0"/>
@@ -14632,12 +14671,15 @@
               <a:rPr lang="ru-RU" dirty="0" smtClean="0"/>
               <a:t>сериализация</a:t>
             </a:r>
-            <a:endParaRPr lang="en-US" dirty="0" smtClean="0"/>
           </a:p>
           <a:p>
             <a:r>
               <a:rPr lang="ru-RU" dirty="0" smtClean="0"/>
-              <a:t>Класс </a:t>
+              <a:t>Сохрание/загрузка </a:t>
+            </a:r>
+            <a:r>
+              <a:rPr lang="ru-RU" dirty="0" smtClean="0"/>
+              <a:t>данных из класса </a:t>
             </a:r>
             <a:r>
               <a:rPr lang="en-US" dirty="0" err="1" smtClean="0"/>

</xml_diff>

<commit_message>
Paste XML as Classes
</commit_message>
<xml_diff>
--- a/Presentation/lesson-06-xml.pptx
+++ b/Presentation/lesson-06-xml.pptx
@@ -5,7 +5,7 @@
     <p:sldMasterId id="2147483648" r:id="rId1"/>
   </p:sldMasterIdLst>
   <p:notesMasterIdLst>
-    <p:notesMasterId r:id="rId37"/>
+    <p:notesMasterId r:id="rId38"/>
   </p:notesMasterIdLst>
   <p:sldIdLst>
     <p:sldId id="257" r:id="rId2"/>
@@ -42,7 +42,8 @@
     <p:sldId id="277" r:id="rId33"/>
     <p:sldId id="280" r:id="rId34"/>
     <p:sldId id="282" r:id="rId35"/>
-    <p:sldId id="285" r:id="rId36"/>
+    <p:sldId id="295" r:id="rId36"/>
+    <p:sldId id="285" r:id="rId37"/>
   </p:sldIdLst>
   <p:sldSz cx="9144000" cy="6858000" type="screen4x3"/>
   <p:notesSz cx="6858000" cy="9144000"/>
@@ -226,7 +227,7 @@
           <a:p>
             <a:fld id="{B24A7054-7FFB-49F4-A126-5DF6E687FF53}" type="datetimeFigureOut">
               <a:rPr lang="ru-RU" smtClean="0"/>
-              <a:t>17.03.2015</a:t>
+              <a:t>20.03.2015</a:t>
             </a:fld>
             <a:endParaRPr lang="ru-RU"/>
           </a:p>
@@ -1289,7 +1290,7 @@
           <a:p>
             <a:fld id="{8E6E6A2A-E9D3-4A0D-B04A-ABDD367A1E08}" type="datetimeFigureOut">
               <a:rPr lang="ru-RU" smtClean="0"/>
-              <a:t>17.03.2015</a:t>
+              <a:t>20.03.2015</a:t>
             </a:fld>
             <a:endParaRPr lang="ru-RU"/>
           </a:p>
@@ -2737,7 +2738,7 @@
           <a:p>
             <a:fld id="{AC3D3127-B7C4-45E3-9797-C527EC9FDD78}" type="datetimeFigureOut">
               <a:rPr lang="ru-RU" smtClean="0"/>
-              <a:t>17.03.2015</a:t>
+              <a:t>20.03.2015</a:t>
             </a:fld>
             <a:endParaRPr lang="ru-RU"/>
           </a:p>
@@ -15342,6 +15343,141 @@
 </file>
 
 <file path=ppt/slides/slide35.xml><?xml version="1.0" encoding="utf-8"?>
+<p:sld xmlns:a="http://schemas.openxmlformats.org/drawingml/2006/main" xmlns:r="http://schemas.openxmlformats.org/officeDocument/2006/relationships" xmlns:p="http://schemas.openxmlformats.org/presentationml/2006/main">
+  <p:cSld>
+    <p:spTree>
+      <p:nvGrpSpPr>
+        <p:cNvPr id="1" name=""/>
+        <p:cNvGrpSpPr/>
+        <p:nvPr/>
+      </p:nvGrpSpPr>
+      <p:grpSpPr>
+        <a:xfrm>
+          <a:off x="0" y="0"/>
+          <a:ext cx="0" cy="0"/>
+          <a:chOff x="0" y="0"/>
+          <a:chExt cx="0" cy="0"/>
+        </a:xfrm>
+      </p:grpSpPr>
+      <p:sp>
+        <p:nvSpPr>
+          <p:cNvPr id="2" name="Title 1"/>
+          <p:cNvSpPr>
+            <a:spLocks noGrp="1"/>
+          </p:cNvSpPr>
+          <p:nvPr>
+            <p:ph type="title"/>
+          </p:nvPr>
+        </p:nvSpPr>
+        <p:spPr/>
+        <p:txBody>
+          <a:bodyPr>
+            <a:noAutofit/>
+          </a:bodyPr>
+          <a:lstStyle/>
+          <a:p>
+            <a:r>
+              <a:rPr lang="ru-RU" sz="3600" dirty="0" smtClean="0"/>
+              <a:t>Команда </a:t>
+            </a:r>
+            <a:r>
+              <a:rPr lang="en-US" sz="3600" dirty="0" smtClean="0"/>
+              <a:t>Edit -&gt; Paste Special -&gt;</a:t>
+            </a:r>
+            <a:br>
+              <a:rPr lang="en-US" sz="3600" dirty="0" smtClean="0"/>
+            </a:br>
+            <a:r>
+              <a:rPr lang="en-US" sz="3600" dirty="0" smtClean="0"/>
+              <a:t>Paste XML as Classes</a:t>
+            </a:r>
+            <a:endParaRPr lang="ru-RU" sz="3600" dirty="0"/>
+          </a:p>
+        </p:txBody>
+      </p:sp>
+      <p:sp>
+        <p:nvSpPr>
+          <p:cNvPr id="3" name="Content Placeholder 2"/>
+          <p:cNvSpPr>
+            <a:spLocks noGrp="1"/>
+          </p:cNvSpPr>
+          <p:nvPr>
+            <p:ph idx="1"/>
+          </p:nvPr>
+        </p:nvSpPr>
+        <p:spPr/>
+        <p:txBody>
+          <a:bodyPr/>
+          <a:lstStyle/>
+          <a:p>
+            <a:pPr marL="0" indent="0">
+              <a:buNone/>
+            </a:pPr>
+            <a:r>
+              <a:rPr lang="ru-RU" dirty="0" smtClean="0"/>
+              <a:t>В </a:t>
+            </a:r>
+            <a:r>
+              <a:rPr lang="en-US" dirty="0" smtClean="0"/>
+              <a:t>Visual Studio 2012 </a:t>
+            </a:r>
+            <a:r>
+              <a:rPr lang="ru-RU" dirty="0" smtClean="0"/>
+              <a:t>и выше можно быстро сгенерировать классы для </a:t>
+            </a:r>
+            <a:r>
+              <a:rPr lang="en-US" dirty="0" smtClean="0"/>
+              <a:t>XML-</a:t>
+            </a:r>
+            <a:r>
+              <a:rPr lang="ru-RU" dirty="0" smtClean="0"/>
+              <a:t>сериализации скопировав нужный </a:t>
+            </a:r>
+            <a:r>
+              <a:rPr lang="en-US" dirty="0" smtClean="0"/>
+              <a:t>XML </a:t>
+            </a:r>
+            <a:r>
+              <a:rPr lang="ru-RU" dirty="0" smtClean="0"/>
+              <a:t>в буфер обмена и вызвав команду </a:t>
+            </a:r>
+            <a:r>
+              <a:rPr lang="en-US" dirty="0"/>
+              <a:t>Edit -&gt; Paste Special -&gt;</a:t>
+            </a:r>
+            <a:br>
+              <a:rPr lang="en-US" dirty="0"/>
+            </a:br>
+            <a:r>
+              <a:rPr lang="en-US" dirty="0"/>
+              <a:t>Paste XML as </a:t>
+            </a:r>
+            <a:r>
+              <a:rPr lang="en-US" dirty="0" smtClean="0"/>
+              <a:t>Classes</a:t>
+            </a:r>
+            <a:r>
+              <a:rPr lang="ru-RU" smtClean="0"/>
+              <a:t>.</a:t>
+            </a:r>
+            <a:endParaRPr lang="ru-RU" dirty="0"/>
+          </a:p>
+        </p:txBody>
+      </p:sp>
+    </p:spTree>
+    <p:extLst>
+      <p:ext uri="{BB962C8B-B14F-4D97-AF65-F5344CB8AC3E}">
+        <p14:creationId xmlns:p14="http://schemas.microsoft.com/office/powerpoint/2010/main" val="2369714332"/>
+      </p:ext>
+    </p:extLst>
+  </p:cSld>
+  <p:clrMapOvr>
+    <a:masterClrMapping/>
+  </p:clrMapOvr>
+</p:sld>
+</file>
+
+<file path=ppt/slides/slide36.xml><?xml version="1.0" encoding="utf-8"?>
 <p:sld xmlns:a="http://schemas.openxmlformats.org/drawingml/2006/main" xmlns:r="http://schemas.openxmlformats.org/officeDocument/2006/relationships" xmlns:p="http://schemas.openxmlformats.org/presentationml/2006/main">
   <p:cSld>
     <p:bg>

</xml_diff>

<commit_message>
XML is used by VS and MSBuild
</commit_message>
<xml_diff>
--- a/Presentation/lesson-06-xml.pptx
+++ b/Presentation/lesson-06-xml.pptx
@@ -229,7 +229,7 @@
           <a:p>
             <a:fld id="{B24A7054-7FFB-49F4-A126-5DF6E687FF53}" type="datetimeFigureOut">
               <a:rPr lang="ru-RU" smtClean="0"/>
-              <a:t>28.04.2015</a:t>
+              <a:t>10.07.2015</a:t>
             </a:fld>
             <a:endParaRPr lang="ru-RU"/>
           </a:p>
@@ -1292,7 +1292,7 @@
           <a:p>
             <a:fld id="{8E6E6A2A-E9D3-4A0D-B04A-ABDD367A1E08}" type="datetimeFigureOut">
               <a:rPr lang="ru-RU" smtClean="0"/>
-              <a:t>28.04.2015</a:t>
+              <a:t>10.07.2015</a:t>
             </a:fld>
             <a:endParaRPr lang="ru-RU"/>
           </a:p>
@@ -2740,7 +2740,7 @@
           <a:p>
             <a:fld id="{AC3D3127-B7C4-45E3-9797-C527EC9FDD78}" type="datetimeFigureOut">
               <a:rPr lang="ru-RU" smtClean="0"/>
-              <a:t>28.04.2015</a:t>
+              <a:t>10.07.2015</a:t>
             </a:fld>
             <a:endParaRPr lang="ru-RU"/>
           </a:p>
@@ -17378,7 +17378,9 @@
         </p:nvSpPr>
         <p:spPr/>
         <p:txBody>
-          <a:bodyPr/>
+          <a:bodyPr>
+            <a:normAutofit fontScale="92500" lnSpcReduction="20000"/>
+          </a:bodyPr>
           <a:lstStyle/>
           <a:p>
             <a:r>
@@ -17468,6 +17470,29 @@
             <a:r>
               <a:rPr lang="en-US" dirty="0" err="1" smtClean="0"/>
               <a:t>System.Data.DataSet</a:t>
+            </a:r>
+            <a:endParaRPr lang="en-US" dirty="0" smtClean="0"/>
+          </a:p>
+          <a:p>
+            <a:r>
+              <a:rPr lang="ru-RU" dirty="0" smtClean="0"/>
+              <a:t>Файлы проектов </a:t>
+            </a:r>
+            <a:r>
+              <a:rPr lang="en-US" dirty="0" smtClean="0"/>
+              <a:t>Visual Studio (</a:t>
+            </a:r>
+            <a:r>
+              <a:rPr lang="ru-RU" dirty="0" smtClean="0"/>
+              <a:t>см. также </a:t>
+            </a:r>
+            <a:r>
+              <a:rPr lang="en-US" dirty="0" err="1" smtClean="0"/>
+              <a:t>MSBuild</a:t>
+            </a:r>
+            <a:r>
+              <a:rPr lang="en-US" dirty="0" smtClean="0"/>
+              <a:t>)</a:t>
             </a:r>
             <a:endParaRPr lang="ru-RU" dirty="0"/>
           </a:p>

</xml_diff>

<commit_message>
More information about XML comments
</commit_message>
<xml_diff>
--- a/Presentation/lesson-06-xml.pptx
+++ b/Presentation/lesson-06-xml.pptx
@@ -231,7 +231,7 @@
           <a:p>
             <a:fld id="{B24A7054-7FFB-49F4-A126-5DF6E687FF53}" type="datetimeFigureOut">
               <a:rPr lang="ru-RU" smtClean="0"/>
-              <a:t>10.11.2015</a:t>
+              <a:t>03.12.2015</a:t>
             </a:fld>
             <a:endParaRPr lang="ru-RU"/>
           </a:p>
@@ -1294,7 +1294,7 @@
           <a:p>
             <a:fld id="{8E6E6A2A-E9D3-4A0D-B04A-ABDD367A1E08}" type="datetimeFigureOut">
               <a:rPr lang="ru-RU" smtClean="0"/>
-              <a:t>10.11.2015</a:t>
+              <a:t>03.12.2015</a:t>
             </a:fld>
             <a:endParaRPr lang="ru-RU"/>
           </a:p>
@@ -2742,7 +2742,7 @@
           <a:p>
             <a:fld id="{AC3D3127-B7C4-45E3-9797-C527EC9FDD78}" type="datetimeFigureOut">
               <a:rPr lang="ru-RU" smtClean="0"/>
-              <a:t>10.11.2015</a:t>
+              <a:t>03.12.2015</a:t>
             </a:fld>
             <a:endParaRPr lang="ru-RU"/>
           </a:p>
@@ -13927,6 +13927,62 @@
           </a:graphicData>
         </a:graphic>
       </p:graphicFrame>
+      <p:sp>
+        <p:nvSpPr>
+          <p:cNvPr id="3" name="Rectangle 2"/>
+          <p:cNvSpPr/>
+          <p:nvPr/>
+        </p:nvSpPr>
+        <p:spPr>
+          <a:xfrm>
+            <a:off x="611560" y="4365104"/>
+            <a:ext cx="7992888" cy="923330"/>
+          </a:xfrm>
+          <a:prstGeom prst="rect">
+            <a:avLst/>
+          </a:prstGeom>
+        </p:spPr>
+        <p:txBody>
+          <a:bodyPr wrap="square">
+            <a:spAutoFit/>
+          </a:bodyPr>
+          <a:lstStyle/>
+          <a:p>
+            <a:r>
+              <a:rPr lang="ru-RU" dirty="0" smtClean="0"/>
+              <a:t>Смотрите полный список рекомендумемых элементов на сайте </a:t>
+            </a:r>
+            <a:r>
+              <a:rPr lang="en-US" dirty="0" smtClean="0"/>
+              <a:t>MSDN</a:t>
+            </a:r>
+          </a:p>
+          <a:p>
+            <a:endParaRPr lang="ru-RU" dirty="0" smtClean="0"/>
+          </a:p>
+          <a:p>
+            <a:r>
+              <a:rPr lang="en-US" dirty="0" smtClean="0">
+                <a:hlinkClick r:id="rId2"/>
+              </a:rPr>
+              <a:t>https</a:t>
+            </a:r>
+            <a:r>
+              <a:rPr lang="en-US" dirty="0">
+                <a:hlinkClick r:id="rId2"/>
+              </a:rPr>
+              <a:t>://</a:t>
+            </a:r>
+            <a:r>
+              <a:rPr lang="en-US" dirty="0" smtClean="0">
+                <a:hlinkClick r:id="rId2"/>
+              </a:rPr>
+              <a:t>msdn.microsoft.com/en-us/library/5ast78ax.aspx</a:t>
+            </a:r>
+            <a:endParaRPr lang="ru-RU" dirty="0"/>
+          </a:p>
+        </p:txBody>
+      </p:sp>
     </p:spTree>
     <p:extLst>
       <p:ext uri="{BB962C8B-B14F-4D97-AF65-F5344CB8AC3E}">

</xml_diff>

<commit_message>
Xml in NuGet nuspec
</commit_message>
<xml_diff>
--- a/Presentation/lesson-06-xml.pptx
+++ b/Presentation/lesson-06-xml.pptx
@@ -231,7 +231,7 @@
           <a:p>
             <a:fld id="{B24A7054-7FFB-49F4-A126-5DF6E687FF53}" type="datetimeFigureOut">
               <a:rPr lang="ru-RU" smtClean="0"/>
-              <a:t>03.12.2015</a:t>
+              <a:t>01.02.2016</a:t>
             </a:fld>
             <a:endParaRPr lang="ru-RU"/>
           </a:p>
@@ -1294,7 +1294,7 @@
           <a:p>
             <a:fld id="{8E6E6A2A-E9D3-4A0D-B04A-ABDD367A1E08}" type="datetimeFigureOut">
               <a:rPr lang="ru-RU" smtClean="0"/>
-              <a:t>03.12.2015</a:t>
+              <a:t>01.02.2016</a:t>
             </a:fld>
             <a:endParaRPr lang="ru-RU"/>
           </a:p>
@@ -2742,7 +2742,7 @@
           <a:p>
             <a:fld id="{AC3D3127-B7C4-45E3-9797-C527EC9FDD78}" type="datetimeFigureOut">
               <a:rPr lang="ru-RU" smtClean="0"/>
-              <a:t>03.12.2015</a:t>
+              <a:t>01.02.2016</a:t>
             </a:fld>
             <a:endParaRPr lang="ru-RU"/>
           </a:p>
@@ -17762,7 +17762,21 @@
             </a:r>
             <a:r>
               <a:rPr lang="en-US" dirty="0" smtClean="0"/>
-              <a:t>Windows Store</a:t>
+              <a:t>Windows </a:t>
+            </a:r>
+            <a:r>
+              <a:rPr lang="en-US" dirty="0" smtClean="0"/>
+              <a:t>Store</a:t>
+            </a:r>
+          </a:p>
+          <a:p>
+            <a:r>
+              <a:rPr lang="en-US" dirty="0"/>
+              <a:t>XML </a:t>
+            </a:r>
+            <a:r>
+              <a:rPr lang="ru-RU" dirty="0"/>
+              <a:t>сериализация</a:t>
             </a:r>
             <a:endParaRPr lang="ru-RU" dirty="0" smtClean="0"/>
           </a:p>
@@ -17799,18 +17813,13 @@
             </a:r>
             <a:r>
               <a:rPr lang="en-US" dirty="0" smtClean="0"/>
-              <a:t>(*.manifest)</a:t>
-            </a:r>
-          </a:p>
-          <a:p>
+              <a:t>(*.manifest</a:t>
+            </a:r>
             <a:r>
               <a:rPr lang="en-US" dirty="0" smtClean="0"/>
-              <a:t>XML </a:t>
-            </a:r>
-            <a:r>
-              <a:rPr lang="ru-RU" dirty="0" smtClean="0"/>
-              <a:t>сериализация</a:t>
-            </a:r>
+              <a:t>)</a:t>
+            </a:r>
+            <a:endParaRPr lang="ru-RU" dirty="0" smtClean="0"/>
           </a:p>
           <a:p>
             <a:r>
@@ -17843,6 +17852,28 @@
             <a:r>
               <a:rPr lang="en-US" dirty="0" smtClean="0"/>
               <a:t>)</a:t>
+            </a:r>
+          </a:p>
+          <a:p>
+            <a:r>
+              <a:rPr lang="ru-RU" dirty="0" smtClean="0"/>
+              <a:t>Описание пакетов </a:t>
+            </a:r>
+            <a:r>
+              <a:rPr lang="en-US" dirty="0" smtClean="0"/>
+              <a:t>NuGet (*.</a:t>
+            </a:r>
+            <a:r>
+              <a:rPr lang="en-US" dirty="0" err="1" smtClean="0"/>
+              <a:t>nuspec</a:t>
+            </a:r>
+            <a:r>
+              <a:rPr lang="en-US" dirty="0" smtClean="0"/>
+              <a:t> </a:t>
+            </a:r>
+            <a:r>
+              <a:rPr lang="ru-RU" dirty="0" smtClean="0"/>
+              <a:t>файлы)</a:t>
             </a:r>
             <a:endParaRPr lang="ru-RU" dirty="0"/>
           </a:p>

</xml_diff>

<commit_message>
Sandcastle Help File Builder
</commit_message>
<xml_diff>
--- a/Presentation/lesson-06-xml.pptx
+++ b/Presentation/lesson-06-xml.pptx
@@ -231,7 +231,7 @@
           <a:p>
             <a:fld id="{B24A7054-7FFB-49F4-A126-5DF6E687FF53}" type="datetimeFigureOut">
               <a:rPr lang="ru-RU" smtClean="0"/>
-              <a:t>01.02.2016</a:t>
+              <a:t>25.02.2016</a:t>
             </a:fld>
             <a:endParaRPr lang="ru-RU"/>
           </a:p>
@@ -1294,7 +1294,7 @@
           <a:p>
             <a:fld id="{8E6E6A2A-E9D3-4A0D-B04A-ABDD367A1E08}" type="datetimeFigureOut">
               <a:rPr lang="ru-RU" smtClean="0"/>
-              <a:t>01.02.2016</a:t>
+              <a:t>25.02.2016</a:t>
             </a:fld>
             <a:endParaRPr lang="ru-RU"/>
           </a:p>
@@ -2742,7 +2742,7 @@
           <a:p>
             <a:fld id="{AC3D3127-B7C4-45E3-9797-C527EC9FDD78}" type="datetimeFigureOut">
               <a:rPr lang="ru-RU" smtClean="0"/>
-              <a:t>01.02.2016</a:t>
+              <a:t>25.02.2016</a:t>
             </a:fld>
             <a:endParaRPr lang="ru-RU"/>
           </a:p>
@@ -14204,7 +14204,9 @@
         </p:nvSpPr>
         <p:spPr/>
         <p:txBody>
-          <a:bodyPr/>
+          <a:bodyPr>
+            <a:normAutofit fontScale="90000"/>
+          </a:bodyPr>
           <a:lstStyle/>
           <a:p>
             <a:r>
@@ -14217,7 +14219,14 @@
             </a:r>
             <a:r>
               <a:rPr lang="en-US" dirty="0" smtClean="0"/>
-              <a:t>: Sandcastle</a:t>
+              <a:t>:</a:t>
+            </a:r>
+            <a:br>
+              <a:rPr lang="en-US" dirty="0" smtClean="0"/>
+            </a:br>
+            <a:r>
+              <a:rPr lang="en-US" dirty="0" smtClean="0"/>
+              <a:t>Sandcastle Help File Builder</a:t>
             </a:r>
             <a:endParaRPr lang="ru-RU" dirty="0"/>
           </a:p>
@@ -14243,6 +14252,12 @@
             <a:pPr marL="0" indent="0">
               <a:buNone/>
             </a:pPr>
+            <a:endParaRPr lang="en-US" dirty="0" smtClean="0"/>
+          </a:p>
+          <a:p>
+            <a:pPr marL="0" indent="0">
+              <a:buNone/>
+            </a:pPr>
             <a:r>
               <a:rPr lang="ru-RU" dirty="0" smtClean="0"/>
               <a:t>Полученный </a:t>
@@ -14253,11 +14268,15 @@
             </a:r>
             <a:r>
               <a:rPr lang="ru-RU" dirty="0" smtClean="0"/>
-              <a:t>файл неудобен для чтения человеком. Однако его можно обработать с помощью программы </a:t>
+              <a:t>файл неудобен для чтения человеком. Однако его можно обработать с помощью </a:t>
+            </a:r>
+            <a:r>
+              <a:rPr lang="en-US" dirty="0"/>
+              <a:t>Sandcastle Help File </a:t>
             </a:r>
             <a:r>
               <a:rPr lang="en-US" dirty="0" smtClean="0"/>
-              <a:t>Sandcastle</a:t>
+              <a:t>Builder</a:t>
             </a:r>
             <a:r>
               <a:rPr lang="en-US" dirty="0"/>
@@ -14271,7 +14290,7 @@
               <a:rPr lang="en-US" dirty="0" smtClean="0">
                 <a:hlinkClick r:id="rId2"/>
               </a:rPr>
-              <a:t>shfb.codeplex.com</a:t>
+              <a:t>https://github.com/EWSoftware/SHFB</a:t>
             </a:r>
             <a:r>
               <a:rPr lang="en-US" dirty="0" smtClean="0"/>
@@ -14370,6 +14389,13 @@
   <p:clrMapOvr>
     <a:masterClrMapping/>
   </p:clrMapOvr>
+  <p:timing>
+    <p:tnLst>
+      <p:par>
+        <p:cTn id="1" dur="indefinite" restart="never" nodeType="tmRoot"/>
+      </p:par>
+    </p:tnLst>
+  </p:timing>
 </p:sld>
 </file>
 
@@ -14510,6 +14536,13 @@
   <p:clrMapOvr>
     <a:masterClrMapping/>
   </p:clrMapOvr>
+  <p:timing>
+    <p:tnLst>
+      <p:par>
+        <p:cTn id="1" dur="indefinite" restart="never" nodeType="tmRoot"/>
+      </p:par>
+    </p:tnLst>
+  </p:timing>
 </p:sld>
 </file>
 
@@ -17762,11 +17795,7 @@
             </a:r>
             <a:r>
               <a:rPr lang="en-US" dirty="0" smtClean="0"/>
-              <a:t>Windows </a:t>
-            </a:r>
-            <a:r>
-              <a:rPr lang="en-US" dirty="0" smtClean="0"/>
-              <a:t>Store</a:t>
+              <a:t>Windows Store</a:t>
             </a:r>
           </a:p>
           <a:p>
@@ -17813,11 +17842,7 @@
             </a:r>
             <a:r>
               <a:rPr lang="en-US" dirty="0" smtClean="0"/>
-              <a:t>(*.manifest</a:t>
-            </a:r>
-            <a:r>
-              <a:rPr lang="en-US" dirty="0" smtClean="0"/>
-              <a:t>)</a:t>
+              <a:t>(*.manifest)</a:t>
             </a:r>
             <a:endParaRPr lang="ru-RU" dirty="0" smtClean="0"/>
           </a:p>

</xml_diff>

<commit_message>
More on attributes vs elements
</commit_message>
<xml_diff>
--- a/Presentation/lesson-06-xml.pptx
+++ b/Presentation/lesson-06-xml.pptx
@@ -231,7 +231,7 @@
           <a:p>
             <a:fld id="{B24A7054-7FFB-49F4-A126-5DF6E687FF53}" type="datetimeFigureOut">
               <a:rPr lang="ru-RU" smtClean="0"/>
-              <a:t>25.02.2016</a:t>
+              <a:t>15.03.2016</a:t>
             </a:fld>
             <a:endParaRPr lang="ru-RU"/>
           </a:p>
@@ -1294,7 +1294,7 @@
           <a:p>
             <a:fld id="{8E6E6A2A-E9D3-4A0D-B04A-ABDD367A1E08}" type="datetimeFigureOut">
               <a:rPr lang="ru-RU" smtClean="0"/>
-              <a:t>25.02.2016</a:t>
+              <a:t>15.03.2016</a:t>
             </a:fld>
             <a:endParaRPr lang="ru-RU"/>
           </a:p>
@@ -2742,7 +2742,7 @@
           <a:p>
             <a:fld id="{AC3D3127-B7C4-45E3-9797-C527EC9FDD78}" type="datetimeFigureOut">
               <a:rPr lang="ru-RU" smtClean="0"/>
-              <a:t>25.02.2016</a:t>
+              <a:t>15.03.2016</a:t>
             </a:fld>
             <a:endParaRPr lang="ru-RU"/>
           </a:p>
@@ -3816,14 +3816,39 @@
           <a:bodyPr/>
           <a:lstStyle/>
           <a:p>
-            <a:pPr marL="0" indent="0">
-              <a:buNone/>
-            </a:pPr>
-            <a:r>
-              <a:rPr lang="ru-RU" smtClean="0"/>
-              <a:t>Атрибуты лучше подходят для коротких простых данных без вложенности (сейчас или в будущем).</a:t>
-            </a:r>
-            <a:endParaRPr lang="ru-RU"/>
+            <a:r>
+              <a:rPr lang="ru-RU" dirty="0" smtClean="0"/>
+              <a:t>Атрибуты лучше подходят для коротких простых данных без вложенности (сейчас или в будущем</a:t>
+            </a:r>
+            <a:r>
+              <a:rPr lang="ru-RU" dirty="0" smtClean="0"/>
+              <a:t>).</a:t>
+            </a:r>
+            <a:endParaRPr lang="en-US" dirty="0" smtClean="0"/>
+          </a:p>
+          <a:p>
+            <a:r>
+              <a:rPr lang="ru-RU" dirty="0" smtClean="0"/>
+              <a:t>По атрибутам проще делать поиск с помощью </a:t>
+            </a:r>
+            <a:r>
+              <a:rPr lang="en-US" dirty="0" smtClean="0"/>
+              <a:t>XPath </a:t>
+            </a:r>
+            <a:r>
+              <a:rPr lang="ru-RU" dirty="0" smtClean="0"/>
+              <a:t>запросов</a:t>
+            </a:r>
+          </a:p>
+          <a:p>
+            <a:endParaRPr lang="ru-RU" dirty="0"/>
+          </a:p>
+          <a:p>
+            <a:r>
+              <a:rPr lang="ru-RU" dirty="0" smtClean="0"/>
+              <a:t>Элементы лучше подходят для длинных значений</a:t>
+            </a:r>
+            <a:endParaRPr lang="ru-RU" dirty="0"/>
           </a:p>
         </p:txBody>
       </p:sp>
@@ -3837,6 +3862,13 @@
   <p:clrMapOvr>
     <a:masterClrMapping/>
   </p:clrMapOvr>
+  <p:timing>
+    <p:tnLst>
+      <p:par>
+        <p:cTn id="1" dur="indefinite" restart="never" nodeType="tmRoot"/>
+      </p:par>
+    </p:tnLst>
+  </p:timing>
 </p:sld>
 </file>
 

</xml_diff>

<commit_message>
Fixed link in RSS/Atom example
</commit_message>
<xml_diff>
--- a/Presentation/lesson-06-xml.pptx
+++ b/Presentation/lesson-06-xml.pptx
@@ -231,7 +231,7 @@
           <a:p>
             <a:fld id="{B24A7054-7FFB-49F4-A126-5DF6E687FF53}" type="datetimeFigureOut">
               <a:rPr lang="ru-RU" smtClean="0"/>
-              <a:t>15.03.2016</a:t>
+              <a:t>17.04.2016</a:t>
             </a:fld>
             <a:endParaRPr lang="ru-RU"/>
           </a:p>
@@ -1294,7 +1294,7 @@
           <a:p>
             <a:fld id="{8E6E6A2A-E9D3-4A0D-B04A-ABDD367A1E08}" type="datetimeFigureOut">
               <a:rPr lang="ru-RU" smtClean="0"/>
-              <a:t>15.03.2016</a:t>
+              <a:t>17.04.2016</a:t>
             </a:fld>
             <a:endParaRPr lang="ru-RU"/>
           </a:p>
@@ -2742,7 +2742,7 @@
           <a:p>
             <a:fld id="{AC3D3127-B7C4-45E3-9797-C527EC9FDD78}" type="datetimeFigureOut">
               <a:rPr lang="ru-RU" smtClean="0"/>
-              <a:t>15.03.2016</a:t>
+              <a:t>17.04.2016</a:t>
             </a:fld>
             <a:endParaRPr lang="ru-RU"/>
           </a:p>
@@ -3818,11 +3818,7 @@
           <a:p>
             <a:r>
               <a:rPr lang="ru-RU" dirty="0" smtClean="0"/>
-              <a:t>Атрибуты лучше подходят для коротких простых данных без вложенности (сейчас или в будущем</a:t>
-            </a:r>
-            <a:r>
-              <a:rPr lang="ru-RU" dirty="0" smtClean="0"/>
-              <a:t>).</a:t>
+              <a:t>Атрибуты лучше подходят для коротких простых данных без вложенности (сейчас или в будущем).</a:t>
             </a:r>
             <a:endParaRPr lang="en-US" dirty="0" smtClean="0"/>
           </a:p>
@@ -11012,11 +11008,56 @@
                 </a:solidFill>
                 <a:latin typeface="Consolas"/>
               </a:rPr>
-              <a:t> (</a:t>
+              <a:t> </a:t>
+            </a:r>
+            <a:r>
+              <a:rPr lang="en-US" sz="1200" dirty="0" smtClean="0">
+                <a:solidFill>
+                  <a:prstClr val="black"/>
+                </a:solidFill>
+                <a:latin typeface="Consolas"/>
+              </a:rPr>
+              <a:t>(</a:t>
+            </a:r>
+            <a:r>
+              <a:rPr lang="en-US" sz="1200" dirty="0" err="1" smtClean="0">
+                <a:solidFill>
+                  <a:srgbClr val="2B91AF"/>
+                </a:solidFill>
+                <a:latin typeface="Consolas"/>
+              </a:rPr>
+              <a:t>var</a:t>
+            </a:r>
+            <a:r>
+              <a:rPr lang="en-US" sz="1200" dirty="0" smtClean="0">
+                <a:solidFill>
+                  <a:prstClr val="black"/>
+                </a:solidFill>
+                <a:latin typeface="Consolas"/>
+              </a:rPr>
+              <a:t> </a:t>
             </a:r>
             <a:r>
               <a:rPr lang="en-US" sz="1200" dirty="0" err="1">
                 <a:solidFill>
+                  <a:prstClr val="black"/>
+                </a:solidFill>
+                <a:latin typeface="Consolas"/>
+              </a:rPr>
+              <a:t>xmlReader</a:t>
+            </a:r>
+            <a:r>
+              <a:rPr lang="en-US" sz="1200" dirty="0">
+                <a:solidFill>
+                  <a:prstClr val="black"/>
+                </a:solidFill>
+                <a:latin typeface="Consolas"/>
+              </a:rPr>
+              <a:t> = </a:t>
+            </a:r>
+            <a:r>
+              <a:rPr lang="en-US" sz="1200" dirty="0" err="1">
+                <a:solidFill>
                   <a:srgbClr val="2B91AF"/>
                 </a:solidFill>
                 <a:latin typeface="Consolas"/>
@@ -11024,95 +11065,65 @@
               <a:t>XmlReader</a:t>
             </a:r>
             <a:r>
+              <a:rPr lang="en-US" sz="1200" dirty="0" err="1">
+                <a:solidFill>
+                  <a:prstClr val="black"/>
+                </a:solidFill>
+                <a:latin typeface="Consolas"/>
+              </a:rPr>
+              <a:t>.Create</a:t>
+            </a:r>
+            <a:r>
+              <a:rPr lang="en-US" sz="1200" dirty="0" smtClean="0">
+                <a:solidFill>
+                  <a:prstClr val="black"/>
+                </a:solidFill>
+                <a:latin typeface="Consolas"/>
+              </a:rPr>
+              <a:t>(</a:t>
+            </a:r>
+            <a:r>
               <a:rPr lang="en-US" sz="1200" dirty="0">
                 <a:solidFill>
+                  <a:srgbClr val="A31515"/>
+                </a:solidFill>
+                <a:latin typeface="Consolas"/>
+              </a:rPr>
+              <a:t>"http://rss.slashdot.org/Slashdot/</a:t>
+            </a:r>
+            <a:r>
+              <a:rPr lang="en-US" sz="1200" dirty="0" err="1">
+                <a:solidFill>
+                  <a:srgbClr val="A31515"/>
+                </a:solidFill>
+                <a:latin typeface="Consolas"/>
+              </a:rPr>
+              <a:t>slashdotMainatom</a:t>
+            </a:r>
+            <a:r>
+              <a:rPr lang="en-US" sz="1200" dirty="0">
+                <a:solidFill>
+                  <a:srgbClr val="A31515"/>
+                </a:solidFill>
+                <a:latin typeface="Consolas"/>
+              </a:rPr>
+              <a:t>"</a:t>
+            </a:r>
+            <a:r>
+              <a:rPr lang="en-US" sz="1200" dirty="0" smtClean="0">
+                <a:solidFill>
                   <a:prstClr val="black"/>
                 </a:solidFill>
                 <a:latin typeface="Consolas"/>
               </a:rPr>
-              <a:t> </a:t>
-            </a:r>
-            <a:r>
-              <a:rPr lang="en-US" sz="1200" dirty="0" err="1">
-                <a:solidFill>
-                  <a:prstClr val="black"/>
-                </a:solidFill>
-                <a:latin typeface="Consolas"/>
-              </a:rPr>
-              <a:t>xmlReader</a:t>
-            </a:r>
-            <a:r>
-              <a:rPr lang="en-US" sz="1200" dirty="0">
-                <a:solidFill>
-                  <a:prstClr val="black"/>
-                </a:solidFill>
-                <a:latin typeface="Consolas"/>
-              </a:rPr>
-              <a:t> = </a:t>
-            </a:r>
-            <a:r>
-              <a:rPr lang="en-US" sz="1200" dirty="0" err="1">
-                <a:solidFill>
-                  <a:srgbClr val="2B91AF"/>
-                </a:solidFill>
-                <a:latin typeface="Consolas"/>
-              </a:rPr>
-              <a:t>XmlReader</a:t>
-            </a:r>
-            <a:r>
-              <a:rPr lang="en-US" sz="1200" dirty="0" err="1">
-                <a:solidFill>
-                  <a:prstClr val="black"/>
-                </a:solidFill>
-                <a:latin typeface="Consolas"/>
-              </a:rPr>
-              <a:t>.Create</a:t>
-            </a:r>
-            <a:r>
-              <a:rPr lang="en-US" sz="1200" dirty="0">
-                <a:solidFill>
-                  <a:prstClr val="black"/>
-                </a:solidFill>
-                <a:latin typeface="Consolas"/>
-              </a:rPr>
-              <a:t>(</a:t>
-            </a:r>
-            <a:r>
-              <a:rPr lang="en-US" sz="1200" dirty="0">
-                <a:solidFill>
-                  <a:srgbClr val="A31515"/>
-                </a:solidFill>
-                <a:latin typeface="Consolas"/>
-              </a:rPr>
-              <a:t>"http://rss.slashdot.org/Slashdot/</a:t>
-            </a:r>
-            <a:r>
-              <a:rPr lang="en-US" sz="1200" dirty="0" err="1">
-                <a:solidFill>
-                  <a:srgbClr val="A31515"/>
-                </a:solidFill>
-                <a:latin typeface="Consolas"/>
-              </a:rPr>
-              <a:t>slashdot</a:t>
-            </a:r>
-            <a:r>
-              <a:rPr lang="en-US" sz="1200" dirty="0">
-                <a:solidFill>
-                  <a:srgbClr val="A31515"/>
-                </a:solidFill>
-                <a:latin typeface="Consolas"/>
-              </a:rPr>
-              <a:t>"</a:t>
-            </a:r>
-            <a:r>
-              <a:rPr lang="en-US" sz="1200" dirty="0">
-                <a:solidFill>
-                  <a:prstClr val="black"/>
-                </a:solidFill>
-                <a:latin typeface="Consolas"/>
-              </a:rPr>
               <a:t>))</a:t>
             </a:r>
+            <a:endParaRPr lang="en-US" sz="1200" dirty="0">
+              <a:solidFill>
+                <a:prstClr val="black"/>
+              </a:solidFill>
+              <a:latin typeface="Consolas"/>
+            </a:endParaRPr>
           </a:p>
           <a:p>
             <a:r>

</xml_diff>